<commit_message>
Creación de conexión de datos, modificacion de startup, creación de la base de datos, creación de controlador product con sus vistas
</commit_message>
<xml_diff>
--- a/Proyecto desde CERO.pptx
+++ b/Proyecto desde CERO.pptx
@@ -5,7 +5,7 @@
     <p:sldMasterId id="2147483648" r:id="rId1"/>
   </p:sldMasterIdLst>
   <p:notesMasterIdLst>
-    <p:notesMasterId r:id="rId26"/>
+    <p:notesMasterId r:id="rId41"/>
   </p:notesMasterIdLst>
   <p:sldIdLst>
     <p:sldId id="256" r:id="rId2"/>
@@ -32,6 +32,21 @@
     <p:sldId id="277" r:id="rId23"/>
     <p:sldId id="278" r:id="rId24"/>
     <p:sldId id="279" r:id="rId25"/>
+    <p:sldId id="280" r:id="rId26"/>
+    <p:sldId id="281" r:id="rId27"/>
+    <p:sldId id="282" r:id="rId28"/>
+    <p:sldId id="283" r:id="rId29"/>
+    <p:sldId id="284" r:id="rId30"/>
+    <p:sldId id="285" r:id="rId31"/>
+    <p:sldId id="286" r:id="rId32"/>
+    <p:sldId id="287" r:id="rId33"/>
+    <p:sldId id="289" r:id="rId34"/>
+    <p:sldId id="288" r:id="rId35"/>
+    <p:sldId id="290" r:id="rId36"/>
+    <p:sldId id="291" r:id="rId37"/>
+    <p:sldId id="292" r:id="rId38"/>
+    <p:sldId id="293" r:id="rId39"/>
+    <p:sldId id="294" r:id="rId40"/>
   </p:sldIdLst>
   <p:sldSz cx="12192000" cy="6858000"/>
   <p:notesSz cx="6858000" cy="9144000"/>
@@ -130,6 +145,11 @@
       </a:defRPr>
     </a:lvl9pPr>
   </p:defaultTextStyle>
+  <p:extLst>
+    <p:ext uri="{EFAFB233-063F-42B5-8137-9DF3F51BA10A}">
+      <p15:sldGuideLst xmlns:p15="http://schemas.microsoft.com/office/powerpoint/2012/main"/>
+    </p:ext>
+  </p:extLst>
 </p:presentation>
 </file>
 
@@ -215,7 +235,7 @@
           <a:p>
             <a:fld id="{46FD0385-094A-4441-9213-65E004583FF4}" type="datetimeFigureOut">
               <a:rPr lang="es-MX" smtClean="0"/>
-              <a:t>21/10/2019</a:t>
+              <a:t>04/11/2019</a:t>
             </a:fld>
             <a:endParaRPr lang="es-MX"/>
           </a:p>
@@ -374,7 +394,7 @@
           <a:p>
             <a:fld id="{785ED18C-E05F-4FD2-A782-FC24AC302660}" type="slidenum">
               <a:rPr lang="es-MX" smtClean="0"/>
-              <a:t>‹#›</a:t>
+              <a:t>‹Nº›</a:t>
             </a:fld>
             <a:endParaRPr lang="es-MX"/>
           </a:p>
@@ -1811,6 +1831,1782 @@
 </p:notes>
 </file>
 
+<file path=ppt/notesSlides/notesSlide22.xml><?xml version="1.0" encoding="utf-8"?>
+<p:notes xmlns:a="http://schemas.openxmlformats.org/drawingml/2006/main" xmlns:r="http://schemas.openxmlformats.org/officeDocument/2006/relationships" xmlns:p="http://schemas.openxmlformats.org/presentationml/2006/main">
+  <p:cSld>
+    <p:spTree>
+      <p:nvGrpSpPr>
+        <p:cNvPr id="1" name=""/>
+        <p:cNvGrpSpPr/>
+        <p:nvPr/>
+      </p:nvGrpSpPr>
+      <p:grpSpPr>
+        <a:xfrm>
+          <a:off x="0" y="0"/>
+          <a:ext cx="0" cy="0"/>
+          <a:chOff x="0" y="0"/>
+          <a:chExt cx="0" cy="0"/>
+        </a:xfrm>
+      </p:grpSpPr>
+      <p:sp>
+        <p:nvSpPr>
+          <p:cNvPr id="2" name="Marcador de imagen de diapositiva 1"/>
+          <p:cNvSpPr>
+            <a:spLocks noGrp="1" noRot="1" noChangeAspect="1"/>
+          </p:cNvSpPr>
+          <p:nvPr>
+            <p:ph type="sldImg"/>
+          </p:nvPr>
+        </p:nvSpPr>
+        <p:spPr/>
+      </p:sp>
+      <p:sp>
+        <p:nvSpPr>
+          <p:cNvPr id="3" name="Marcador de notas 2"/>
+          <p:cNvSpPr>
+            <a:spLocks noGrp="1"/>
+          </p:cNvSpPr>
+          <p:nvPr>
+            <p:ph type="body" idx="1"/>
+          </p:nvPr>
+        </p:nvSpPr>
+        <p:spPr/>
+        <p:txBody>
+          <a:bodyPr/>
+          <a:lstStyle/>
+          <a:p>
+            <a:endParaRPr lang="es-MX" dirty="0"/>
+          </a:p>
+        </p:txBody>
+      </p:sp>
+      <p:sp>
+        <p:nvSpPr>
+          <p:cNvPr id="4" name="Marcador de número de diapositiva 3"/>
+          <p:cNvSpPr>
+            <a:spLocks noGrp="1"/>
+          </p:cNvSpPr>
+          <p:nvPr>
+            <p:ph type="sldNum" sz="quarter" idx="5"/>
+          </p:nvPr>
+        </p:nvSpPr>
+        <p:spPr/>
+        <p:txBody>
+          <a:bodyPr/>
+          <a:lstStyle/>
+          <a:p>
+            <a:fld id="{785ED18C-E05F-4FD2-A782-FC24AC302660}" type="slidenum">
+              <a:rPr lang="es-MX" smtClean="0"/>
+              <a:t>24</a:t>
+            </a:fld>
+            <a:endParaRPr lang="es-MX"/>
+          </a:p>
+        </p:txBody>
+      </p:sp>
+    </p:spTree>
+    <p:extLst>
+      <p:ext uri="{BB962C8B-B14F-4D97-AF65-F5344CB8AC3E}">
+        <p14:creationId xmlns:p14="http://schemas.microsoft.com/office/powerpoint/2010/main" val="1052184685"/>
+      </p:ext>
+    </p:extLst>
+  </p:cSld>
+  <p:clrMapOvr>
+    <a:masterClrMapping/>
+  </p:clrMapOvr>
+</p:notes>
+</file>
+
+<file path=ppt/notesSlides/notesSlide23.xml><?xml version="1.0" encoding="utf-8"?>
+<p:notes xmlns:a="http://schemas.openxmlformats.org/drawingml/2006/main" xmlns:r="http://schemas.openxmlformats.org/officeDocument/2006/relationships" xmlns:p="http://schemas.openxmlformats.org/presentationml/2006/main">
+  <p:cSld>
+    <p:spTree>
+      <p:nvGrpSpPr>
+        <p:cNvPr id="1" name=""/>
+        <p:cNvGrpSpPr/>
+        <p:nvPr/>
+      </p:nvGrpSpPr>
+      <p:grpSpPr>
+        <a:xfrm>
+          <a:off x="0" y="0"/>
+          <a:ext cx="0" cy="0"/>
+          <a:chOff x="0" y="0"/>
+          <a:chExt cx="0" cy="0"/>
+        </a:xfrm>
+      </p:grpSpPr>
+      <p:sp>
+        <p:nvSpPr>
+          <p:cNvPr id="2" name="Marcador de imagen de diapositiva 1"/>
+          <p:cNvSpPr>
+            <a:spLocks noGrp="1" noRot="1" noChangeAspect="1"/>
+          </p:cNvSpPr>
+          <p:nvPr>
+            <p:ph type="sldImg"/>
+          </p:nvPr>
+        </p:nvSpPr>
+        <p:spPr/>
+      </p:sp>
+      <p:sp>
+        <p:nvSpPr>
+          <p:cNvPr id="3" name="Marcador de notas 2"/>
+          <p:cNvSpPr>
+            <a:spLocks noGrp="1"/>
+          </p:cNvSpPr>
+          <p:nvPr>
+            <p:ph type="body" idx="1"/>
+          </p:nvPr>
+        </p:nvSpPr>
+        <p:spPr/>
+        <p:txBody>
+          <a:bodyPr/>
+          <a:lstStyle/>
+          <a:p>
+            <a:r>
+              <a:rPr lang="es-ES" dirty="0"/>
+              <a:t>Creamos la cadena de conexión en el archivo </a:t>
+            </a:r>
+            <a:r>
+              <a:rPr lang="es-ES" dirty="0" err="1"/>
+              <a:t>appsetting.json</a:t>
+            </a:r>
+            <a:endParaRPr lang="es-ES" dirty="0"/>
+          </a:p>
+          <a:p>
+            <a:r>
+              <a:rPr lang="es-MX" sz="1200" kern="1200" dirty="0">
+                <a:solidFill>
+                  <a:schemeClr val="tx1"/>
+                </a:solidFill>
+                <a:latin typeface="+mn-lt"/>
+                <a:ea typeface="+mn-ea"/>
+                <a:cs typeface="+mn-cs"/>
+              </a:rPr>
+              <a:t>{</a:t>
+            </a:r>
+          </a:p>
+          <a:p>
+            <a:r>
+              <a:rPr lang="es-MX" sz="1200" kern="1200" dirty="0">
+                <a:solidFill>
+                  <a:schemeClr val="tx1"/>
+                </a:solidFill>
+                <a:latin typeface="+mn-lt"/>
+                <a:ea typeface="+mn-ea"/>
+                <a:cs typeface="+mn-cs"/>
+              </a:rPr>
+              <a:t>  "</a:t>
+            </a:r>
+            <a:r>
+              <a:rPr lang="es-MX" sz="1200" kern="1200" dirty="0" err="1">
+                <a:solidFill>
+                  <a:schemeClr val="tx1"/>
+                </a:solidFill>
+                <a:latin typeface="+mn-lt"/>
+                <a:ea typeface="+mn-ea"/>
+                <a:cs typeface="+mn-cs"/>
+              </a:rPr>
+              <a:t>Logging</a:t>
+            </a:r>
+            <a:r>
+              <a:rPr lang="es-MX" sz="1200" kern="1200" dirty="0">
+                <a:solidFill>
+                  <a:schemeClr val="tx1"/>
+                </a:solidFill>
+                <a:latin typeface="+mn-lt"/>
+                <a:ea typeface="+mn-ea"/>
+                <a:cs typeface="+mn-cs"/>
+              </a:rPr>
+              <a:t>": {</a:t>
+            </a:r>
+          </a:p>
+          <a:p>
+            <a:r>
+              <a:rPr lang="es-MX" sz="1200" kern="1200" dirty="0">
+                <a:solidFill>
+                  <a:schemeClr val="tx1"/>
+                </a:solidFill>
+                <a:latin typeface="+mn-lt"/>
+                <a:ea typeface="+mn-ea"/>
+                <a:cs typeface="+mn-cs"/>
+              </a:rPr>
+              <a:t>    "</a:t>
+            </a:r>
+            <a:r>
+              <a:rPr lang="es-MX" sz="1200" kern="1200" dirty="0" err="1">
+                <a:solidFill>
+                  <a:schemeClr val="tx1"/>
+                </a:solidFill>
+                <a:latin typeface="+mn-lt"/>
+                <a:ea typeface="+mn-ea"/>
+                <a:cs typeface="+mn-cs"/>
+              </a:rPr>
+              <a:t>LogLevel</a:t>
+            </a:r>
+            <a:r>
+              <a:rPr lang="es-MX" sz="1200" kern="1200" dirty="0">
+                <a:solidFill>
+                  <a:schemeClr val="tx1"/>
+                </a:solidFill>
+                <a:latin typeface="+mn-lt"/>
+                <a:ea typeface="+mn-ea"/>
+                <a:cs typeface="+mn-cs"/>
+              </a:rPr>
+              <a:t>": {</a:t>
+            </a:r>
+          </a:p>
+          <a:p>
+            <a:r>
+              <a:rPr lang="es-MX" sz="1200" kern="1200" dirty="0">
+                <a:solidFill>
+                  <a:schemeClr val="tx1"/>
+                </a:solidFill>
+                <a:latin typeface="+mn-lt"/>
+                <a:ea typeface="+mn-ea"/>
+                <a:cs typeface="+mn-cs"/>
+              </a:rPr>
+              <a:t>      "Default": "</a:t>
+            </a:r>
+            <a:r>
+              <a:rPr lang="es-MX" sz="1200" kern="1200" dirty="0" err="1">
+                <a:solidFill>
+                  <a:schemeClr val="tx1"/>
+                </a:solidFill>
+                <a:latin typeface="+mn-lt"/>
+                <a:ea typeface="+mn-ea"/>
+                <a:cs typeface="+mn-cs"/>
+              </a:rPr>
+              <a:t>Warning</a:t>
+            </a:r>
+            <a:r>
+              <a:rPr lang="es-MX" sz="1200" kern="1200" dirty="0">
+                <a:solidFill>
+                  <a:schemeClr val="tx1"/>
+                </a:solidFill>
+                <a:latin typeface="+mn-lt"/>
+                <a:ea typeface="+mn-ea"/>
+                <a:cs typeface="+mn-cs"/>
+              </a:rPr>
+              <a:t>"</a:t>
+            </a:r>
+          </a:p>
+          <a:p>
+            <a:r>
+              <a:rPr lang="es-MX" sz="1200" kern="1200" dirty="0">
+                <a:solidFill>
+                  <a:schemeClr val="tx1"/>
+                </a:solidFill>
+                <a:latin typeface="+mn-lt"/>
+                <a:ea typeface="+mn-ea"/>
+                <a:cs typeface="+mn-cs"/>
+              </a:rPr>
+              <a:t>    }</a:t>
+            </a:r>
+          </a:p>
+          <a:p>
+            <a:r>
+              <a:rPr lang="es-MX" sz="1200" kern="1200" dirty="0">
+                <a:solidFill>
+                  <a:schemeClr val="tx1"/>
+                </a:solidFill>
+                <a:latin typeface="+mn-lt"/>
+                <a:ea typeface="+mn-ea"/>
+                <a:cs typeface="+mn-cs"/>
+              </a:rPr>
+              <a:t>  },</a:t>
+            </a:r>
+          </a:p>
+          <a:p>
+            <a:r>
+              <a:rPr lang="es-MX" sz="1200" kern="1200" dirty="0">
+                <a:solidFill>
+                  <a:schemeClr val="tx1"/>
+                </a:solidFill>
+                <a:latin typeface="+mn-lt"/>
+                <a:ea typeface="+mn-ea"/>
+                <a:cs typeface="+mn-cs"/>
+              </a:rPr>
+              <a:t>  "</a:t>
+            </a:r>
+            <a:r>
+              <a:rPr lang="es-MX" sz="1200" kern="1200" dirty="0" err="1">
+                <a:solidFill>
+                  <a:schemeClr val="tx1"/>
+                </a:solidFill>
+                <a:latin typeface="+mn-lt"/>
+                <a:ea typeface="+mn-ea"/>
+                <a:cs typeface="+mn-cs"/>
+              </a:rPr>
+              <a:t>AllowedHosts</a:t>
+            </a:r>
+            <a:r>
+              <a:rPr lang="es-MX" sz="1200" kern="1200" dirty="0">
+                <a:solidFill>
+                  <a:schemeClr val="tx1"/>
+                </a:solidFill>
+                <a:latin typeface="+mn-lt"/>
+                <a:ea typeface="+mn-ea"/>
+                <a:cs typeface="+mn-cs"/>
+              </a:rPr>
+              <a:t>": "*",</a:t>
+            </a:r>
+          </a:p>
+          <a:p>
+            <a:r>
+              <a:rPr lang="es-MX" sz="1200" kern="1200" dirty="0">
+                <a:solidFill>
+                  <a:schemeClr val="tx1"/>
+                </a:solidFill>
+                <a:latin typeface="+mn-lt"/>
+                <a:ea typeface="+mn-ea"/>
+                <a:cs typeface="+mn-cs"/>
+              </a:rPr>
+              <a:t>  "</a:t>
+            </a:r>
+            <a:r>
+              <a:rPr lang="es-MX" sz="1200" kern="1200" dirty="0" err="1">
+                <a:solidFill>
+                  <a:schemeClr val="tx1"/>
+                </a:solidFill>
+                <a:latin typeface="+mn-lt"/>
+                <a:ea typeface="+mn-ea"/>
+                <a:cs typeface="+mn-cs"/>
+              </a:rPr>
+              <a:t>ConnectionStrings</a:t>
+            </a:r>
+            <a:r>
+              <a:rPr lang="es-MX" sz="1200" kern="1200" dirty="0">
+                <a:solidFill>
+                  <a:schemeClr val="tx1"/>
+                </a:solidFill>
+                <a:latin typeface="+mn-lt"/>
+                <a:ea typeface="+mn-ea"/>
+                <a:cs typeface="+mn-cs"/>
+              </a:rPr>
+              <a:t>": {</a:t>
+            </a:r>
+          </a:p>
+          <a:p>
+            <a:r>
+              <a:rPr lang="en-US" sz="1200" kern="1200" dirty="0">
+                <a:solidFill>
+                  <a:schemeClr val="tx1"/>
+                </a:solidFill>
+                <a:latin typeface="+mn-lt"/>
+                <a:ea typeface="+mn-ea"/>
+                <a:cs typeface="+mn-cs"/>
+              </a:rPr>
+              <a:t>    "</a:t>
+            </a:r>
+            <a:r>
+              <a:rPr lang="en-US" sz="1200" kern="1200" dirty="0" err="1">
+                <a:solidFill>
+                  <a:schemeClr val="tx1"/>
+                </a:solidFill>
+                <a:latin typeface="+mn-lt"/>
+                <a:ea typeface="+mn-ea"/>
+                <a:cs typeface="+mn-cs"/>
+              </a:rPr>
+              <a:t>DefaultConnection</a:t>
+            </a:r>
+            <a:r>
+              <a:rPr lang="en-US" sz="1200" kern="1200" dirty="0">
+                <a:solidFill>
+                  <a:schemeClr val="tx1"/>
+                </a:solidFill>
+                <a:latin typeface="+mn-lt"/>
+                <a:ea typeface="+mn-ea"/>
+                <a:cs typeface="+mn-cs"/>
+              </a:rPr>
+              <a:t>": "Server=(</a:t>
+            </a:r>
+            <a:r>
+              <a:rPr lang="en-US" sz="1200" kern="1200" dirty="0" err="1">
+                <a:solidFill>
+                  <a:schemeClr val="tx1"/>
+                </a:solidFill>
+                <a:latin typeface="+mn-lt"/>
+                <a:ea typeface="+mn-ea"/>
+                <a:cs typeface="+mn-cs"/>
+              </a:rPr>
+              <a:t>localdb</a:t>
+            </a:r>
+            <a:r>
+              <a:rPr lang="en-US" sz="1200" kern="1200" dirty="0">
+                <a:solidFill>
+                  <a:schemeClr val="tx1"/>
+                </a:solidFill>
+                <a:latin typeface="+mn-lt"/>
+                <a:ea typeface="+mn-ea"/>
+                <a:cs typeface="+mn-cs"/>
+              </a:rPr>
+              <a:t>)\\ProjectsV13;Database=</a:t>
+            </a:r>
+            <a:r>
+              <a:rPr lang="en-US" sz="1200" kern="1200" dirty="0" err="1">
+                <a:solidFill>
+                  <a:schemeClr val="tx1"/>
+                </a:solidFill>
+                <a:latin typeface="+mn-lt"/>
+                <a:ea typeface="+mn-ea"/>
+                <a:cs typeface="+mn-cs"/>
+              </a:rPr>
+              <a:t>PAW;Trusted_Connection</a:t>
+            </a:r>
+            <a:r>
+              <a:rPr lang="en-US" sz="1200" kern="1200" dirty="0">
+                <a:solidFill>
+                  <a:schemeClr val="tx1"/>
+                </a:solidFill>
+                <a:latin typeface="+mn-lt"/>
+                <a:ea typeface="+mn-ea"/>
+                <a:cs typeface="+mn-cs"/>
+              </a:rPr>
+              <a:t>=</a:t>
+            </a:r>
+            <a:r>
+              <a:rPr lang="en-US" sz="1200" kern="1200" dirty="0" err="1">
+                <a:solidFill>
+                  <a:schemeClr val="tx1"/>
+                </a:solidFill>
+                <a:latin typeface="+mn-lt"/>
+                <a:ea typeface="+mn-ea"/>
+                <a:cs typeface="+mn-cs"/>
+              </a:rPr>
+              <a:t>true;MultipleActiveResultSets</a:t>
+            </a:r>
+            <a:r>
+              <a:rPr lang="en-US" sz="1200" kern="1200" dirty="0">
+                <a:solidFill>
+                  <a:schemeClr val="tx1"/>
+                </a:solidFill>
+                <a:latin typeface="+mn-lt"/>
+                <a:ea typeface="+mn-ea"/>
+                <a:cs typeface="+mn-cs"/>
+              </a:rPr>
+              <a:t>=true"</a:t>
+            </a:r>
+          </a:p>
+          <a:p>
+            <a:r>
+              <a:rPr lang="es-MX" sz="1200" kern="1200" dirty="0">
+                <a:solidFill>
+                  <a:schemeClr val="tx1"/>
+                </a:solidFill>
+                <a:latin typeface="+mn-lt"/>
+                <a:ea typeface="+mn-ea"/>
+                <a:cs typeface="+mn-cs"/>
+              </a:rPr>
+              <a:t>  }</a:t>
+            </a:r>
+          </a:p>
+          <a:p>
+            <a:r>
+              <a:rPr lang="es-MX" sz="1200" kern="1200" dirty="0">
+                <a:solidFill>
+                  <a:schemeClr val="tx1"/>
+                </a:solidFill>
+                <a:latin typeface="+mn-lt"/>
+                <a:ea typeface="+mn-ea"/>
+                <a:cs typeface="+mn-cs"/>
+              </a:rPr>
+              <a:t>}</a:t>
+            </a:r>
+          </a:p>
+        </p:txBody>
+      </p:sp>
+      <p:sp>
+        <p:nvSpPr>
+          <p:cNvPr id="4" name="Marcador de número de diapositiva 3"/>
+          <p:cNvSpPr>
+            <a:spLocks noGrp="1"/>
+          </p:cNvSpPr>
+          <p:nvPr>
+            <p:ph type="sldNum" sz="quarter" idx="5"/>
+          </p:nvPr>
+        </p:nvSpPr>
+        <p:spPr/>
+        <p:txBody>
+          <a:bodyPr/>
+          <a:lstStyle/>
+          <a:p>
+            <a:fld id="{785ED18C-E05F-4FD2-A782-FC24AC302660}" type="slidenum">
+              <a:rPr lang="es-MX" smtClean="0"/>
+              <a:t>25</a:t>
+            </a:fld>
+            <a:endParaRPr lang="es-MX"/>
+          </a:p>
+        </p:txBody>
+      </p:sp>
+    </p:spTree>
+    <p:extLst>
+      <p:ext uri="{BB962C8B-B14F-4D97-AF65-F5344CB8AC3E}">
+        <p14:creationId xmlns:p14="http://schemas.microsoft.com/office/powerpoint/2010/main" val="497619491"/>
+      </p:ext>
+    </p:extLst>
+  </p:cSld>
+  <p:clrMapOvr>
+    <a:masterClrMapping/>
+  </p:clrMapOvr>
+</p:notes>
+</file>
+
+<file path=ppt/notesSlides/notesSlide24.xml><?xml version="1.0" encoding="utf-8"?>
+<p:notes xmlns:a="http://schemas.openxmlformats.org/drawingml/2006/main" xmlns:r="http://schemas.openxmlformats.org/officeDocument/2006/relationships" xmlns:p="http://schemas.openxmlformats.org/presentationml/2006/main">
+  <p:cSld>
+    <p:spTree>
+      <p:nvGrpSpPr>
+        <p:cNvPr id="1" name=""/>
+        <p:cNvGrpSpPr/>
+        <p:nvPr/>
+      </p:nvGrpSpPr>
+      <p:grpSpPr>
+        <a:xfrm>
+          <a:off x="0" y="0"/>
+          <a:ext cx="0" cy="0"/>
+          <a:chOff x="0" y="0"/>
+          <a:chExt cx="0" cy="0"/>
+        </a:xfrm>
+      </p:grpSpPr>
+      <p:sp>
+        <p:nvSpPr>
+          <p:cNvPr id="2" name="Marcador de imagen de diapositiva 1"/>
+          <p:cNvSpPr>
+            <a:spLocks noGrp="1" noRot="1" noChangeAspect="1"/>
+          </p:cNvSpPr>
+          <p:nvPr>
+            <p:ph type="sldImg"/>
+          </p:nvPr>
+        </p:nvSpPr>
+        <p:spPr/>
+      </p:sp>
+      <p:sp>
+        <p:nvSpPr>
+          <p:cNvPr id="3" name="Marcador de notas 2"/>
+          <p:cNvSpPr>
+            <a:spLocks noGrp="1"/>
+          </p:cNvSpPr>
+          <p:nvPr>
+            <p:ph type="body" idx="1"/>
+          </p:nvPr>
+        </p:nvSpPr>
+        <p:spPr/>
+        <p:txBody>
+          <a:bodyPr/>
+          <a:lstStyle/>
+          <a:p>
+            <a:r>
+              <a:rPr lang="es-ES" dirty="0"/>
+              <a:t>Modificar el archivo Startup para agregar la cadena de conexión</a:t>
+            </a:r>
+          </a:p>
+          <a:p>
+            <a:r>
+              <a:rPr lang="es-ES" dirty="0"/>
+              <a:t>Importar la referencia de </a:t>
+            </a:r>
+            <a:r>
+              <a:rPr lang="es-ES" dirty="0" err="1"/>
+              <a:t>DAtaContext</a:t>
+            </a:r>
+            <a:r>
+              <a:rPr lang="es-ES" dirty="0"/>
+              <a:t> </a:t>
+            </a:r>
+            <a:r>
+              <a:rPr lang="es-ES" dirty="0" err="1"/>
+              <a:t>Ctrl+punto</a:t>
+            </a:r>
+            <a:endParaRPr lang="es-ES" dirty="0"/>
+          </a:p>
+          <a:p>
+            <a:r>
+              <a:rPr lang="es-ES" dirty="0"/>
+              <a:t>Importar la referencia de </a:t>
+            </a:r>
+            <a:r>
+              <a:rPr lang="es-ES" dirty="0" err="1"/>
+              <a:t>UseSqlServer</a:t>
+            </a:r>
+            <a:r>
+              <a:rPr lang="es-ES" dirty="0"/>
+              <a:t> </a:t>
+            </a:r>
+            <a:r>
+              <a:rPr lang="es-ES" dirty="0" err="1"/>
+              <a:t>Ctrl+punto</a:t>
+            </a:r>
+            <a:endParaRPr lang="es-ES" dirty="0"/>
+          </a:p>
+          <a:p>
+            <a:r>
+              <a:rPr lang="es-MX" sz="1200" kern="1200" dirty="0" err="1">
+                <a:solidFill>
+                  <a:schemeClr val="tx1"/>
+                </a:solidFill>
+                <a:latin typeface="+mn-lt"/>
+                <a:ea typeface="+mn-ea"/>
+                <a:cs typeface="+mn-cs"/>
+              </a:rPr>
+              <a:t>public</a:t>
+            </a:r>
+            <a:r>
+              <a:rPr lang="es-MX" sz="1200" kern="1200" dirty="0">
+                <a:solidFill>
+                  <a:schemeClr val="tx1"/>
+                </a:solidFill>
+                <a:latin typeface="+mn-lt"/>
+                <a:ea typeface="+mn-ea"/>
+                <a:cs typeface="+mn-cs"/>
+              </a:rPr>
+              <a:t> </a:t>
+            </a:r>
+            <a:r>
+              <a:rPr lang="es-MX" sz="1200" kern="1200" dirty="0" err="1">
+                <a:solidFill>
+                  <a:schemeClr val="tx1"/>
+                </a:solidFill>
+                <a:latin typeface="+mn-lt"/>
+                <a:ea typeface="+mn-ea"/>
+                <a:cs typeface="+mn-cs"/>
+              </a:rPr>
+              <a:t>void</a:t>
+            </a:r>
+            <a:r>
+              <a:rPr lang="es-MX" sz="1200" kern="1200" dirty="0">
+                <a:solidFill>
+                  <a:schemeClr val="tx1"/>
+                </a:solidFill>
+                <a:latin typeface="+mn-lt"/>
+                <a:ea typeface="+mn-ea"/>
+                <a:cs typeface="+mn-cs"/>
+              </a:rPr>
+              <a:t> </a:t>
+            </a:r>
+            <a:r>
+              <a:rPr lang="es-MX" sz="1200" kern="1200" dirty="0" err="1">
+                <a:solidFill>
+                  <a:schemeClr val="tx1"/>
+                </a:solidFill>
+                <a:latin typeface="+mn-lt"/>
+                <a:ea typeface="+mn-ea"/>
+                <a:cs typeface="+mn-cs"/>
+              </a:rPr>
+              <a:t>ConfigureServices</a:t>
+            </a:r>
+            <a:r>
+              <a:rPr lang="es-MX" sz="1200" kern="1200" dirty="0">
+                <a:solidFill>
+                  <a:schemeClr val="tx1"/>
+                </a:solidFill>
+                <a:latin typeface="+mn-lt"/>
+                <a:ea typeface="+mn-ea"/>
+                <a:cs typeface="+mn-cs"/>
+              </a:rPr>
+              <a:t>(</a:t>
+            </a:r>
+            <a:r>
+              <a:rPr lang="es-MX" sz="1200" kern="1200" dirty="0" err="1">
+                <a:solidFill>
+                  <a:schemeClr val="tx1"/>
+                </a:solidFill>
+                <a:latin typeface="+mn-lt"/>
+                <a:ea typeface="+mn-ea"/>
+                <a:cs typeface="+mn-cs"/>
+              </a:rPr>
+              <a:t>IServiceCollection</a:t>
+            </a:r>
+            <a:r>
+              <a:rPr lang="es-MX" sz="1200" kern="1200" dirty="0">
+                <a:solidFill>
+                  <a:schemeClr val="tx1"/>
+                </a:solidFill>
+                <a:latin typeface="+mn-lt"/>
+                <a:ea typeface="+mn-ea"/>
+                <a:cs typeface="+mn-cs"/>
+              </a:rPr>
+              <a:t> </a:t>
+            </a:r>
+            <a:r>
+              <a:rPr lang="es-MX" sz="1200" kern="1200" dirty="0" err="1">
+                <a:solidFill>
+                  <a:schemeClr val="tx1"/>
+                </a:solidFill>
+                <a:latin typeface="+mn-lt"/>
+                <a:ea typeface="+mn-ea"/>
+                <a:cs typeface="+mn-cs"/>
+              </a:rPr>
+              <a:t>services</a:t>
+            </a:r>
+            <a:r>
+              <a:rPr lang="es-MX" sz="1200" kern="1200" dirty="0">
+                <a:solidFill>
+                  <a:schemeClr val="tx1"/>
+                </a:solidFill>
+                <a:latin typeface="+mn-lt"/>
+                <a:ea typeface="+mn-ea"/>
+                <a:cs typeface="+mn-cs"/>
+              </a:rPr>
+              <a:t>)</a:t>
+            </a:r>
+          </a:p>
+          <a:p>
+            <a:r>
+              <a:rPr lang="es-MX" sz="1200" kern="1200" dirty="0">
+                <a:solidFill>
+                  <a:schemeClr val="tx1"/>
+                </a:solidFill>
+                <a:latin typeface="+mn-lt"/>
+                <a:ea typeface="+mn-ea"/>
+                <a:cs typeface="+mn-cs"/>
+              </a:rPr>
+              <a:t>        {</a:t>
+            </a:r>
+          </a:p>
+          <a:p>
+            <a:r>
+              <a:rPr lang="es-MX" sz="1200" kern="1200" dirty="0">
+                <a:solidFill>
+                  <a:schemeClr val="tx1"/>
+                </a:solidFill>
+                <a:latin typeface="+mn-lt"/>
+                <a:ea typeface="+mn-ea"/>
+                <a:cs typeface="+mn-cs"/>
+              </a:rPr>
+              <a:t>            </a:t>
+            </a:r>
+            <a:r>
+              <a:rPr lang="es-MX" sz="1200" kern="1200" dirty="0" err="1">
+                <a:solidFill>
+                  <a:schemeClr val="tx1"/>
+                </a:solidFill>
+                <a:latin typeface="+mn-lt"/>
+                <a:ea typeface="+mn-ea"/>
+                <a:cs typeface="+mn-cs"/>
+              </a:rPr>
+              <a:t>services.AddDbContext</a:t>
+            </a:r>
+            <a:r>
+              <a:rPr lang="es-MX" sz="1200" kern="1200" dirty="0">
+                <a:solidFill>
+                  <a:schemeClr val="tx1"/>
+                </a:solidFill>
+                <a:latin typeface="+mn-lt"/>
+                <a:ea typeface="+mn-ea"/>
+                <a:cs typeface="+mn-cs"/>
+              </a:rPr>
+              <a:t>&lt;</a:t>
+            </a:r>
+            <a:r>
+              <a:rPr lang="es-MX" sz="1200" kern="1200" dirty="0" err="1">
+                <a:solidFill>
+                  <a:schemeClr val="tx1"/>
+                </a:solidFill>
+                <a:latin typeface="+mn-lt"/>
+                <a:ea typeface="+mn-ea"/>
+                <a:cs typeface="+mn-cs"/>
+              </a:rPr>
+              <a:t>DataContext</a:t>
+            </a:r>
+            <a:r>
+              <a:rPr lang="es-MX" sz="1200" kern="1200" dirty="0">
+                <a:solidFill>
+                  <a:schemeClr val="tx1"/>
+                </a:solidFill>
+                <a:latin typeface="+mn-lt"/>
+                <a:ea typeface="+mn-ea"/>
+                <a:cs typeface="+mn-cs"/>
+              </a:rPr>
+              <a:t>&gt;(</a:t>
+            </a:r>
+            <a:r>
+              <a:rPr lang="es-MX" sz="1200" kern="1200" dirty="0" err="1">
+                <a:solidFill>
+                  <a:schemeClr val="tx1"/>
+                </a:solidFill>
+                <a:latin typeface="+mn-lt"/>
+                <a:ea typeface="+mn-ea"/>
+                <a:cs typeface="+mn-cs"/>
+              </a:rPr>
+              <a:t>cfg</a:t>
+            </a:r>
+            <a:r>
+              <a:rPr lang="es-MX" sz="1200" kern="1200" dirty="0">
+                <a:solidFill>
+                  <a:schemeClr val="tx1"/>
+                </a:solidFill>
+                <a:latin typeface="+mn-lt"/>
+                <a:ea typeface="+mn-ea"/>
+                <a:cs typeface="+mn-cs"/>
+              </a:rPr>
+              <a:t> =&gt;</a:t>
+            </a:r>
+          </a:p>
+          <a:p>
+            <a:r>
+              <a:rPr lang="es-MX" sz="1200" kern="1200" dirty="0">
+                <a:solidFill>
+                  <a:schemeClr val="tx1"/>
+                </a:solidFill>
+                <a:latin typeface="+mn-lt"/>
+                <a:ea typeface="+mn-ea"/>
+                <a:cs typeface="+mn-cs"/>
+              </a:rPr>
+              <a:t>            {</a:t>
+            </a:r>
+          </a:p>
+          <a:p>
+            <a:r>
+              <a:rPr lang="es-MX" sz="1200" kern="1200" dirty="0">
+                <a:solidFill>
+                  <a:schemeClr val="tx1"/>
+                </a:solidFill>
+                <a:latin typeface="+mn-lt"/>
+                <a:ea typeface="+mn-ea"/>
+                <a:cs typeface="+mn-cs"/>
+              </a:rPr>
+              <a:t>                </a:t>
+            </a:r>
+            <a:r>
+              <a:rPr lang="es-MX" sz="1200" kern="1200" dirty="0" err="1">
+                <a:solidFill>
+                  <a:schemeClr val="tx1"/>
+                </a:solidFill>
+                <a:latin typeface="+mn-lt"/>
+                <a:ea typeface="+mn-ea"/>
+                <a:cs typeface="+mn-cs"/>
+              </a:rPr>
+              <a:t>cfg.UseSqlServer</a:t>
+            </a:r>
+            <a:r>
+              <a:rPr lang="es-MX" sz="1200" kern="1200" dirty="0">
+                <a:solidFill>
+                  <a:schemeClr val="tx1"/>
+                </a:solidFill>
+                <a:latin typeface="+mn-lt"/>
+                <a:ea typeface="+mn-ea"/>
+                <a:cs typeface="+mn-cs"/>
+              </a:rPr>
+              <a:t>(</a:t>
+            </a:r>
+            <a:r>
+              <a:rPr lang="es-MX" sz="1200" kern="1200" dirty="0" err="1">
+                <a:solidFill>
+                  <a:schemeClr val="tx1"/>
+                </a:solidFill>
+                <a:latin typeface="+mn-lt"/>
+                <a:ea typeface="+mn-ea"/>
+                <a:cs typeface="+mn-cs"/>
+              </a:rPr>
+              <a:t>Configuration.GetConnectionString</a:t>
+            </a:r>
+            <a:r>
+              <a:rPr lang="es-MX" sz="1200" kern="1200" dirty="0">
+                <a:solidFill>
+                  <a:schemeClr val="tx1"/>
+                </a:solidFill>
+                <a:latin typeface="+mn-lt"/>
+                <a:ea typeface="+mn-ea"/>
+                <a:cs typeface="+mn-cs"/>
+              </a:rPr>
+              <a:t>("</a:t>
+            </a:r>
+            <a:r>
+              <a:rPr lang="es-MX" sz="1200" kern="1200" dirty="0" err="1">
+                <a:solidFill>
+                  <a:schemeClr val="tx1"/>
+                </a:solidFill>
+                <a:latin typeface="+mn-lt"/>
+                <a:ea typeface="+mn-ea"/>
+                <a:cs typeface="+mn-cs"/>
+              </a:rPr>
+              <a:t>DefaultConnection</a:t>
+            </a:r>
+            <a:r>
+              <a:rPr lang="es-MX" sz="1200" kern="1200" dirty="0">
+                <a:solidFill>
+                  <a:schemeClr val="tx1"/>
+                </a:solidFill>
+                <a:latin typeface="+mn-lt"/>
+                <a:ea typeface="+mn-ea"/>
+                <a:cs typeface="+mn-cs"/>
+              </a:rPr>
+              <a:t>"));</a:t>
+            </a:r>
+          </a:p>
+          <a:p>
+            <a:r>
+              <a:rPr lang="es-MX" sz="1200" kern="1200" dirty="0">
+                <a:solidFill>
+                  <a:schemeClr val="tx1"/>
+                </a:solidFill>
+                <a:latin typeface="+mn-lt"/>
+                <a:ea typeface="+mn-ea"/>
+                <a:cs typeface="+mn-cs"/>
+              </a:rPr>
+              <a:t>            });</a:t>
+            </a:r>
+          </a:p>
+          <a:p>
+            <a:r>
+              <a:rPr lang="es-MX" sz="1200" kern="1200" dirty="0">
+                <a:solidFill>
+                  <a:schemeClr val="tx1"/>
+                </a:solidFill>
+                <a:latin typeface="+mn-lt"/>
+                <a:ea typeface="+mn-ea"/>
+                <a:cs typeface="+mn-cs"/>
+              </a:rPr>
+              <a:t>            </a:t>
+            </a:r>
+            <a:r>
+              <a:rPr lang="es-MX" sz="1200" kern="1200" dirty="0" err="1">
+                <a:solidFill>
+                  <a:schemeClr val="tx1"/>
+                </a:solidFill>
+                <a:latin typeface="+mn-lt"/>
+                <a:ea typeface="+mn-ea"/>
+                <a:cs typeface="+mn-cs"/>
+              </a:rPr>
+              <a:t>services.Configure</a:t>
+            </a:r>
+            <a:r>
+              <a:rPr lang="es-MX" sz="1200" kern="1200" dirty="0">
+                <a:solidFill>
+                  <a:schemeClr val="tx1"/>
+                </a:solidFill>
+                <a:latin typeface="+mn-lt"/>
+                <a:ea typeface="+mn-ea"/>
+                <a:cs typeface="+mn-cs"/>
+              </a:rPr>
+              <a:t>&lt;</a:t>
+            </a:r>
+            <a:r>
+              <a:rPr lang="es-MX" sz="1200" kern="1200" dirty="0" err="1">
+                <a:solidFill>
+                  <a:schemeClr val="tx1"/>
+                </a:solidFill>
+                <a:latin typeface="+mn-lt"/>
+                <a:ea typeface="+mn-ea"/>
+                <a:cs typeface="+mn-cs"/>
+              </a:rPr>
+              <a:t>CookiePolicyOptions</a:t>
+            </a:r>
+            <a:r>
+              <a:rPr lang="es-MX" sz="1200" kern="1200" dirty="0">
+                <a:solidFill>
+                  <a:schemeClr val="tx1"/>
+                </a:solidFill>
+                <a:latin typeface="+mn-lt"/>
+                <a:ea typeface="+mn-ea"/>
+                <a:cs typeface="+mn-cs"/>
+              </a:rPr>
+              <a:t>&gt;(</a:t>
+            </a:r>
+            <a:r>
+              <a:rPr lang="es-MX" sz="1200" kern="1200" dirty="0" err="1">
+                <a:solidFill>
+                  <a:schemeClr val="tx1"/>
+                </a:solidFill>
+                <a:latin typeface="+mn-lt"/>
+                <a:ea typeface="+mn-ea"/>
+                <a:cs typeface="+mn-cs"/>
+              </a:rPr>
+              <a:t>options</a:t>
+            </a:r>
+            <a:r>
+              <a:rPr lang="es-MX" sz="1200" kern="1200" dirty="0">
+                <a:solidFill>
+                  <a:schemeClr val="tx1"/>
+                </a:solidFill>
+                <a:latin typeface="+mn-lt"/>
+                <a:ea typeface="+mn-ea"/>
+                <a:cs typeface="+mn-cs"/>
+              </a:rPr>
+              <a:t> =&gt;</a:t>
+            </a:r>
+          </a:p>
+          <a:p>
+            <a:r>
+              <a:rPr lang="es-MX" sz="1200" kern="1200" dirty="0">
+                <a:solidFill>
+                  <a:schemeClr val="tx1"/>
+                </a:solidFill>
+                <a:latin typeface="+mn-lt"/>
+                <a:ea typeface="+mn-ea"/>
+                <a:cs typeface="+mn-cs"/>
+              </a:rPr>
+              <a:t>            {</a:t>
+            </a:r>
+          </a:p>
+          <a:p>
+            <a:r>
+              <a:rPr lang="en-US" sz="1200" kern="1200" dirty="0">
+                <a:solidFill>
+                  <a:schemeClr val="tx1"/>
+                </a:solidFill>
+                <a:latin typeface="+mn-lt"/>
+                <a:ea typeface="+mn-ea"/>
+                <a:cs typeface="+mn-cs"/>
+              </a:rPr>
+              <a:t>                // This lambda determines whether user consent for non-essential cookies is needed for a given request.</a:t>
+            </a:r>
+          </a:p>
+          <a:p>
+            <a:r>
+              <a:rPr lang="es-MX" sz="1200" kern="1200" dirty="0">
+                <a:solidFill>
+                  <a:schemeClr val="tx1"/>
+                </a:solidFill>
+                <a:latin typeface="+mn-lt"/>
+                <a:ea typeface="+mn-ea"/>
+                <a:cs typeface="+mn-cs"/>
+              </a:rPr>
+              <a:t>                </a:t>
+            </a:r>
+            <a:r>
+              <a:rPr lang="es-MX" sz="1200" kern="1200" dirty="0" err="1">
+                <a:solidFill>
+                  <a:schemeClr val="tx1"/>
+                </a:solidFill>
+                <a:latin typeface="+mn-lt"/>
+                <a:ea typeface="+mn-ea"/>
+                <a:cs typeface="+mn-cs"/>
+              </a:rPr>
+              <a:t>options.CheckConsentNeeded</a:t>
+            </a:r>
+            <a:r>
+              <a:rPr lang="es-MX" sz="1200" kern="1200" dirty="0">
+                <a:solidFill>
+                  <a:schemeClr val="tx1"/>
+                </a:solidFill>
+                <a:latin typeface="+mn-lt"/>
+                <a:ea typeface="+mn-ea"/>
+                <a:cs typeface="+mn-cs"/>
+              </a:rPr>
+              <a:t> = </a:t>
+            </a:r>
+            <a:r>
+              <a:rPr lang="es-MX" sz="1200" kern="1200" dirty="0" err="1">
+                <a:solidFill>
+                  <a:schemeClr val="tx1"/>
+                </a:solidFill>
+                <a:latin typeface="+mn-lt"/>
+                <a:ea typeface="+mn-ea"/>
+                <a:cs typeface="+mn-cs"/>
+              </a:rPr>
+              <a:t>context</a:t>
+            </a:r>
+            <a:r>
+              <a:rPr lang="es-MX" sz="1200" kern="1200" dirty="0">
+                <a:solidFill>
+                  <a:schemeClr val="tx1"/>
+                </a:solidFill>
+                <a:latin typeface="+mn-lt"/>
+                <a:ea typeface="+mn-ea"/>
+                <a:cs typeface="+mn-cs"/>
+              </a:rPr>
+              <a:t> =&gt; true;</a:t>
+            </a:r>
+          </a:p>
+          <a:p>
+            <a:r>
+              <a:rPr lang="es-MX" sz="1200" kern="1200" dirty="0">
+                <a:solidFill>
+                  <a:schemeClr val="tx1"/>
+                </a:solidFill>
+                <a:latin typeface="+mn-lt"/>
+                <a:ea typeface="+mn-ea"/>
+                <a:cs typeface="+mn-cs"/>
+              </a:rPr>
+              <a:t>                </a:t>
+            </a:r>
+            <a:r>
+              <a:rPr lang="es-MX" sz="1200" kern="1200" dirty="0" err="1">
+                <a:solidFill>
+                  <a:schemeClr val="tx1"/>
+                </a:solidFill>
+                <a:latin typeface="+mn-lt"/>
+                <a:ea typeface="+mn-ea"/>
+                <a:cs typeface="+mn-cs"/>
+              </a:rPr>
+              <a:t>options.MinimumSameSitePolicy</a:t>
+            </a:r>
+            <a:r>
+              <a:rPr lang="es-MX" sz="1200" kern="1200" dirty="0">
+                <a:solidFill>
+                  <a:schemeClr val="tx1"/>
+                </a:solidFill>
+                <a:latin typeface="+mn-lt"/>
+                <a:ea typeface="+mn-ea"/>
+                <a:cs typeface="+mn-cs"/>
+              </a:rPr>
+              <a:t> = </a:t>
+            </a:r>
+            <a:r>
+              <a:rPr lang="es-MX" sz="1200" kern="1200" dirty="0" err="1">
+                <a:solidFill>
+                  <a:schemeClr val="tx1"/>
+                </a:solidFill>
+                <a:latin typeface="+mn-lt"/>
+                <a:ea typeface="+mn-ea"/>
+                <a:cs typeface="+mn-cs"/>
+              </a:rPr>
+              <a:t>SameSiteMode.None</a:t>
+            </a:r>
+            <a:r>
+              <a:rPr lang="es-MX" sz="1200" kern="1200" dirty="0">
+                <a:solidFill>
+                  <a:schemeClr val="tx1"/>
+                </a:solidFill>
+                <a:latin typeface="+mn-lt"/>
+                <a:ea typeface="+mn-ea"/>
+                <a:cs typeface="+mn-cs"/>
+              </a:rPr>
+              <a:t>;</a:t>
+            </a:r>
+          </a:p>
+          <a:p>
+            <a:r>
+              <a:rPr lang="es-MX" sz="1200" kern="1200" dirty="0">
+                <a:solidFill>
+                  <a:schemeClr val="tx1"/>
+                </a:solidFill>
+                <a:latin typeface="+mn-lt"/>
+                <a:ea typeface="+mn-ea"/>
+                <a:cs typeface="+mn-cs"/>
+              </a:rPr>
+              <a:t>            });</a:t>
+            </a:r>
+            <a:endParaRPr lang="es-MX" dirty="0"/>
+          </a:p>
+        </p:txBody>
+      </p:sp>
+      <p:sp>
+        <p:nvSpPr>
+          <p:cNvPr id="4" name="Marcador de número de diapositiva 3"/>
+          <p:cNvSpPr>
+            <a:spLocks noGrp="1"/>
+          </p:cNvSpPr>
+          <p:nvPr>
+            <p:ph type="sldNum" sz="quarter" idx="5"/>
+          </p:nvPr>
+        </p:nvSpPr>
+        <p:spPr/>
+        <p:txBody>
+          <a:bodyPr/>
+          <a:lstStyle/>
+          <a:p>
+            <a:fld id="{785ED18C-E05F-4FD2-A782-FC24AC302660}" type="slidenum">
+              <a:rPr lang="es-MX" smtClean="0"/>
+              <a:t>26</a:t>
+            </a:fld>
+            <a:endParaRPr lang="es-MX"/>
+          </a:p>
+        </p:txBody>
+      </p:sp>
+    </p:spTree>
+    <p:extLst>
+      <p:ext uri="{BB962C8B-B14F-4D97-AF65-F5344CB8AC3E}">
+        <p14:creationId xmlns:p14="http://schemas.microsoft.com/office/powerpoint/2010/main" val="1231735250"/>
+      </p:ext>
+    </p:extLst>
+  </p:cSld>
+  <p:clrMapOvr>
+    <a:masterClrMapping/>
+  </p:clrMapOvr>
+</p:notes>
+</file>
+
+<file path=ppt/notesSlides/notesSlide25.xml><?xml version="1.0" encoding="utf-8"?>
+<p:notes xmlns:a="http://schemas.openxmlformats.org/drawingml/2006/main" xmlns:r="http://schemas.openxmlformats.org/officeDocument/2006/relationships" xmlns:p="http://schemas.openxmlformats.org/presentationml/2006/main">
+  <p:cSld>
+    <p:spTree>
+      <p:nvGrpSpPr>
+        <p:cNvPr id="1" name=""/>
+        <p:cNvGrpSpPr/>
+        <p:nvPr/>
+      </p:nvGrpSpPr>
+      <p:grpSpPr>
+        <a:xfrm>
+          <a:off x="0" y="0"/>
+          <a:ext cx="0" cy="0"/>
+          <a:chOff x="0" y="0"/>
+          <a:chExt cx="0" cy="0"/>
+        </a:xfrm>
+      </p:grpSpPr>
+      <p:sp>
+        <p:nvSpPr>
+          <p:cNvPr id="2" name="Marcador de imagen de diapositiva 1"/>
+          <p:cNvSpPr>
+            <a:spLocks noGrp="1" noRot="1" noChangeAspect="1"/>
+          </p:cNvSpPr>
+          <p:nvPr>
+            <p:ph type="sldImg"/>
+          </p:nvPr>
+        </p:nvSpPr>
+        <p:spPr/>
+      </p:sp>
+      <p:sp>
+        <p:nvSpPr>
+          <p:cNvPr id="3" name="Marcador de notas 2"/>
+          <p:cNvSpPr>
+            <a:spLocks noGrp="1"/>
+          </p:cNvSpPr>
+          <p:nvPr>
+            <p:ph type="body" idx="1"/>
+          </p:nvPr>
+        </p:nvSpPr>
+        <p:spPr/>
+        <p:txBody>
+          <a:bodyPr/>
+          <a:lstStyle/>
+          <a:p>
+            <a:r>
+              <a:rPr lang="es-ES" dirty="0"/>
+              <a:t>Abrimos la carpeta en el proyecto web</a:t>
+            </a:r>
+            <a:endParaRPr lang="es-MX" dirty="0"/>
+          </a:p>
+        </p:txBody>
+      </p:sp>
+      <p:sp>
+        <p:nvSpPr>
+          <p:cNvPr id="4" name="Marcador de número de diapositiva 3"/>
+          <p:cNvSpPr>
+            <a:spLocks noGrp="1"/>
+          </p:cNvSpPr>
+          <p:nvPr>
+            <p:ph type="sldNum" sz="quarter" idx="5"/>
+          </p:nvPr>
+        </p:nvSpPr>
+        <p:spPr/>
+        <p:txBody>
+          <a:bodyPr/>
+          <a:lstStyle/>
+          <a:p>
+            <a:fld id="{785ED18C-E05F-4FD2-A782-FC24AC302660}" type="slidenum">
+              <a:rPr lang="es-MX" smtClean="0"/>
+              <a:t>27</a:t>
+            </a:fld>
+            <a:endParaRPr lang="es-MX"/>
+          </a:p>
+        </p:txBody>
+      </p:sp>
+    </p:spTree>
+    <p:extLst>
+      <p:ext uri="{BB962C8B-B14F-4D97-AF65-F5344CB8AC3E}">
+        <p14:creationId xmlns:p14="http://schemas.microsoft.com/office/powerpoint/2010/main" val="3989946677"/>
+      </p:ext>
+    </p:extLst>
+  </p:cSld>
+  <p:clrMapOvr>
+    <a:masterClrMapping/>
+  </p:clrMapOvr>
+</p:notes>
+</file>
+
+<file path=ppt/notesSlides/notesSlide26.xml><?xml version="1.0" encoding="utf-8"?>
+<p:notes xmlns:a="http://schemas.openxmlformats.org/drawingml/2006/main" xmlns:r="http://schemas.openxmlformats.org/officeDocument/2006/relationships" xmlns:p="http://schemas.openxmlformats.org/presentationml/2006/main">
+  <p:cSld>
+    <p:spTree>
+      <p:nvGrpSpPr>
+        <p:cNvPr id="1" name=""/>
+        <p:cNvGrpSpPr/>
+        <p:nvPr/>
+      </p:nvGrpSpPr>
+      <p:grpSpPr>
+        <a:xfrm>
+          <a:off x="0" y="0"/>
+          <a:ext cx="0" cy="0"/>
+          <a:chOff x="0" y="0"/>
+          <a:chExt cx="0" cy="0"/>
+        </a:xfrm>
+      </p:grpSpPr>
+      <p:sp>
+        <p:nvSpPr>
+          <p:cNvPr id="2" name="Marcador de imagen de diapositiva 1"/>
+          <p:cNvSpPr>
+            <a:spLocks noGrp="1" noRot="1" noChangeAspect="1"/>
+          </p:cNvSpPr>
+          <p:nvPr>
+            <p:ph type="sldImg"/>
+          </p:nvPr>
+        </p:nvSpPr>
+        <p:spPr/>
+      </p:sp>
+      <p:sp>
+        <p:nvSpPr>
+          <p:cNvPr id="3" name="Marcador de notas 2"/>
+          <p:cNvSpPr>
+            <a:spLocks noGrp="1"/>
+          </p:cNvSpPr>
+          <p:nvPr>
+            <p:ph type="body" idx="1"/>
+          </p:nvPr>
+        </p:nvSpPr>
+        <p:spPr/>
+        <p:txBody>
+          <a:bodyPr/>
+          <a:lstStyle/>
+          <a:p>
+            <a:r>
+              <a:rPr lang="es-ES" dirty="0"/>
+              <a:t>Abrimos una sesión de consola en esa carpeta</a:t>
+            </a:r>
+          </a:p>
+          <a:p>
+            <a:r>
+              <a:rPr lang="es-ES" dirty="0" err="1"/>
+              <a:t>Cmd</a:t>
+            </a:r>
+            <a:r>
+              <a:rPr lang="es-ES" dirty="0"/>
+              <a:t> </a:t>
+            </a:r>
+            <a:endParaRPr lang="es-MX" dirty="0"/>
+          </a:p>
+        </p:txBody>
+      </p:sp>
+      <p:sp>
+        <p:nvSpPr>
+          <p:cNvPr id="4" name="Marcador de número de diapositiva 3"/>
+          <p:cNvSpPr>
+            <a:spLocks noGrp="1"/>
+          </p:cNvSpPr>
+          <p:nvPr>
+            <p:ph type="sldNum" sz="quarter" idx="5"/>
+          </p:nvPr>
+        </p:nvSpPr>
+        <p:spPr/>
+        <p:txBody>
+          <a:bodyPr/>
+          <a:lstStyle/>
+          <a:p>
+            <a:fld id="{785ED18C-E05F-4FD2-A782-FC24AC302660}" type="slidenum">
+              <a:rPr lang="es-MX" smtClean="0"/>
+              <a:t>28</a:t>
+            </a:fld>
+            <a:endParaRPr lang="es-MX"/>
+          </a:p>
+        </p:txBody>
+      </p:sp>
+    </p:spTree>
+    <p:extLst>
+      <p:ext uri="{BB962C8B-B14F-4D97-AF65-F5344CB8AC3E}">
+        <p14:creationId xmlns:p14="http://schemas.microsoft.com/office/powerpoint/2010/main" val="3504421077"/>
+      </p:ext>
+    </p:extLst>
+  </p:cSld>
+  <p:clrMapOvr>
+    <a:masterClrMapping/>
+  </p:clrMapOvr>
+</p:notes>
+</file>
+
+<file path=ppt/notesSlides/notesSlide27.xml><?xml version="1.0" encoding="utf-8"?>
+<p:notes xmlns:a="http://schemas.openxmlformats.org/drawingml/2006/main" xmlns:r="http://schemas.openxmlformats.org/officeDocument/2006/relationships" xmlns:p="http://schemas.openxmlformats.org/presentationml/2006/main">
+  <p:cSld>
+    <p:spTree>
+      <p:nvGrpSpPr>
+        <p:cNvPr id="1" name=""/>
+        <p:cNvGrpSpPr/>
+        <p:nvPr/>
+      </p:nvGrpSpPr>
+      <p:grpSpPr>
+        <a:xfrm>
+          <a:off x="0" y="0"/>
+          <a:ext cx="0" cy="0"/>
+          <a:chOff x="0" y="0"/>
+          <a:chExt cx="0" cy="0"/>
+        </a:xfrm>
+      </p:grpSpPr>
+      <p:sp>
+        <p:nvSpPr>
+          <p:cNvPr id="2" name="Marcador de imagen de diapositiva 1"/>
+          <p:cNvSpPr>
+            <a:spLocks noGrp="1" noRot="1" noChangeAspect="1"/>
+          </p:cNvSpPr>
+          <p:nvPr>
+            <p:ph type="sldImg"/>
+          </p:nvPr>
+        </p:nvSpPr>
+        <p:spPr/>
+      </p:sp>
+      <p:sp>
+        <p:nvSpPr>
+          <p:cNvPr id="3" name="Marcador de notas 2"/>
+          <p:cNvSpPr>
+            <a:spLocks noGrp="1"/>
+          </p:cNvSpPr>
+          <p:nvPr>
+            <p:ph type="body" idx="1"/>
+          </p:nvPr>
+        </p:nvSpPr>
+        <p:spPr/>
+        <p:txBody>
+          <a:bodyPr/>
+          <a:lstStyle/>
+          <a:p>
+            <a:r>
+              <a:rPr lang="es-ES" dirty="0"/>
+              <a:t>Actualizamos la base de datos con el comando</a:t>
+            </a:r>
+          </a:p>
+          <a:p>
+            <a:r>
+              <a:rPr lang="es-ES" dirty="0" err="1"/>
+              <a:t>Dotnet</a:t>
+            </a:r>
+            <a:r>
+              <a:rPr lang="es-ES" dirty="0"/>
+              <a:t> </a:t>
+            </a:r>
+            <a:r>
+              <a:rPr lang="es-ES" dirty="0" err="1"/>
+              <a:t>ef</a:t>
+            </a:r>
+            <a:r>
+              <a:rPr lang="es-ES" dirty="0"/>
+              <a:t> </a:t>
+            </a:r>
+            <a:r>
+              <a:rPr lang="es-ES" dirty="0" err="1"/>
+              <a:t>database</a:t>
+            </a:r>
+            <a:r>
+              <a:rPr lang="es-ES" dirty="0"/>
+              <a:t> </a:t>
+            </a:r>
+            <a:r>
+              <a:rPr lang="es-ES" dirty="0" err="1"/>
+              <a:t>update</a:t>
+            </a:r>
+            <a:endParaRPr lang="es-MX" dirty="0"/>
+          </a:p>
+        </p:txBody>
+      </p:sp>
+      <p:sp>
+        <p:nvSpPr>
+          <p:cNvPr id="4" name="Marcador de número de diapositiva 3"/>
+          <p:cNvSpPr>
+            <a:spLocks noGrp="1"/>
+          </p:cNvSpPr>
+          <p:nvPr>
+            <p:ph type="sldNum" sz="quarter" idx="5"/>
+          </p:nvPr>
+        </p:nvSpPr>
+        <p:spPr/>
+        <p:txBody>
+          <a:bodyPr/>
+          <a:lstStyle/>
+          <a:p>
+            <a:fld id="{785ED18C-E05F-4FD2-A782-FC24AC302660}" type="slidenum">
+              <a:rPr lang="es-MX" smtClean="0"/>
+              <a:t>29</a:t>
+            </a:fld>
+            <a:endParaRPr lang="es-MX"/>
+          </a:p>
+        </p:txBody>
+      </p:sp>
+    </p:spTree>
+    <p:extLst>
+      <p:ext uri="{BB962C8B-B14F-4D97-AF65-F5344CB8AC3E}">
+        <p14:creationId xmlns:p14="http://schemas.microsoft.com/office/powerpoint/2010/main" val="1474569212"/>
+      </p:ext>
+    </p:extLst>
+  </p:cSld>
+  <p:clrMapOvr>
+    <a:masterClrMapping/>
+  </p:clrMapOvr>
+</p:notes>
+</file>
+
+<file path=ppt/notesSlides/notesSlide28.xml><?xml version="1.0" encoding="utf-8"?>
+<p:notes xmlns:a="http://schemas.openxmlformats.org/drawingml/2006/main" xmlns:r="http://schemas.openxmlformats.org/officeDocument/2006/relationships" xmlns:p="http://schemas.openxmlformats.org/presentationml/2006/main">
+  <p:cSld>
+    <p:spTree>
+      <p:nvGrpSpPr>
+        <p:cNvPr id="1" name=""/>
+        <p:cNvGrpSpPr/>
+        <p:nvPr/>
+      </p:nvGrpSpPr>
+      <p:grpSpPr>
+        <a:xfrm>
+          <a:off x="0" y="0"/>
+          <a:ext cx="0" cy="0"/>
+          <a:chOff x="0" y="0"/>
+          <a:chExt cx="0" cy="0"/>
+        </a:xfrm>
+      </p:grpSpPr>
+      <p:sp>
+        <p:nvSpPr>
+          <p:cNvPr id="2" name="Marcador de imagen de diapositiva 1"/>
+          <p:cNvSpPr>
+            <a:spLocks noGrp="1" noRot="1" noChangeAspect="1"/>
+          </p:cNvSpPr>
+          <p:nvPr>
+            <p:ph type="sldImg"/>
+          </p:nvPr>
+        </p:nvSpPr>
+        <p:spPr/>
+      </p:sp>
+      <p:sp>
+        <p:nvSpPr>
+          <p:cNvPr id="3" name="Marcador de notas 2"/>
+          <p:cNvSpPr>
+            <a:spLocks noGrp="1"/>
+          </p:cNvSpPr>
+          <p:nvPr>
+            <p:ph type="body" idx="1"/>
+          </p:nvPr>
+        </p:nvSpPr>
+        <p:spPr/>
+        <p:txBody>
+          <a:bodyPr/>
+          <a:lstStyle/>
+          <a:p>
+            <a:r>
+              <a:rPr lang="es-ES" dirty="0"/>
+              <a:t>Creamos una migración</a:t>
+            </a:r>
+          </a:p>
+          <a:p>
+            <a:r>
+              <a:rPr lang="es-ES" dirty="0" err="1"/>
+              <a:t>Dotnet</a:t>
+            </a:r>
+            <a:r>
+              <a:rPr lang="es-ES" dirty="0"/>
+              <a:t> </a:t>
+            </a:r>
+            <a:r>
+              <a:rPr lang="es-ES" dirty="0" err="1"/>
+              <a:t>ef</a:t>
+            </a:r>
+            <a:r>
+              <a:rPr lang="es-ES" dirty="0"/>
+              <a:t> </a:t>
+            </a:r>
+            <a:r>
+              <a:rPr lang="es-ES" dirty="0" err="1"/>
+              <a:t>migrations</a:t>
+            </a:r>
+            <a:r>
+              <a:rPr lang="es-ES" dirty="0"/>
+              <a:t> </a:t>
+            </a:r>
+            <a:r>
+              <a:rPr lang="es-ES" dirty="0" err="1"/>
+              <a:t>add</a:t>
+            </a:r>
+            <a:r>
+              <a:rPr lang="es-ES" dirty="0"/>
+              <a:t> iniciamos</a:t>
+            </a:r>
+            <a:endParaRPr lang="es-MX" dirty="0"/>
+          </a:p>
+        </p:txBody>
+      </p:sp>
+      <p:sp>
+        <p:nvSpPr>
+          <p:cNvPr id="4" name="Marcador de número de diapositiva 3"/>
+          <p:cNvSpPr>
+            <a:spLocks noGrp="1"/>
+          </p:cNvSpPr>
+          <p:nvPr>
+            <p:ph type="sldNum" sz="quarter" idx="5"/>
+          </p:nvPr>
+        </p:nvSpPr>
+        <p:spPr/>
+        <p:txBody>
+          <a:bodyPr/>
+          <a:lstStyle/>
+          <a:p>
+            <a:fld id="{785ED18C-E05F-4FD2-A782-FC24AC302660}" type="slidenum">
+              <a:rPr lang="es-MX" smtClean="0"/>
+              <a:t>30</a:t>
+            </a:fld>
+            <a:endParaRPr lang="es-MX"/>
+          </a:p>
+        </p:txBody>
+      </p:sp>
+    </p:spTree>
+    <p:extLst>
+      <p:ext uri="{BB962C8B-B14F-4D97-AF65-F5344CB8AC3E}">
+        <p14:creationId xmlns:p14="http://schemas.microsoft.com/office/powerpoint/2010/main" val="2277987991"/>
+      </p:ext>
+    </p:extLst>
+  </p:cSld>
+  <p:clrMapOvr>
+    <a:masterClrMapping/>
+  </p:clrMapOvr>
+</p:notes>
+</file>
+
+<file path=ppt/notesSlides/notesSlide29.xml><?xml version="1.0" encoding="utf-8"?>
+<p:notes xmlns:a="http://schemas.openxmlformats.org/drawingml/2006/main" xmlns:r="http://schemas.openxmlformats.org/officeDocument/2006/relationships" xmlns:p="http://schemas.openxmlformats.org/presentationml/2006/main">
+  <p:cSld>
+    <p:spTree>
+      <p:nvGrpSpPr>
+        <p:cNvPr id="1" name=""/>
+        <p:cNvGrpSpPr/>
+        <p:nvPr/>
+      </p:nvGrpSpPr>
+      <p:grpSpPr>
+        <a:xfrm>
+          <a:off x="0" y="0"/>
+          <a:ext cx="0" cy="0"/>
+          <a:chOff x="0" y="0"/>
+          <a:chExt cx="0" cy="0"/>
+        </a:xfrm>
+      </p:grpSpPr>
+      <p:sp>
+        <p:nvSpPr>
+          <p:cNvPr id="2" name="Marcador de imagen de diapositiva 1"/>
+          <p:cNvSpPr>
+            <a:spLocks noGrp="1" noRot="1" noChangeAspect="1"/>
+          </p:cNvSpPr>
+          <p:nvPr>
+            <p:ph type="sldImg"/>
+          </p:nvPr>
+        </p:nvSpPr>
+        <p:spPr/>
+      </p:sp>
+      <p:sp>
+        <p:nvSpPr>
+          <p:cNvPr id="3" name="Marcador de notas 2"/>
+          <p:cNvSpPr>
+            <a:spLocks noGrp="1"/>
+          </p:cNvSpPr>
+          <p:nvPr>
+            <p:ph type="body" idx="1"/>
+          </p:nvPr>
+        </p:nvSpPr>
+        <p:spPr/>
+        <p:txBody>
+          <a:bodyPr/>
+          <a:lstStyle/>
+          <a:p>
+            <a:r>
+              <a:rPr lang="es-ES" dirty="0"/>
+              <a:t>Nuevamente le damos para actualizar la base de datos y crear la tabal productos el comando</a:t>
+            </a:r>
+          </a:p>
+          <a:p>
+            <a:pPr marL="0" marR="0" lvl="0" indent="0" algn="l" defTabSz="914400" rtl="0" eaLnBrk="1" fontAlgn="auto" latinLnBrk="0" hangingPunct="1">
+              <a:lnSpc>
+                <a:spcPct val="100000"/>
+              </a:lnSpc>
+              <a:spcBef>
+                <a:spcPts val="0"/>
+              </a:spcBef>
+              <a:spcAft>
+                <a:spcPts val="0"/>
+              </a:spcAft>
+              <a:buClrTx/>
+              <a:buSzTx/>
+              <a:buFontTx/>
+              <a:buNone/>
+              <a:tabLst/>
+              <a:defRPr/>
+            </a:pPr>
+            <a:r>
+              <a:rPr lang="es-ES" dirty="0" err="1"/>
+              <a:t>Dotnet</a:t>
+            </a:r>
+            <a:r>
+              <a:rPr lang="es-ES" dirty="0"/>
+              <a:t> </a:t>
+            </a:r>
+            <a:r>
+              <a:rPr lang="es-ES" dirty="0" err="1"/>
+              <a:t>ef</a:t>
+            </a:r>
+            <a:r>
+              <a:rPr lang="es-ES" dirty="0"/>
+              <a:t> </a:t>
+            </a:r>
+            <a:r>
+              <a:rPr lang="es-ES" dirty="0" err="1"/>
+              <a:t>database</a:t>
+            </a:r>
+            <a:r>
+              <a:rPr lang="es-ES" dirty="0"/>
+              <a:t> </a:t>
+            </a:r>
+            <a:r>
+              <a:rPr lang="es-ES" dirty="0" err="1"/>
+              <a:t>update</a:t>
+            </a:r>
+            <a:endParaRPr lang="es-ES" dirty="0"/>
+          </a:p>
+          <a:p>
+            <a:pPr marL="0" marR="0" lvl="0" indent="0" algn="l" defTabSz="914400" rtl="0" eaLnBrk="1" fontAlgn="auto" latinLnBrk="0" hangingPunct="1">
+              <a:lnSpc>
+                <a:spcPct val="100000"/>
+              </a:lnSpc>
+              <a:spcBef>
+                <a:spcPts val="0"/>
+              </a:spcBef>
+              <a:spcAft>
+                <a:spcPts val="0"/>
+              </a:spcAft>
+              <a:buClrTx/>
+              <a:buSzTx/>
+              <a:buFontTx/>
+              <a:buNone/>
+              <a:tabLst/>
+              <a:defRPr/>
+            </a:pPr>
+            <a:r>
+              <a:rPr lang="es-ES" dirty="0" err="1"/>
+              <a:t>Asi</a:t>
+            </a:r>
+            <a:r>
+              <a:rPr lang="es-ES" dirty="0"/>
+              <a:t> como pregunto miguel dos veces</a:t>
+            </a:r>
+            <a:endParaRPr lang="es-MX" dirty="0"/>
+          </a:p>
+          <a:p>
+            <a:endParaRPr lang="es-MX" dirty="0"/>
+          </a:p>
+        </p:txBody>
+      </p:sp>
+      <p:sp>
+        <p:nvSpPr>
+          <p:cNvPr id="4" name="Marcador de número de diapositiva 3"/>
+          <p:cNvSpPr>
+            <a:spLocks noGrp="1"/>
+          </p:cNvSpPr>
+          <p:nvPr>
+            <p:ph type="sldNum" sz="quarter" idx="5"/>
+          </p:nvPr>
+        </p:nvSpPr>
+        <p:spPr/>
+        <p:txBody>
+          <a:bodyPr/>
+          <a:lstStyle/>
+          <a:p>
+            <a:fld id="{785ED18C-E05F-4FD2-A782-FC24AC302660}" type="slidenum">
+              <a:rPr lang="es-MX" smtClean="0"/>
+              <a:t>31</a:t>
+            </a:fld>
+            <a:endParaRPr lang="es-MX"/>
+          </a:p>
+        </p:txBody>
+      </p:sp>
+    </p:spTree>
+    <p:extLst>
+      <p:ext uri="{BB962C8B-B14F-4D97-AF65-F5344CB8AC3E}">
+        <p14:creationId xmlns:p14="http://schemas.microsoft.com/office/powerpoint/2010/main" val="4250643464"/>
+      </p:ext>
+    </p:extLst>
+  </p:cSld>
+  <p:clrMapOvr>
+    <a:masterClrMapping/>
+  </p:clrMapOvr>
+</p:notes>
+</file>
+
 <file path=ppt/notesSlides/notesSlide3.xml><?xml version="1.0" encoding="utf-8"?>
 <p:notes xmlns:a="http://schemas.openxmlformats.org/drawingml/2006/main" xmlns:r="http://schemas.openxmlformats.org/officeDocument/2006/relationships" xmlns:p="http://schemas.openxmlformats.org/presentationml/2006/main">
   <p:cSld>
@@ -1889,6 +3685,1366 @@
     <p:extLst>
       <p:ext uri="{BB962C8B-B14F-4D97-AF65-F5344CB8AC3E}">
         <p14:creationId xmlns:p14="http://schemas.microsoft.com/office/powerpoint/2010/main" val="1049500418"/>
+      </p:ext>
+    </p:extLst>
+  </p:cSld>
+  <p:clrMapOvr>
+    <a:masterClrMapping/>
+  </p:clrMapOvr>
+</p:notes>
+</file>
+
+<file path=ppt/notesSlides/notesSlide30.xml><?xml version="1.0" encoding="utf-8"?>
+<p:notes xmlns:a="http://schemas.openxmlformats.org/drawingml/2006/main" xmlns:r="http://schemas.openxmlformats.org/officeDocument/2006/relationships" xmlns:p="http://schemas.openxmlformats.org/presentationml/2006/main">
+  <p:cSld>
+    <p:spTree>
+      <p:nvGrpSpPr>
+        <p:cNvPr id="1" name=""/>
+        <p:cNvGrpSpPr/>
+        <p:nvPr/>
+      </p:nvGrpSpPr>
+      <p:grpSpPr>
+        <a:xfrm>
+          <a:off x="0" y="0"/>
+          <a:ext cx="0" cy="0"/>
+          <a:chOff x="0" y="0"/>
+          <a:chExt cx="0" cy="0"/>
+        </a:xfrm>
+      </p:grpSpPr>
+      <p:sp>
+        <p:nvSpPr>
+          <p:cNvPr id="2" name="Marcador de imagen de diapositiva 1"/>
+          <p:cNvSpPr>
+            <a:spLocks noGrp="1" noRot="1" noChangeAspect="1"/>
+          </p:cNvSpPr>
+          <p:nvPr>
+            <p:ph type="sldImg"/>
+          </p:nvPr>
+        </p:nvSpPr>
+        <p:spPr/>
+      </p:sp>
+      <p:sp>
+        <p:nvSpPr>
+          <p:cNvPr id="3" name="Marcador de notas 2"/>
+          <p:cNvSpPr>
+            <a:spLocks noGrp="1"/>
+          </p:cNvSpPr>
+          <p:nvPr>
+            <p:ph type="body" idx="1"/>
+          </p:nvPr>
+        </p:nvSpPr>
+        <p:spPr/>
+        <p:txBody>
+          <a:bodyPr/>
+          <a:lstStyle/>
+          <a:p>
+            <a:r>
+              <a:rPr lang="es-ES" dirty="0"/>
+              <a:t>Verificar que se haya creado la base de datos con la tabla </a:t>
+            </a:r>
+            <a:r>
+              <a:rPr lang="es-ES" dirty="0" err="1"/>
+              <a:t>products</a:t>
+            </a:r>
+            <a:r>
+              <a:rPr lang="es-ES" dirty="0"/>
+              <a:t> y la tabla </a:t>
+            </a:r>
+            <a:r>
+              <a:rPr lang="es-ES" dirty="0" err="1"/>
+              <a:t>migrations</a:t>
+            </a:r>
+            <a:endParaRPr lang="es-MX" dirty="0"/>
+          </a:p>
+        </p:txBody>
+      </p:sp>
+      <p:sp>
+        <p:nvSpPr>
+          <p:cNvPr id="4" name="Marcador de número de diapositiva 3"/>
+          <p:cNvSpPr>
+            <a:spLocks noGrp="1"/>
+          </p:cNvSpPr>
+          <p:nvPr>
+            <p:ph type="sldNum" sz="quarter" idx="5"/>
+          </p:nvPr>
+        </p:nvSpPr>
+        <p:spPr/>
+        <p:txBody>
+          <a:bodyPr/>
+          <a:lstStyle/>
+          <a:p>
+            <a:fld id="{785ED18C-E05F-4FD2-A782-FC24AC302660}" type="slidenum">
+              <a:rPr lang="es-MX" smtClean="0"/>
+              <a:t>32</a:t>
+            </a:fld>
+            <a:endParaRPr lang="es-MX"/>
+          </a:p>
+        </p:txBody>
+      </p:sp>
+    </p:spTree>
+    <p:extLst>
+      <p:ext uri="{BB962C8B-B14F-4D97-AF65-F5344CB8AC3E}">
+        <p14:creationId xmlns:p14="http://schemas.microsoft.com/office/powerpoint/2010/main" val="2377538927"/>
+      </p:ext>
+    </p:extLst>
+  </p:cSld>
+  <p:clrMapOvr>
+    <a:masterClrMapping/>
+  </p:clrMapOvr>
+</p:notes>
+</file>
+
+<file path=ppt/notesSlides/notesSlide31.xml><?xml version="1.0" encoding="utf-8"?>
+<p:notes xmlns:a="http://schemas.openxmlformats.org/drawingml/2006/main" xmlns:r="http://schemas.openxmlformats.org/officeDocument/2006/relationships" xmlns:p="http://schemas.openxmlformats.org/presentationml/2006/main">
+  <p:cSld>
+    <p:spTree>
+      <p:nvGrpSpPr>
+        <p:cNvPr id="1" name=""/>
+        <p:cNvGrpSpPr/>
+        <p:nvPr/>
+      </p:nvGrpSpPr>
+      <p:grpSpPr>
+        <a:xfrm>
+          <a:off x="0" y="0"/>
+          <a:ext cx="0" cy="0"/>
+          <a:chOff x="0" y="0"/>
+          <a:chExt cx="0" cy="0"/>
+        </a:xfrm>
+      </p:grpSpPr>
+      <p:sp>
+        <p:nvSpPr>
+          <p:cNvPr id="2" name="Marcador de imagen de diapositiva 1"/>
+          <p:cNvSpPr>
+            <a:spLocks noGrp="1" noRot="1" noChangeAspect="1"/>
+          </p:cNvSpPr>
+          <p:nvPr>
+            <p:ph type="sldImg"/>
+          </p:nvPr>
+        </p:nvSpPr>
+        <p:spPr/>
+      </p:sp>
+      <p:sp>
+        <p:nvSpPr>
+          <p:cNvPr id="3" name="Marcador de notas 2"/>
+          <p:cNvSpPr>
+            <a:spLocks noGrp="1"/>
+          </p:cNvSpPr>
+          <p:nvPr>
+            <p:ph type="body" idx="1"/>
+          </p:nvPr>
+        </p:nvSpPr>
+        <p:spPr/>
+        <p:txBody>
+          <a:bodyPr/>
+          <a:lstStyle/>
+          <a:p>
+            <a:endParaRPr lang="es-ES" dirty="0"/>
+          </a:p>
+          <a:p>
+            <a:r>
+              <a:rPr lang="es-ES" dirty="0"/>
+              <a:t>En la carpeta </a:t>
+            </a:r>
+            <a:r>
+              <a:rPr lang="es-ES" dirty="0" err="1"/>
+              <a:t>controller</a:t>
+            </a:r>
+            <a:r>
+              <a:rPr lang="es-ES" dirty="0"/>
+              <a:t> dar botón derecho y seleccionar la opción</a:t>
+            </a:r>
+            <a:endParaRPr lang="es-MX" dirty="0"/>
+          </a:p>
+          <a:p>
+            <a:endParaRPr lang="es-MX" dirty="0"/>
+          </a:p>
+        </p:txBody>
+      </p:sp>
+      <p:sp>
+        <p:nvSpPr>
+          <p:cNvPr id="4" name="Marcador de número de diapositiva 3"/>
+          <p:cNvSpPr>
+            <a:spLocks noGrp="1"/>
+          </p:cNvSpPr>
+          <p:nvPr>
+            <p:ph type="sldNum" sz="quarter" idx="5"/>
+          </p:nvPr>
+        </p:nvSpPr>
+        <p:spPr/>
+        <p:txBody>
+          <a:bodyPr/>
+          <a:lstStyle/>
+          <a:p>
+            <a:fld id="{785ED18C-E05F-4FD2-A782-FC24AC302660}" type="slidenum">
+              <a:rPr lang="es-MX" smtClean="0"/>
+              <a:t>33</a:t>
+            </a:fld>
+            <a:endParaRPr lang="es-MX"/>
+          </a:p>
+        </p:txBody>
+      </p:sp>
+    </p:spTree>
+    <p:extLst>
+      <p:ext uri="{BB962C8B-B14F-4D97-AF65-F5344CB8AC3E}">
+        <p14:creationId xmlns:p14="http://schemas.microsoft.com/office/powerpoint/2010/main" val="2333307833"/>
+      </p:ext>
+    </p:extLst>
+  </p:cSld>
+  <p:clrMapOvr>
+    <a:masterClrMapping/>
+  </p:clrMapOvr>
+</p:notes>
+</file>
+
+<file path=ppt/notesSlides/notesSlide32.xml><?xml version="1.0" encoding="utf-8"?>
+<p:notes xmlns:a="http://schemas.openxmlformats.org/drawingml/2006/main" xmlns:r="http://schemas.openxmlformats.org/officeDocument/2006/relationships" xmlns:p="http://schemas.openxmlformats.org/presentationml/2006/main">
+  <p:cSld>
+    <p:spTree>
+      <p:nvGrpSpPr>
+        <p:cNvPr id="1" name=""/>
+        <p:cNvGrpSpPr/>
+        <p:nvPr/>
+      </p:nvGrpSpPr>
+      <p:grpSpPr>
+        <a:xfrm>
+          <a:off x="0" y="0"/>
+          <a:ext cx="0" cy="0"/>
+          <a:chOff x="0" y="0"/>
+          <a:chExt cx="0" cy="0"/>
+        </a:xfrm>
+      </p:grpSpPr>
+      <p:sp>
+        <p:nvSpPr>
+          <p:cNvPr id="2" name="Marcador de imagen de diapositiva 1"/>
+          <p:cNvSpPr>
+            <a:spLocks noGrp="1" noRot="1" noChangeAspect="1"/>
+          </p:cNvSpPr>
+          <p:nvPr>
+            <p:ph type="sldImg"/>
+          </p:nvPr>
+        </p:nvSpPr>
+        <p:spPr/>
+      </p:sp>
+      <p:sp>
+        <p:nvSpPr>
+          <p:cNvPr id="3" name="Marcador de notas 2"/>
+          <p:cNvSpPr>
+            <a:spLocks noGrp="1"/>
+          </p:cNvSpPr>
+          <p:nvPr>
+            <p:ph type="body" idx="1"/>
+          </p:nvPr>
+        </p:nvSpPr>
+        <p:spPr/>
+        <p:txBody>
+          <a:bodyPr/>
+          <a:lstStyle/>
+          <a:p>
+            <a:r>
+              <a:rPr lang="es-ES" dirty="0"/>
+              <a:t>Creamos el controlador de productos con sus vistas</a:t>
+            </a:r>
+            <a:endParaRPr lang="es-MX" dirty="0"/>
+          </a:p>
+        </p:txBody>
+      </p:sp>
+      <p:sp>
+        <p:nvSpPr>
+          <p:cNvPr id="4" name="Marcador de número de diapositiva 3"/>
+          <p:cNvSpPr>
+            <a:spLocks noGrp="1"/>
+          </p:cNvSpPr>
+          <p:nvPr>
+            <p:ph type="sldNum" sz="quarter" idx="5"/>
+          </p:nvPr>
+        </p:nvSpPr>
+        <p:spPr/>
+        <p:txBody>
+          <a:bodyPr/>
+          <a:lstStyle/>
+          <a:p>
+            <a:fld id="{785ED18C-E05F-4FD2-A782-FC24AC302660}" type="slidenum">
+              <a:rPr lang="es-MX" smtClean="0"/>
+              <a:t>34</a:t>
+            </a:fld>
+            <a:endParaRPr lang="es-MX"/>
+          </a:p>
+        </p:txBody>
+      </p:sp>
+    </p:spTree>
+    <p:extLst>
+      <p:ext uri="{BB962C8B-B14F-4D97-AF65-F5344CB8AC3E}">
+        <p14:creationId xmlns:p14="http://schemas.microsoft.com/office/powerpoint/2010/main" val="2860390253"/>
+      </p:ext>
+    </p:extLst>
+  </p:cSld>
+  <p:clrMapOvr>
+    <a:masterClrMapping/>
+  </p:clrMapOvr>
+</p:notes>
+</file>
+
+<file path=ppt/notesSlides/notesSlide33.xml><?xml version="1.0" encoding="utf-8"?>
+<p:notes xmlns:a="http://schemas.openxmlformats.org/drawingml/2006/main" xmlns:r="http://schemas.openxmlformats.org/officeDocument/2006/relationships" xmlns:p="http://schemas.openxmlformats.org/presentationml/2006/main">
+  <p:cSld>
+    <p:spTree>
+      <p:nvGrpSpPr>
+        <p:cNvPr id="1" name=""/>
+        <p:cNvGrpSpPr/>
+        <p:nvPr/>
+      </p:nvGrpSpPr>
+      <p:grpSpPr>
+        <a:xfrm>
+          <a:off x="0" y="0"/>
+          <a:ext cx="0" cy="0"/>
+          <a:chOff x="0" y="0"/>
+          <a:chExt cx="0" cy="0"/>
+        </a:xfrm>
+      </p:grpSpPr>
+      <p:sp>
+        <p:nvSpPr>
+          <p:cNvPr id="2" name="Marcador de imagen de diapositiva 1"/>
+          <p:cNvSpPr>
+            <a:spLocks noGrp="1" noRot="1" noChangeAspect="1"/>
+          </p:cNvSpPr>
+          <p:nvPr>
+            <p:ph type="sldImg"/>
+          </p:nvPr>
+        </p:nvSpPr>
+        <p:spPr/>
+      </p:sp>
+      <p:sp>
+        <p:nvSpPr>
+          <p:cNvPr id="3" name="Marcador de notas 2"/>
+          <p:cNvSpPr>
+            <a:spLocks noGrp="1"/>
+          </p:cNvSpPr>
+          <p:nvPr>
+            <p:ph type="body" idx="1"/>
+          </p:nvPr>
+        </p:nvSpPr>
+        <p:spPr/>
+        <p:txBody>
+          <a:bodyPr/>
+          <a:lstStyle/>
+          <a:p>
+            <a:r>
+              <a:rPr lang="es-ES" dirty="0"/>
+              <a:t>En el cuadro de dialogo </a:t>
+            </a:r>
+            <a:r>
+              <a:rPr lang="es-ES" dirty="0" err="1"/>
+              <a:t>selccionar</a:t>
+            </a:r>
+            <a:r>
+              <a:rPr lang="es-ES" dirty="0"/>
+              <a:t> la clase producto y el </a:t>
+            </a:r>
+            <a:r>
+              <a:rPr lang="es-ES" dirty="0" err="1"/>
+              <a:t>datacontext</a:t>
+            </a:r>
+            <a:r>
+              <a:rPr lang="es-ES" dirty="0"/>
+              <a:t> y presionar el botón agregar</a:t>
+            </a:r>
+            <a:endParaRPr lang="es-MX" dirty="0"/>
+          </a:p>
+        </p:txBody>
+      </p:sp>
+      <p:sp>
+        <p:nvSpPr>
+          <p:cNvPr id="4" name="Marcador de número de diapositiva 3"/>
+          <p:cNvSpPr>
+            <a:spLocks noGrp="1"/>
+          </p:cNvSpPr>
+          <p:nvPr>
+            <p:ph type="sldNum" sz="quarter" idx="5"/>
+          </p:nvPr>
+        </p:nvSpPr>
+        <p:spPr/>
+        <p:txBody>
+          <a:bodyPr/>
+          <a:lstStyle/>
+          <a:p>
+            <a:fld id="{785ED18C-E05F-4FD2-A782-FC24AC302660}" type="slidenum">
+              <a:rPr lang="es-MX" smtClean="0"/>
+              <a:t>35</a:t>
+            </a:fld>
+            <a:endParaRPr lang="es-MX"/>
+          </a:p>
+        </p:txBody>
+      </p:sp>
+    </p:spTree>
+    <p:extLst>
+      <p:ext uri="{BB962C8B-B14F-4D97-AF65-F5344CB8AC3E}">
+        <p14:creationId xmlns:p14="http://schemas.microsoft.com/office/powerpoint/2010/main" val="1301307303"/>
+      </p:ext>
+    </p:extLst>
+  </p:cSld>
+  <p:clrMapOvr>
+    <a:masterClrMapping/>
+  </p:clrMapOvr>
+</p:notes>
+</file>
+
+<file path=ppt/notesSlides/notesSlide34.xml><?xml version="1.0" encoding="utf-8"?>
+<p:notes xmlns:a="http://schemas.openxmlformats.org/drawingml/2006/main" xmlns:r="http://schemas.openxmlformats.org/officeDocument/2006/relationships" xmlns:p="http://schemas.openxmlformats.org/presentationml/2006/main">
+  <p:cSld>
+    <p:spTree>
+      <p:nvGrpSpPr>
+        <p:cNvPr id="1" name=""/>
+        <p:cNvGrpSpPr/>
+        <p:nvPr/>
+      </p:nvGrpSpPr>
+      <p:grpSpPr>
+        <a:xfrm>
+          <a:off x="0" y="0"/>
+          <a:ext cx="0" cy="0"/>
+          <a:chOff x="0" y="0"/>
+          <a:chExt cx="0" cy="0"/>
+        </a:xfrm>
+      </p:grpSpPr>
+      <p:sp>
+        <p:nvSpPr>
+          <p:cNvPr id="2" name="Marcador de imagen de diapositiva 1"/>
+          <p:cNvSpPr>
+            <a:spLocks noGrp="1" noRot="1" noChangeAspect="1"/>
+          </p:cNvSpPr>
+          <p:nvPr>
+            <p:ph type="sldImg"/>
+          </p:nvPr>
+        </p:nvSpPr>
+        <p:spPr/>
+      </p:sp>
+      <p:sp>
+        <p:nvSpPr>
+          <p:cNvPr id="3" name="Marcador de notas 2"/>
+          <p:cNvSpPr>
+            <a:spLocks noGrp="1"/>
+          </p:cNvSpPr>
+          <p:nvPr>
+            <p:ph type="body" idx="1"/>
+          </p:nvPr>
+        </p:nvSpPr>
+        <p:spPr/>
+        <p:txBody>
+          <a:bodyPr/>
+          <a:lstStyle/>
+          <a:p>
+            <a:r>
+              <a:rPr lang="es-ES" dirty="0" err="1"/>
+              <a:t>Verficiar</a:t>
+            </a:r>
+            <a:r>
+              <a:rPr lang="es-ES" dirty="0"/>
+              <a:t> que se haya creado el controlador de producto con sus vistas</a:t>
+            </a:r>
+            <a:endParaRPr lang="es-MX" dirty="0"/>
+          </a:p>
+        </p:txBody>
+      </p:sp>
+      <p:sp>
+        <p:nvSpPr>
+          <p:cNvPr id="4" name="Marcador de número de diapositiva 3"/>
+          <p:cNvSpPr>
+            <a:spLocks noGrp="1"/>
+          </p:cNvSpPr>
+          <p:nvPr>
+            <p:ph type="sldNum" sz="quarter" idx="5"/>
+          </p:nvPr>
+        </p:nvSpPr>
+        <p:spPr/>
+        <p:txBody>
+          <a:bodyPr/>
+          <a:lstStyle/>
+          <a:p>
+            <a:fld id="{785ED18C-E05F-4FD2-A782-FC24AC302660}" type="slidenum">
+              <a:rPr lang="es-MX" smtClean="0"/>
+              <a:t>36</a:t>
+            </a:fld>
+            <a:endParaRPr lang="es-MX"/>
+          </a:p>
+        </p:txBody>
+      </p:sp>
+    </p:spTree>
+    <p:extLst>
+      <p:ext uri="{BB962C8B-B14F-4D97-AF65-F5344CB8AC3E}">
+        <p14:creationId xmlns:p14="http://schemas.microsoft.com/office/powerpoint/2010/main" val="3920173840"/>
+      </p:ext>
+    </p:extLst>
+  </p:cSld>
+  <p:clrMapOvr>
+    <a:masterClrMapping/>
+  </p:clrMapOvr>
+</p:notes>
+</file>
+
+<file path=ppt/notesSlides/notesSlide35.xml><?xml version="1.0" encoding="utf-8"?>
+<p:notes xmlns:a="http://schemas.openxmlformats.org/drawingml/2006/main" xmlns:r="http://schemas.openxmlformats.org/officeDocument/2006/relationships" xmlns:p="http://schemas.openxmlformats.org/presentationml/2006/main">
+  <p:cSld>
+    <p:spTree>
+      <p:nvGrpSpPr>
+        <p:cNvPr id="1" name=""/>
+        <p:cNvGrpSpPr/>
+        <p:nvPr/>
+      </p:nvGrpSpPr>
+      <p:grpSpPr>
+        <a:xfrm>
+          <a:off x="0" y="0"/>
+          <a:ext cx="0" cy="0"/>
+          <a:chOff x="0" y="0"/>
+          <a:chExt cx="0" cy="0"/>
+        </a:xfrm>
+      </p:grpSpPr>
+      <p:sp>
+        <p:nvSpPr>
+          <p:cNvPr id="2" name="Marcador de imagen de diapositiva 1"/>
+          <p:cNvSpPr>
+            <a:spLocks noGrp="1" noRot="1" noChangeAspect="1"/>
+          </p:cNvSpPr>
+          <p:nvPr>
+            <p:ph type="sldImg"/>
+          </p:nvPr>
+        </p:nvSpPr>
+        <p:spPr/>
+      </p:sp>
+      <p:sp>
+        <p:nvSpPr>
+          <p:cNvPr id="3" name="Marcador de notas 2"/>
+          <p:cNvSpPr>
+            <a:spLocks noGrp="1"/>
+          </p:cNvSpPr>
+          <p:nvPr>
+            <p:ph type="body" idx="1"/>
+          </p:nvPr>
+        </p:nvSpPr>
+        <p:spPr/>
+        <p:txBody>
+          <a:bodyPr/>
+          <a:lstStyle/>
+          <a:p>
+            <a:r>
+              <a:rPr lang="es-ES" dirty="0"/>
+              <a:t>Modificar el archivo </a:t>
+            </a:r>
+            <a:r>
+              <a:rPr lang="es-ES" dirty="0" err="1"/>
+              <a:t>Layout</a:t>
+            </a:r>
+            <a:r>
+              <a:rPr lang="es-ES" dirty="0"/>
+              <a:t> en la carpeta View para agregar la opción en el menú</a:t>
+            </a:r>
+          </a:p>
+          <a:p>
+            <a:endParaRPr lang="es-MX" sz="1200" kern="1200" dirty="0">
+              <a:solidFill>
+                <a:schemeClr val="tx1"/>
+              </a:solidFill>
+              <a:latin typeface="+mn-lt"/>
+              <a:ea typeface="+mn-ea"/>
+              <a:cs typeface="+mn-cs"/>
+            </a:endParaRPr>
+          </a:p>
+          <a:p>
+            <a:r>
+              <a:rPr lang="en-US" sz="1200" kern="1200" dirty="0">
+                <a:solidFill>
+                  <a:schemeClr val="tx1"/>
+                </a:solidFill>
+                <a:latin typeface="+mn-lt"/>
+                <a:ea typeface="+mn-ea"/>
+                <a:cs typeface="+mn-cs"/>
+              </a:rPr>
+              <a:t>                    &lt;li&gt;&lt;</a:t>
+            </a:r>
+            <a:r>
+              <a:rPr lang="en-US" sz="1200" b="1" kern="1200" dirty="0">
+                <a:solidFill>
+                  <a:schemeClr val="tx1"/>
+                </a:solidFill>
+                <a:latin typeface="+mn-lt"/>
+                <a:ea typeface="+mn-ea"/>
+                <a:cs typeface="+mn-cs"/>
+              </a:rPr>
+              <a:t>a</a:t>
+            </a:r>
+            <a:r>
+              <a:rPr lang="en-US" sz="1200" b="0" kern="1200" dirty="0">
+                <a:solidFill>
+                  <a:schemeClr val="tx1"/>
+                </a:solidFill>
+                <a:latin typeface="+mn-lt"/>
+                <a:ea typeface="+mn-ea"/>
+                <a:cs typeface="+mn-cs"/>
+              </a:rPr>
+              <a:t> </a:t>
+            </a:r>
+            <a:r>
+              <a:rPr lang="en-US" sz="1200" b="1" kern="1200" dirty="0">
+                <a:solidFill>
+                  <a:schemeClr val="tx1"/>
+                </a:solidFill>
+                <a:latin typeface="+mn-lt"/>
+                <a:ea typeface="+mn-ea"/>
+                <a:cs typeface="+mn-cs"/>
+              </a:rPr>
+              <a:t>asp-area</a:t>
+            </a:r>
+            <a:r>
+              <a:rPr lang="en-US" sz="1200" b="0" kern="1200" dirty="0">
+                <a:solidFill>
+                  <a:schemeClr val="tx1"/>
+                </a:solidFill>
+                <a:latin typeface="+mn-lt"/>
+                <a:ea typeface="+mn-ea"/>
+                <a:cs typeface="+mn-cs"/>
+              </a:rPr>
+              <a:t>="" </a:t>
+            </a:r>
+            <a:r>
+              <a:rPr lang="en-US" sz="1200" b="1" kern="1200" dirty="0">
+                <a:solidFill>
+                  <a:schemeClr val="tx1"/>
+                </a:solidFill>
+                <a:latin typeface="+mn-lt"/>
+                <a:ea typeface="+mn-ea"/>
+                <a:cs typeface="+mn-cs"/>
+              </a:rPr>
+              <a:t>asp-controller</a:t>
+            </a:r>
+            <a:r>
+              <a:rPr lang="en-US" sz="1200" b="0" kern="1200" dirty="0">
+                <a:solidFill>
+                  <a:schemeClr val="tx1"/>
+                </a:solidFill>
+                <a:latin typeface="+mn-lt"/>
+                <a:ea typeface="+mn-ea"/>
+                <a:cs typeface="+mn-cs"/>
+              </a:rPr>
+              <a:t>="Home" </a:t>
+            </a:r>
+            <a:r>
+              <a:rPr lang="en-US" sz="1200" b="1" kern="1200" dirty="0">
+                <a:solidFill>
+                  <a:schemeClr val="tx1"/>
+                </a:solidFill>
+                <a:latin typeface="+mn-lt"/>
+                <a:ea typeface="+mn-ea"/>
+                <a:cs typeface="+mn-cs"/>
+              </a:rPr>
+              <a:t>asp-action</a:t>
+            </a:r>
+            <a:r>
+              <a:rPr lang="en-US" sz="1200" b="0" kern="1200" dirty="0">
+                <a:solidFill>
+                  <a:schemeClr val="tx1"/>
+                </a:solidFill>
+                <a:latin typeface="+mn-lt"/>
+                <a:ea typeface="+mn-ea"/>
+                <a:cs typeface="+mn-cs"/>
+              </a:rPr>
+              <a:t>="Index"&gt;Home&lt;/</a:t>
+            </a:r>
+            <a:r>
+              <a:rPr lang="en-US" sz="1200" b="1" kern="1200" dirty="0">
+                <a:solidFill>
+                  <a:schemeClr val="tx1"/>
+                </a:solidFill>
+                <a:latin typeface="+mn-lt"/>
+                <a:ea typeface="+mn-ea"/>
+                <a:cs typeface="+mn-cs"/>
+              </a:rPr>
+              <a:t>a</a:t>
+            </a:r>
+            <a:r>
+              <a:rPr lang="en-US" sz="1200" b="0" kern="1200" dirty="0">
+                <a:solidFill>
+                  <a:schemeClr val="tx1"/>
+                </a:solidFill>
+                <a:latin typeface="+mn-lt"/>
+                <a:ea typeface="+mn-ea"/>
+                <a:cs typeface="+mn-cs"/>
+              </a:rPr>
+              <a:t>&gt;&lt;/li&gt;</a:t>
+            </a:r>
+          </a:p>
+          <a:p>
+            <a:r>
+              <a:rPr lang="en-US" sz="1200" b="0" kern="1200" dirty="0">
+                <a:solidFill>
+                  <a:schemeClr val="tx1"/>
+                </a:solidFill>
+                <a:latin typeface="+mn-lt"/>
+                <a:ea typeface="+mn-ea"/>
+                <a:cs typeface="+mn-cs"/>
+              </a:rPr>
+              <a:t>                    &lt;li&gt;&lt;</a:t>
+            </a:r>
+            <a:r>
+              <a:rPr lang="en-US" sz="1200" b="1" kern="1200" dirty="0">
+                <a:solidFill>
+                  <a:schemeClr val="tx1"/>
+                </a:solidFill>
+                <a:latin typeface="+mn-lt"/>
+                <a:ea typeface="+mn-ea"/>
+                <a:cs typeface="+mn-cs"/>
+              </a:rPr>
+              <a:t>a</a:t>
+            </a:r>
+            <a:r>
+              <a:rPr lang="en-US" sz="1200" b="0" kern="1200" dirty="0">
+                <a:solidFill>
+                  <a:schemeClr val="tx1"/>
+                </a:solidFill>
+                <a:latin typeface="+mn-lt"/>
+                <a:ea typeface="+mn-ea"/>
+                <a:cs typeface="+mn-cs"/>
+              </a:rPr>
+              <a:t> </a:t>
+            </a:r>
+            <a:r>
+              <a:rPr lang="en-US" sz="1200" b="1" kern="1200" dirty="0">
+                <a:solidFill>
+                  <a:schemeClr val="tx1"/>
+                </a:solidFill>
+                <a:latin typeface="+mn-lt"/>
+                <a:ea typeface="+mn-ea"/>
+                <a:cs typeface="+mn-cs"/>
+              </a:rPr>
+              <a:t>asp-area</a:t>
+            </a:r>
+            <a:r>
+              <a:rPr lang="en-US" sz="1200" b="0" kern="1200" dirty="0">
+                <a:solidFill>
+                  <a:schemeClr val="tx1"/>
+                </a:solidFill>
+                <a:latin typeface="+mn-lt"/>
+                <a:ea typeface="+mn-ea"/>
+                <a:cs typeface="+mn-cs"/>
+              </a:rPr>
+              <a:t>="" </a:t>
+            </a:r>
+            <a:r>
+              <a:rPr lang="en-US" sz="1200" b="1" kern="1200" dirty="0">
+                <a:solidFill>
+                  <a:schemeClr val="tx1"/>
+                </a:solidFill>
+                <a:latin typeface="+mn-lt"/>
+                <a:ea typeface="+mn-ea"/>
+                <a:cs typeface="+mn-cs"/>
+              </a:rPr>
+              <a:t>asp-controller</a:t>
+            </a:r>
+            <a:r>
+              <a:rPr lang="en-US" sz="1200" b="0" kern="1200" dirty="0">
+                <a:solidFill>
+                  <a:schemeClr val="tx1"/>
+                </a:solidFill>
+                <a:latin typeface="+mn-lt"/>
+                <a:ea typeface="+mn-ea"/>
+                <a:cs typeface="+mn-cs"/>
+              </a:rPr>
+              <a:t>="Home" </a:t>
+            </a:r>
+            <a:r>
+              <a:rPr lang="en-US" sz="1200" b="1" kern="1200" dirty="0">
+                <a:solidFill>
+                  <a:schemeClr val="tx1"/>
+                </a:solidFill>
+                <a:latin typeface="+mn-lt"/>
+                <a:ea typeface="+mn-ea"/>
+                <a:cs typeface="+mn-cs"/>
+              </a:rPr>
+              <a:t>asp-action</a:t>
+            </a:r>
+            <a:r>
+              <a:rPr lang="en-US" sz="1200" b="0" kern="1200" dirty="0">
+                <a:solidFill>
+                  <a:schemeClr val="tx1"/>
+                </a:solidFill>
+                <a:latin typeface="+mn-lt"/>
+                <a:ea typeface="+mn-ea"/>
+                <a:cs typeface="+mn-cs"/>
+              </a:rPr>
+              <a:t>="About"&gt;About&lt;/</a:t>
+            </a:r>
+            <a:r>
+              <a:rPr lang="en-US" sz="1200" b="1" kern="1200" dirty="0">
+                <a:solidFill>
+                  <a:schemeClr val="tx1"/>
+                </a:solidFill>
+                <a:latin typeface="+mn-lt"/>
+                <a:ea typeface="+mn-ea"/>
+                <a:cs typeface="+mn-cs"/>
+              </a:rPr>
+              <a:t>a</a:t>
+            </a:r>
+            <a:r>
+              <a:rPr lang="en-US" sz="1200" b="0" kern="1200" dirty="0">
+                <a:solidFill>
+                  <a:schemeClr val="tx1"/>
+                </a:solidFill>
+                <a:latin typeface="+mn-lt"/>
+                <a:ea typeface="+mn-ea"/>
+                <a:cs typeface="+mn-cs"/>
+              </a:rPr>
+              <a:t>&gt;&lt;/li&gt;</a:t>
+            </a:r>
+          </a:p>
+          <a:p>
+            <a:r>
+              <a:rPr lang="en-US" sz="1200" b="0" kern="1200" dirty="0">
+                <a:solidFill>
+                  <a:schemeClr val="tx1"/>
+                </a:solidFill>
+                <a:latin typeface="+mn-lt"/>
+                <a:ea typeface="+mn-ea"/>
+                <a:cs typeface="+mn-cs"/>
+              </a:rPr>
+              <a:t>                    &lt;li&gt;&lt;</a:t>
+            </a:r>
+            <a:r>
+              <a:rPr lang="en-US" sz="1200" b="1" kern="1200" dirty="0">
+                <a:solidFill>
+                  <a:schemeClr val="tx1"/>
+                </a:solidFill>
+                <a:latin typeface="+mn-lt"/>
+                <a:ea typeface="+mn-ea"/>
+                <a:cs typeface="+mn-cs"/>
+              </a:rPr>
+              <a:t>a</a:t>
+            </a:r>
+            <a:r>
+              <a:rPr lang="en-US" sz="1200" b="0" kern="1200" dirty="0">
+                <a:solidFill>
+                  <a:schemeClr val="tx1"/>
+                </a:solidFill>
+                <a:latin typeface="+mn-lt"/>
+                <a:ea typeface="+mn-ea"/>
+                <a:cs typeface="+mn-cs"/>
+              </a:rPr>
+              <a:t> </a:t>
+            </a:r>
+            <a:r>
+              <a:rPr lang="en-US" sz="1200" b="1" kern="1200" dirty="0">
+                <a:solidFill>
+                  <a:schemeClr val="tx1"/>
+                </a:solidFill>
+                <a:latin typeface="+mn-lt"/>
+                <a:ea typeface="+mn-ea"/>
+                <a:cs typeface="+mn-cs"/>
+              </a:rPr>
+              <a:t>asp-area</a:t>
+            </a:r>
+            <a:r>
+              <a:rPr lang="en-US" sz="1200" b="0" kern="1200" dirty="0">
+                <a:solidFill>
+                  <a:schemeClr val="tx1"/>
+                </a:solidFill>
+                <a:latin typeface="+mn-lt"/>
+                <a:ea typeface="+mn-ea"/>
+                <a:cs typeface="+mn-cs"/>
+              </a:rPr>
+              <a:t>="" </a:t>
+            </a:r>
+            <a:r>
+              <a:rPr lang="en-US" sz="1200" b="1" kern="1200" dirty="0">
+                <a:solidFill>
+                  <a:schemeClr val="tx1"/>
+                </a:solidFill>
+                <a:latin typeface="+mn-lt"/>
+                <a:ea typeface="+mn-ea"/>
+                <a:cs typeface="+mn-cs"/>
+              </a:rPr>
+              <a:t>asp-controller</a:t>
+            </a:r>
+            <a:r>
+              <a:rPr lang="en-US" sz="1200" b="0" kern="1200" dirty="0">
+                <a:solidFill>
+                  <a:schemeClr val="tx1"/>
+                </a:solidFill>
+                <a:latin typeface="+mn-lt"/>
+                <a:ea typeface="+mn-ea"/>
+                <a:cs typeface="+mn-cs"/>
+              </a:rPr>
+              <a:t>="Home" </a:t>
+            </a:r>
+            <a:r>
+              <a:rPr lang="en-US" sz="1200" b="1" kern="1200" dirty="0">
+                <a:solidFill>
+                  <a:schemeClr val="tx1"/>
+                </a:solidFill>
+                <a:latin typeface="+mn-lt"/>
+                <a:ea typeface="+mn-ea"/>
+                <a:cs typeface="+mn-cs"/>
+              </a:rPr>
+              <a:t>asp-action</a:t>
+            </a:r>
+            <a:r>
+              <a:rPr lang="en-US" sz="1200" b="0" kern="1200" dirty="0">
+                <a:solidFill>
+                  <a:schemeClr val="tx1"/>
+                </a:solidFill>
+                <a:latin typeface="+mn-lt"/>
+                <a:ea typeface="+mn-ea"/>
+                <a:cs typeface="+mn-cs"/>
+              </a:rPr>
+              <a:t>="Contact"&gt;Contact&lt;/</a:t>
+            </a:r>
+            <a:r>
+              <a:rPr lang="en-US" sz="1200" b="1" kern="1200" dirty="0">
+                <a:solidFill>
+                  <a:schemeClr val="tx1"/>
+                </a:solidFill>
+                <a:latin typeface="+mn-lt"/>
+                <a:ea typeface="+mn-ea"/>
+                <a:cs typeface="+mn-cs"/>
+              </a:rPr>
+              <a:t>a</a:t>
+            </a:r>
+            <a:r>
+              <a:rPr lang="en-US" sz="1200" b="0" kern="1200" dirty="0">
+                <a:solidFill>
+                  <a:schemeClr val="tx1"/>
+                </a:solidFill>
+                <a:latin typeface="+mn-lt"/>
+                <a:ea typeface="+mn-ea"/>
+                <a:cs typeface="+mn-cs"/>
+              </a:rPr>
+              <a:t>&gt;&lt;/li&gt;</a:t>
+            </a:r>
+          </a:p>
+          <a:p>
+            <a:r>
+              <a:rPr lang="es-MX" sz="1200" b="0" kern="1200" dirty="0">
+                <a:solidFill>
+                  <a:schemeClr val="tx1"/>
+                </a:solidFill>
+                <a:latin typeface="+mn-lt"/>
+                <a:ea typeface="+mn-ea"/>
+                <a:cs typeface="+mn-cs"/>
+              </a:rPr>
+              <a:t>                    &lt;</a:t>
+            </a:r>
+            <a:r>
+              <a:rPr lang="es-MX" sz="1200" b="0" kern="1200" dirty="0" err="1">
+                <a:solidFill>
+                  <a:schemeClr val="tx1"/>
+                </a:solidFill>
+                <a:latin typeface="+mn-lt"/>
+                <a:ea typeface="+mn-ea"/>
+                <a:cs typeface="+mn-cs"/>
+              </a:rPr>
+              <a:t>li</a:t>
+            </a:r>
+            <a:r>
+              <a:rPr lang="es-MX" sz="1200" b="0" kern="1200" dirty="0">
+                <a:solidFill>
+                  <a:schemeClr val="tx1"/>
+                </a:solidFill>
+                <a:latin typeface="+mn-lt"/>
+                <a:ea typeface="+mn-ea"/>
+                <a:cs typeface="+mn-cs"/>
+              </a:rPr>
+              <a:t>&gt;&lt;</a:t>
+            </a:r>
+            <a:r>
+              <a:rPr lang="es-MX" sz="1200" b="1" kern="1200" dirty="0">
+                <a:solidFill>
+                  <a:schemeClr val="tx1"/>
+                </a:solidFill>
+                <a:latin typeface="+mn-lt"/>
+                <a:ea typeface="+mn-ea"/>
+                <a:cs typeface="+mn-cs"/>
+              </a:rPr>
+              <a:t>a</a:t>
+            </a:r>
+            <a:r>
+              <a:rPr lang="es-MX" sz="1200" b="0" kern="1200" dirty="0">
+                <a:solidFill>
+                  <a:schemeClr val="tx1"/>
+                </a:solidFill>
+                <a:latin typeface="+mn-lt"/>
+                <a:ea typeface="+mn-ea"/>
+                <a:cs typeface="+mn-cs"/>
+              </a:rPr>
+              <a:t> </a:t>
+            </a:r>
+            <a:r>
+              <a:rPr lang="es-MX" sz="1200" b="1" kern="1200" dirty="0" err="1">
+                <a:solidFill>
+                  <a:schemeClr val="tx1"/>
+                </a:solidFill>
+                <a:latin typeface="+mn-lt"/>
+                <a:ea typeface="+mn-ea"/>
+                <a:cs typeface="+mn-cs"/>
+              </a:rPr>
+              <a:t>asp-area</a:t>
+            </a:r>
+            <a:r>
+              <a:rPr lang="es-MX" sz="1200" b="0" kern="1200" dirty="0">
+                <a:solidFill>
+                  <a:schemeClr val="tx1"/>
+                </a:solidFill>
+                <a:latin typeface="+mn-lt"/>
+                <a:ea typeface="+mn-ea"/>
+                <a:cs typeface="+mn-cs"/>
+              </a:rPr>
+              <a:t>="" </a:t>
+            </a:r>
+            <a:r>
+              <a:rPr lang="es-MX" sz="1200" b="1" kern="1200" dirty="0" err="1">
+                <a:solidFill>
+                  <a:schemeClr val="tx1"/>
+                </a:solidFill>
+                <a:latin typeface="+mn-lt"/>
+                <a:ea typeface="+mn-ea"/>
+                <a:cs typeface="+mn-cs"/>
+              </a:rPr>
+              <a:t>asp-controller</a:t>
+            </a:r>
+            <a:r>
+              <a:rPr lang="es-MX" sz="1200" b="0" kern="1200" dirty="0">
+                <a:solidFill>
+                  <a:schemeClr val="tx1"/>
+                </a:solidFill>
+                <a:latin typeface="+mn-lt"/>
+                <a:ea typeface="+mn-ea"/>
+                <a:cs typeface="+mn-cs"/>
+              </a:rPr>
+              <a:t>="</a:t>
+            </a:r>
+            <a:r>
+              <a:rPr lang="es-MX" sz="1200" b="0" kern="1200" dirty="0" err="1">
+                <a:solidFill>
+                  <a:schemeClr val="tx1"/>
+                </a:solidFill>
+                <a:latin typeface="+mn-lt"/>
+                <a:ea typeface="+mn-ea"/>
+                <a:cs typeface="+mn-cs"/>
+              </a:rPr>
+              <a:t>Products</a:t>
+            </a:r>
+            <a:r>
+              <a:rPr lang="es-MX" sz="1200" b="0" kern="1200" dirty="0">
+                <a:solidFill>
+                  <a:schemeClr val="tx1"/>
+                </a:solidFill>
+                <a:latin typeface="+mn-lt"/>
+                <a:ea typeface="+mn-ea"/>
+                <a:cs typeface="+mn-cs"/>
+              </a:rPr>
+              <a:t>" </a:t>
+            </a:r>
+            <a:r>
+              <a:rPr lang="es-MX" sz="1200" b="1" kern="1200" dirty="0" err="1">
+                <a:solidFill>
+                  <a:schemeClr val="tx1"/>
+                </a:solidFill>
+                <a:latin typeface="+mn-lt"/>
+                <a:ea typeface="+mn-ea"/>
+                <a:cs typeface="+mn-cs"/>
+              </a:rPr>
+              <a:t>asp-action</a:t>
+            </a:r>
+            <a:r>
+              <a:rPr lang="es-MX" sz="1200" b="0" kern="1200" dirty="0">
+                <a:solidFill>
+                  <a:schemeClr val="tx1"/>
+                </a:solidFill>
+                <a:latin typeface="+mn-lt"/>
+                <a:ea typeface="+mn-ea"/>
+                <a:cs typeface="+mn-cs"/>
+              </a:rPr>
+              <a:t>="</a:t>
+            </a:r>
+            <a:r>
+              <a:rPr lang="es-MX" sz="1200" b="0" kern="1200" dirty="0" err="1">
+                <a:solidFill>
+                  <a:schemeClr val="tx1"/>
+                </a:solidFill>
+                <a:latin typeface="+mn-lt"/>
+                <a:ea typeface="+mn-ea"/>
+                <a:cs typeface="+mn-cs"/>
+              </a:rPr>
+              <a:t>Index</a:t>
+            </a:r>
+            <a:r>
+              <a:rPr lang="es-MX" sz="1200" b="0" kern="1200" dirty="0">
+                <a:solidFill>
+                  <a:schemeClr val="tx1"/>
+                </a:solidFill>
+                <a:latin typeface="+mn-lt"/>
+                <a:ea typeface="+mn-ea"/>
+                <a:cs typeface="+mn-cs"/>
+              </a:rPr>
+              <a:t>"&gt;Producto&lt;/</a:t>
+            </a:r>
+            <a:r>
+              <a:rPr lang="es-MX" sz="1200" b="1" kern="1200" dirty="0">
+                <a:solidFill>
+                  <a:schemeClr val="tx1"/>
+                </a:solidFill>
+                <a:latin typeface="+mn-lt"/>
+                <a:ea typeface="+mn-ea"/>
+                <a:cs typeface="+mn-cs"/>
+              </a:rPr>
+              <a:t>a</a:t>
+            </a:r>
+            <a:r>
+              <a:rPr lang="es-MX" sz="1200" b="0" kern="1200" dirty="0">
+                <a:solidFill>
+                  <a:schemeClr val="tx1"/>
+                </a:solidFill>
+                <a:latin typeface="+mn-lt"/>
+                <a:ea typeface="+mn-ea"/>
+                <a:cs typeface="+mn-cs"/>
+              </a:rPr>
+              <a:t>&gt;&lt;/</a:t>
+            </a:r>
+            <a:r>
+              <a:rPr lang="es-MX" sz="1200" b="0" kern="1200" dirty="0" err="1">
+                <a:solidFill>
+                  <a:schemeClr val="tx1"/>
+                </a:solidFill>
+                <a:latin typeface="+mn-lt"/>
+                <a:ea typeface="+mn-ea"/>
+                <a:cs typeface="+mn-cs"/>
+              </a:rPr>
+              <a:t>li</a:t>
+            </a:r>
+            <a:r>
+              <a:rPr lang="es-MX" sz="1200" b="0" kern="1200" dirty="0">
+                <a:solidFill>
+                  <a:schemeClr val="tx1"/>
+                </a:solidFill>
+                <a:latin typeface="+mn-lt"/>
+                <a:ea typeface="+mn-ea"/>
+                <a:cs typeface="+mn-cs"/>
+              </a:rPr>
+              <a:t>&gt;</a:t>
+            </a:r>
+            <a:endParaRPr lang="es-MX" dirty="0"/>
+          </a:p>
+        </p:txBody>
+      </p:sp>
+      <p:sp>
+        <p:nvSpPr>
+          <p:cNvPr id="4" name="Marcador de número de diapositiva 3"/>
+          <p:cNvSpPr>
+            <a:spLocks noGrp="1"/>
+          </p:cNvSpPr>
+          <p:nvPr>
+            <p:ph type="sldNum" sz="quarter" idx="5"/>
+          </p:nvPr>
+        </p:nvSpPr>
+        <p:spPr/>
+        <p:txBody>
+          <a:bodyPr/>
+          <a:lstStyle/>
+          <a:p>
+            <a:fld id="{785ED18C-E05F-4FD2-A782-FC24AC302660}" type="slidenum">
+              <a:rPr lang="es-MX" smtClean="0"/>
+              <a:t>37</a:t>
+            </a:fld>
+            <a:endParaRPr lang="es-MX"/>
+          </a:p>
+        </p:txBody>
+      </p:sp>
+    </p:spTree>
+    <p:extLst>
+      <p:ext uri="{BB962C8B-B14F-4D97-AF65-F5344CB8AC3E}">
+        <p14:creationId xmlns:p14="http://schemas.microsoft.com/office/powerpoint/2010/main" val="713344074"/>
+      </p:ext>
+    </p:extLst>
+  </p:cSld>
+  <p:clrMapOvr>
+    <a:masterClrMapping/>
+  </p:clrMapOvr>
+</p:notes>
+</file>
+
+<file path=ppt/notesSlides/notesSlide36.xml><?xml version="1.0" encoding="utf-8"?>
+<p:notes xmlns:a="http://schemas.openxmlformats.org/drawingml/2006/main" xmlns:r="http://schemas.openxmlformats.org/officeDocument/2006/relationships" xmlns:p="http://schemas.openxmlformats.org/presentationml/2006/main">
+  <p:cSld>
+    <p:spTree>
+      <p:nvGrpSpPr>
+        <p:cNvPr id="1" name=""/>
+        <p:cNvGrpSpPr/>
+        <p:nvPr/>
+      </p:nvGrpSpPr>
+      <p:grpSpPr>
+        <a:xfrm>
+          <a:off x="0" y="0"/>
+          <a:ext cx="0" cy="0"/>
+          <a:chOff x="0" y="0"/>
+          <a:chExt cx="0" cy="0"/>
+        </a:xfrm>
+      </p:grpSpPr>
+      <p:sp>
+        <p:nvSpPr>
+          <p:cNvPr id="2" name="Marcador de imagen de diapositiva 1"/>
+          <p:cNvSpPr>
+            <a:spLocks noGrp="1" noRot="1" noChangeAspect="1"/>
+          </p:cNvSpPr>
+          <p:nvPr>
+            <p:ph type="sldImg"/>
+          </p:nvPr>
+        </p:nvSpPr>
+        <p:spPr/>
+      </p:sp>
+      <p:sp>
+        <p:nvSpPr>
+          <p:cNvPr id="3" name="Marcador de notas 2"/>
+          <p:cNvSpPr>
+            <a:spLocks noGrp="1"/>
+          </p:cNvSpPr>
+          <p:nvPr>
+            <p:ph type="body" idx="1"/>
+          </p:nvPr>
+        </p:nvSpPr>
+        <p:spPr/>
+        <p:txBody>
+          <a:bodyPr/>
+          <a:lstStyle/>
+          <a:p>
+            <a:r>
+              <a:rPr lang="es-ES" dirty="0"/>
+              <a:t>Ejecutar el </a:t>
+            </a:r>
+            <a:r>
+              <a:rPr lang="es-ES" dirty="0" err="1"/>
+              <a:t>proeycto</a:t>
+            </a:r>
+            <a:r>
+              <a:rPr lang="es-ES" dirty="0"/>
+              <a:t> web para probarlo</a:t>
+            </a:r>
+            <a:endParaRPr lang="es-MX" dirty="0"/>
+          </a:p>
+        </p:txBody>
+      </p:sp>
+      <p:sp>
+        <p:nvSpPr>
+          <p:cNvPr id="4" name="Marcador de número de diapositiva 3"/>
+          <p:cNvSpPr>
+            <a:spLocks noGrp="1"/>
+          </p:cNvSpPr>
+          <p:nvPr>
+            <p:ph type="sldNum" sz="quarter" idx="5"/>
+          </p:nvPr>
+        </p:nvSpPr>
+        <p:spPr/>
+        <p:txBody>
+          <a:bodyPr/>
+          <a:lstStyle/>
+          <a:p>
+            <a:fld id="{785ED18C-E05F-4FD2-A782-FC24AC302660}" type="slidenum">
+              <a:rPr lang="es-MX" smtClean="0"/>
+              <a:t>38</a:t>
+            </a:fld>
+            <a:endParaRPr lang="es-MX"/>
+          </a:p>
+        </p:txBody>
+      </p:sp>
+    </p:spTree>
+    <p:extLst>
+      <p:ext uri="{BB962C8B-B14F-4D97-AF65-F5344CB8AC3E}">
+        <p14:creationId xmlns:p14="http://schemas.microsoft.com/office/powerpoint/2010/main" val="787982457"/>
+      </p:ext>
+    </p:extLst>
+  </p:cSld>
+  <p:clrMapOvr>
+    <a:masterClrMapping/>
+  </p:clrMapOvr>
+</p:notes>
+</file>
+
+<file path=ppt/notesSlides/notesSlide37.xml><?xml version="1.0" encoding="utf-8"?>
+<p:notes xmlns:a="http://schemas.openxmlformats.org/drawingml/2006/main" xmlns:r="http://schemas.openxmlformats.org/officeDocument/2006/relationships" xmlns:p="http://schemas.openxmlformats.org/presentationml/2006/main">
+  <p:cSld>
+    <p:spTree>
+      <p:nvGrpSpPr>
+        <p:cNvPr id="1" name=""/>
+        <p:cNvGrpSpPr/>
+        <p:nvPr/>
+      </p:nvGrpSpPr>
+      <p:grpSpPr>
+        <a:xfrm>
+          <a:off x="0" y="0"/>
+          <a:ext cx="0" cy="0"/>
+          <a:chOff x="0" y="0"/>
+          <a:chExt cx="0" cy="0"/>
+        </a:xfrm>
+      </p:grpSpPr>
+      <p:sp>
+        <p:nvSpPr>
+          <p:cNvPr id="2" name="Marcador de imagen de diapositiva 1"/>
+          <p:cNvSpPr>
+            <a:spLocks noGrp="1" noRot="1" noChangeAspect="1"/>
+          </p:cNvSpPr>
+          <p:nvPr>
+            <p:ph type="sldImg"/>
+          </p:nvPr>
+        </p:nvSpPr>
+        <p:spPr/>
+      </p:sp>
+      <p:sp>
+        <p:nvSpPr>
+          <p:cNvPr id="3" name="Marcador de notas 2"/>
+          <p:cNvSpPr>
+            <a:spLocks noGrp="1"/>
+          </p:cNvSpPr>
+          <p:nvPr>
+            <p:ph type="body" idx="1"/>
+          </p:nvPr>
+        </p:nvSpPr>
+        <p:spPr/>
+        <p:txBody>
+          <a:bodyPr/>
+          <a:lstStyle/>
+          <a:p>
+            <a:r>
+              <a:rPr lang="es-ES" dirty="0"/>
+              <a:t>Corregir errores de </a:t>
+            </a:r>
+            <a:r>
+              <a:rPr lang="es-ES"/>
+              <a:t>dedo CANATIDAD</a:t>
+            </a:r>
+            <a:endParaRPr lang="es-MX" dirty="0"/>
+          </a:p>
+        </p:txBody>
+      </p:sp>
+      <p:sp>
+        <p:nvSpPr>
+          <p:cNvPr id="4" name="Marcador de número de diapositiva 3"/>
+          <p:cNvSpPr>
+            <a:spLocks noGrp="1"/>
+          </p:cNvSpPr>
+          <p:nvPr>
+            <p:ph type="sldNum" sz="quarter" idx="5"/>
+          </p:nvPr>
+        </p:nvSpPr>
+        <p:spPr/>
+        <p:txBody>
+          <a:bodyPr/>
+          <a:lstStyle/>
+          <a:p>
+            <a:fld id="{785ED18C-E05F-4FD2-A782-FC24AC302660}" type="slidenum">
+              <a:rPr lang="es-MX" smtClean="0"/>
+              <a:t>39</a:t>
+            </a:fld>
+            <a:endParaRPr lang="es-MX"/>
+          </a:p>
+        </p:txBody>
+      </p:sp>
+    </p:spTree>
+    <p:extLst>
+      <p:ext uri="{BB962C8B-B14F-4D97-AF65-F5344CB8AC3E}">
+        <p14:creationId xmlns:p14="http://schemas.microsoft.com/office/powerpoint/2010/main" val="1303415990"/>
       </p:ext>
     </p:extLst>
   </p:cSld>
@@ -2585,7 +5741,7 @@
           <a:p>
             <a:fld id="{A6297428-E98A-4102-8DAC-D4A32A47CC0E}" type="datetimeFigureOut">
               <a:rPr lang="es-MX" smtClean="0"/>
-              <a:t>21/10/2019</a:t>
+              <a:t>04/11/2019</a:t>
             </a:fld>
             <a:endParaRPr lang="es-MX"/>
           </a:p>
@@ -2639,7 +5795,7 @@
           <a:p>
             <a:fld id="{18A47C16-09A2-4557-A7D1-C3FFC0D2E8CB}" type="slidenum">
               <a:rPr lang="es-MX" smtClean="0"/>
-              <a:t>‹#›</a:t>
+              <a:t>‹Nº›</a:t>
             </a:fld>
             <a:endParaRPr lang="es-MX"/>
           </a:p>
@@ -2785,7 +5941,7 @@
           <a:p>
             <a:fld id="{A6297428-E98A-4102-8DAC-D4A32A47CC0E}" type="datetimeFigureOut">
               <a:rPr lang="es-MX" smtClean="0"/>
-              <a:t>21/10/2019</a:t>
+              <a:t>04/11/2019</a:t>
             </a:fld>
             <a:endParaRPr lang="es-MX"/>
           </a:p>
@@ -2839,7 +5995,7 @@
           <a:p>
             <a:fld id="{18A47C16-09A2-4557-A7D1-C3FFC0D2E8CB}" type="slidenum">
               <a:rPr lang="es-MX" smtClean="0"/>
-              <a:t>‹#›</a:t>
+              <a:t>‹Nº›</a:t>
             </a:fld>
             <a:endParaRPr lang="es-MX"/>
           </a:p>
@@ -2995,7 +6151,7 @@
           <a:p>
             <a:fld id="{A6297428-E98A-4102-8DAC-D4A32A47CC0E}" type="datetimeFigureOut">
               <a:rPr lang="es-MX" smtClean="0"/>
-              <a:t>21/10/2019</a:t>
+              <a:t>04/11/2019</a:t>
             </a:fld>
             <a:endParaRPr lang="es-MX"/>
           </a:p>
@@ -3049,7 +6205,7 @@
           <a:p>
             <a:fld id="{18A47C16-09A2-4557-A7D1-C3FFC0D2E8CB}" type="slidenum">
               <a:rPr lang="es-MX" smtClean="0"/>
-              <a:t>‹#›</a:t>
+              <a:t>‹Nº›</a:t>
             </a:fld>
             <a:endParaRPr lang="es-MX"/>
           </a:p>
@@ -3195,7 +6351,7 @@
           <a:p>
             <a:fld id="{A6297428-E98A-4102-8DAC-D4A32A47CC0E}" type="datetimeFigureOut">
               <a:rPr lang="es-MX" smtClean="0"/>
-              <a:t>21/10/2019</a:t>
+              <a:t>04/11/2019</a:t>
             </a:fld>
             <a:endParaRPr lang="es-MX"/>
           </a:p>
@@ -3249,7 +6405,7 @@
           <a:p>
             <a:fld id="{18A47C16-09A2-4557-A7D1-C3FFC0D2E8CB}" type="slidenum">
               <a:rPr lang="es-MX" smtClean="0"/>
-              <a:t>‹#›</a:t>
+              <a:t>‹Nº›</a:t>
             </a:fld>
             <a:endParaRPr lang="es-MX"/>
           </a:p>
@@ -3471,7 +6627,7 @@
           <a:p>
             <a:fld id="{A6297428-E98A-4102-8DAC-D4A32A47CC0E}" type="datetimeFigureOut">
               <a:rPr lang="es-MX" smtClean="0"/>
-              <a:t>21/10/2019</a:t>
+              <a:t>04/11/2019</a:t>
             </a:fld>
             <a:endParaRPr lang="es-MX"/>
           </a:p>
@@ -3525,7 +6681,7 @@
           <a:p>
             <a:fld id="{18A47C16-09A2-4557-A7D1-C3FFC0D2E8CB}" type="slidenum">
               <a:rPr lang="es-MX" smtClean="0"/>
-              <a:t>‹#›</a:t>
+              <a:t>‹Nº›</a:t>
             </a:fld>
             <a:endParaRPr lang="es-MX"/>
           </a:p>
@@ -3739,7 +6895,7 @@
           <a:p>
             <a:fld id="{A6297428-E98A-4102-8DAC-D4A32A47CC0E}" type="datetimeFigureOut">
               <a:rPr lang="es-MX" smtClean="0"/>
-              <a:t>21/10/2019</a:t>
+              <a:t>04/11/2019</a:t>
             </a:fld>
             <a:endParaRPr lang="es-MX"/>
           </a:p>
@@ -3793,7 +6949,7 @@
           <a:p>
             <a:fld id="{18A47C16-09A2-4557-A7D1-C3FFC0D2E8CB}" type="slidenum">
               <a:rPr lang="es-MX" smtClean="0"/>
-              <a:t>‹#›</a:t>
+              <a:t>‹Nº›</a:t>
             </a:fld>
             <a:endParaRPr lang="es-MX"/>
           </a:p>
@@ -4154,7 +7310,7 @@
           <a:p>
             <a:fld id="{A6297428-E98A-4102-8DAC-D4A32A47CC0E}" type="datetimeFigureOut">
               <a:rPr lang="es-MX" smtClean="0"/>
-              <a:t>21/10/2019</a:t>
+              <a:t>04/11/2019</a:t>
             </a:fld>
             <a:endParaRPr lang="es-MX"/>
           </a:p>
@@ -4208,7 +7364,7 @@
           <a:p>
             <a:fld id="{18A47C16-09A2-4557-A7D1-C3FFC0D2E8CB}" type="slidenum">
               <a:rPr lang="es-MX" smtClean="0"/>
-              <a:t>‹#›</a:t>
+              <a:t>‹Nº›</a:t>
             </a:fld>
             <a:endParaRPr lang="es-MX"/>
           </a:p>
@@ -4296,7 +7452,7 @@
           <a:p>
             <a:fld id="{A6297428-E98A-4102-8DAC-D4A32A47CC0E}" type="datetimeFigureOut">
               <a:rPr lang="es-MX" smtClean="0"/>
-              <a:t>21/10/2019</a:t>
+              <a:t>04/11/2019</a:t>
             </a:fld>
             <a:endParaRPr lang="es-MX"/>
           </a:p>
@@ -4350,7 +7506,7 @@
           <a:p>
             <a:fld id="{18A47C16-09A2-4557-A7D1-C3FFC0D2E8CB}" type="slidenum">
               <a:rPr lang="es-MX" smtClean="0"/>
-              <a:t>‹#›</a:t>
+              <a:t>‹Nº›</a:t>
             </a:fld>
             <a:endParaRPr lang="es-MX"/>
           </a:p>
@@ -4409,7 +7565,7 @@
           <a:p>
             <a:fld id="{A6297428-E98A-4102-8DAC-D4A32A47CC0E}" type="datetimeFigureOut">
               <a:rPr lang="es-MX" smtClean="0"/>
-              <a:t>21/10/2019</a:t>
+              <a:t>04/11/2019</a:t>
             </a:fld>
             <a:endParaRPr lang="es-MX"/>
           </a:p>
@@ -4463,7 +7619,7 @@
           <a:p>
             <a:fld id="{18A47C16-09A2-4557-A7D1-C3FFC0D2E8CB}" type="slidenum">
               <a:rPr lang="es-MX" smtClean="0"/>
-              <a:t>‹#›</a:t>
+              <a:t>‹Nº›</a:t>
             </a:fld>
             <a:endParaRPr lang="es-MX"/>
           </a:p>
@@ -4722,7 +7878,7 @@
           <a:p>
             <a:fld id="{A6297428-E98A-4102-8DAC-D4A32A47CC0E}" type="datetimeFigureOut">
               <a:rPr lang="es-MX" smtClean="0"/>
-              <a:t>21/10/2019</a:t>
+              <a:t>04/11/2019</a:t>
             </a:fld>
             <a:endParaRPr lang="es-MX"/>
           </a:p>
@@ -4776,7 +7932,7 @@
           <a:p>
             <a:fld id="{18A47C16-09A2-4557-A7D1-C3FFC0D2E8CB}" type="slidenum">
               <a:rPr lang="es-MX" smtClean="0"/>
-              <a:t>‹#›</a:t>
+              <a:t>‹Nº›</a:t>
             </a:fld>
             <a:endParaRPr lang="es-MX"/>
           </a:p>
@@ -5011,7 +8167,7 @@
           <a:p>
             <a:fld id="{A6297428-E98A-4102-8DAC-D4A32A47CC0E}" type="datetimeFigureOut">
               <a:rPr lang="es-MX" smtClean="0"/>
-              <a:t>21/10/2019</a:t>
+              <a:t>04/11/2019</a:t>
             </a:fld>
             <a:endParaRPr lang="es-MX"/>
           </a:p>
@@ -5065,7 +8221,7 @@
           <a:p>
             <a:fld id="{18A47C16-09A2-4557-A7D1-C3FFC0D2E8CB}" type="slidenum">
               <a:rPr lang="es-MX" smtClean="0"/>
-              <a:t>‹#›</a:t>
+              <a:t>‹Nº›</a:t>
             </a:fld>
             <a:endParaRPr lang="es-MX"/>
           </a:p>
@@ -5254,7 +8410,7 @@
           <a:p>
             <a:fld id="{A6297428-E98A-4102-8DAC-D4A32A47CC0E}" type="datetimeFigureOut">
               <a:rPr lang="es-MX" smtClean="0"/>
-              <a:t>21/10/2019</a:t>
+              <a:t>04/11/2019</a:t>
             </a:fld>
             <a:endParaRPr lang="es-MX"/>
           </a:p>
@@ -5344,7 +8500,7 @@
           <a:p>
             <a:fld id="{18A47C16-09A2-4557-A7D1-C3FFC0D2E8CB}" type="slidenum">
               <a:rPr lang="es-MX" smtClean="0"/>
-              <a:t>‹#›</a:t>
+              <a:t>‹Nº›</a:t>
             </a:fld>
             <a:endParaRPr lang="es-MX"/>
           </a:p>
@@ -6657,10 +9813,364 @@
           <a:chExt cx="0" cy="0"/>
         </a:xfrm>
       </p:grpSpPr>
+      <p:sp>
+        <p:nvSpPr>
+          <p:cNvPr id="2" name="Título 1">
+            <a:extLst>
+              <a:ext uri="{FF2B5EF4-FFF2-40B4-BE49-F238E27FC236}">
+                <a16:creationId xmlns:a16="http://schemas.microsoft.com/office/drawing/2014/main" id="{9A304C15-F555-4E5C-827A-B278F06A986E}"/>
+              </a:ext>
+            </a:extLst>
+          </p:cNvPr>
+          <p:cNvSpPr>
+            <a:spLocks noGrp="1"/>
+          </p:cNvSpPr>
+          <p:nvPr>
+            <p:ph type="ctrTitle"/>
+          </p:nvPr>
+        </p:nvSpPr>
+        <p:spPr/>
+        <p:txBody>
+          <a:bodyPr/>
+          <a:lstStyle/>
+          <a:p>
+            <a:r>
+              <a:rPr lang="es-ES" dirty="0"/>
+              <a:t>Lunes 4 de noviembre de 2019</a:t>
+            </a:r>
+            <a:endParaRPr lang="es-MX" dirty="0"/>
+          </a:p>
+        </p:txBody>
+      </p:sp>
+      <p:sp>
+        <p:nvSpPr>
+          <p:cNvPr id="3" name="Subtítulo 2">
+            <a:extLst>
+              <a:ext uri="{FF2B5EF4-FFF2-40B4-BE49-F238E27FC236}">
+                <a16:creationId xmlns:a16="http://schemas.microsoft.com/office/drawing/2014/main" id="{AC08F215-28CC-4F08-AE56-DDA88B644351}"/>
+              </a:ext>
+            </a:extLst>
+          </p:cNvPr>
+          <p:cNvSpPr>
+            <a:spLocks noGrp="1"/>
+          </p:cNvSpPr>
+          <p:nvPr>
+            <p:ph type="subTitle" idx="1"/>
+          </p:nvPr>
+        </p:nvSpPr>
+        <p:spPr/>
+        <p:txBody>
+          <a:bodyPr/>
+          <a:lstStyle/>
+          <a:p>
+            <a:endParaRPr lang="es-MX"/>
+          </a:p>
+        </p:txBody>
+      </p:sp>
     </p:spTree>
     <p:extLst>
       <p:ext uri="{BB962C8B-B14F-4D97-AF65-F5344CB8AC3E}">
         <p14:creationId xmlns:p14="http://schemas.microsoft.com/office/powerpoint/2010/main" val="1710806436"/>
+      </p:ext>
+    </p:extLst>
+  </p:cSld>
+  <p:clrMapOvr>
+    <a:masterClrMapping/>
+  </p:clrMapOvr>
+</p:sld>
+</file>
+
+<file path=ppt/slides/slide25.xml><?xml version="1.0" encoding="utf-8"?>
+<p:sld xmlns:a="http://schemas.openxmlformats.org/drawingml/2006/main" xmlns:r="http://schemas.openxmlformats.org/officeDocument/2006/relationships" xmlns:p="http://schemas.openxmlformats.org/presentationml/2006/main">
+  <p:cSld>
+    <p:spTree>
+      <p:nvGrpSpPr>
+        <p:cNvPr id="1" name=""/>
+        <p:cNvGrpSpPr/>
+        <p:nvPr/>
+      </p:nvGrpSpPr>
+      <p:grpSpPr>
+        <a:xfrm>
+          <a:off x="0" y="0"/>
+          <a:ext cx="0" cy="0"/>
+          <a:chOff x="0" y="0"/>
+          <a:chExt cx="0" cy="0"/>
+        </a:xfrm>
+      </p:grpSpPr>
+      <p:pic>
+        <p:nvPicPr>
+          <p:cNvPr id="2" name="Imagen 1">
+            <a:extLst>
+              <a:ext uri="{FF2B5EF4-FFF2-40B4-BE49-F238E27FC236}">
+                <a16:creationId xmlns:a16="http://schemas.microsoft.com/office/drawing/2014/main" id="{8BC1A6D9-5EAB-456E-9253-15397DC3D4C8}"/>
+              </a:ext>
+            </a:extLst>
+          </p:cNvPr>
+          <p:cNvPicPr>
+            <a:picLocks noChangeAspect="1"/>
+          </p:cNvPicPr>
+          <p:nvPr/>
+        </p:nvPicPr>
+        <p:blipFill>
+          <a:blip r:embed="rId3"/>
+          <a:stretch>
+            <a:fillRect/>
+          </a:stretch>
+        </p:blipFill>
+        <p:spPr>
+          <a:xfrm>
+            <a:off x="1287945" y="0"/>
+            <a:ext cx="9616109" cy="6858000"/>
+          </a:xfrm>
+          <a:prstGeom prst="rect">
+            <a:avLst/>
+          </a:prstGeom>
+        </p:spPr>
+      </p:pic>
+    </p:spTree>
+    <p:extLst>
+      <p:ext uri="{BB962C8B-B14F-4D97-AF65-F5344CB8AC3E}">
+        <p14:creationId xmlns:p14="http://schemas.microsoft.com/office/powerpoint/2010/main" val="734992955"/>
+      </p:ext>
+    </p:extLst>
+  </p:cSld>
+  <p:clrMapOvr>
+    <a:masterClrMapping/>
+  </p:clrMapOvr>
+</p:sld>
+</file>
+
+<file path=ppt/slides/slide26.xml><?xml version="1.0" encoding="utf-8"?>
+<p:sld xmlns:a="http://schemas.openxmlformats.org/drawingml/2006/main" xmlns:r="http://schemas.openxmlformats.org/officeDocument/2006/relationships" xmlns:p="http://schemas.openxmlformats.org/presentationml/2006/main">
+  <p:cSld>
+    <p:spTree>
+      <p:nvGrpSpPr>
+        <p:cNvPr id="1" name=""/>
+        <p:cNvGrpSpPr/>
+        <p:nvPr/>
+      </p:nvGrpSpPr>
+      <p:grpSpPr>
+        <a:xfrm>
+          <a:off x="0" y="0"/>
+          <a:ext cx="0" cy="0"/>
+          <a:chOff x="0" y="0"/>
+          <a:chExt cx="0" cy="0"/>
+        </a:xfrm>
+      </p:grpSpPr>
+      <p:pic>
+        <p:nvPicPr>
+          <p:cNvPr id="2" name="Imagen 1">
+            <a:extLst>
+              <a:ext uri="{FF2B5EF4-FFF2-40B4-BE49-F238E27FC236}">
+                <a16:creationId xmlns:a16="http://schemas.microsoft.com/office/drawing/2014/main" id="{AA0E3D4E-4CD9-4FBD-97BC-86A8F0398658}"/>
+              </a:ext>
+            </a:extLst>
+          </p:cNvPr>
+          <p:cNvPicPr>
+            <a:picLocks noChangeAspect="1"/>
+          </p:cNvPicPr>
+          <p:nvPr/>
+        </p:nvPicPr>
+        <p:blipFill>
+          <a:blip r:embed="rId3"/>
+          <a:stretch>
+            <a:fillRect/>
+          </a:stretch>
+        </p:blipFill>
+        <p:spPr>
+          <a:xfrm>
+            <a:off x="1287945" y="0"/>
+            <a:ext cx="9616109" cy="6858000"/>
+          </a:xfrm>
+          <a:prstGeom prst="rect">
+            <a:avLst/>
+          </a:prstGeom>
+        </p:spPr>
+      </p:pic>
+    </p:spTree>
+    <p:extLst>
+      <p:ext uri="{BB962C8B-B14F-4D97-AF65-F5344CB8AC3E}">
+        <p14:creationId xmlns:p14="http://schemas.microsoft.com/office/powerpoint/2010/main" val="2886989068"/>
+      </p:ext>
+    </p:extLst>
+  </p:cSld>
+  <p:clrMapOvr>
+    <a:masterClrMapping/>
+  </p:clrMapOvr>
+</p:sld>
+</file>
+
+<file path=ppt/slides/slide27.xml><?xml version="1.0" encoding="utf-8"?>
+<p:sld xmlns:a="http://schemas.openxmlformats.org/drawingml/2006/main" xmlns:r="http://schemas.openxmlformats.org/officeDocument/2006/relationships" xmlns:p="http://schemas.openxmlformats.org/presentationml/2006/main">
+  <p:cSld>
+    <p:spTree>
+      <p:nvGrpSpPr>
+        <p:cNvPr id="1" name=""/>
+        <p:cNvGrpSpPr/>
+        <p:nvPr/>
+      </p:nvGrpSpPr>
+      <p:grpSpPr>
+        <a:xfrm>
+          <a:off x="0" y="0"/>
+          <a:ext cx="0" cy="0"/>
+          <a:chOff x="0" y="0"/>
+          <a:chExt cx="0" cy="0"/>
+        </a:xfrm>
+      </p:grpSpPr>
+      <p:pic>
+        <p:nvPicPr>
+          <p:cNvPr id="2" name="Imagen 1">
+            <a:extLst>
+              <a:ext uri="{FF2B5EF4-FFF2-40B4-BE49-F238E27FC236}">
+                <a16:creationId xmlns:a16="http://schemas.microsoft.com/office/drawing/2014/main" id="{FC91E35D-BB16-44AF-9881-A6D0C4ECDE4C}"/>
+              </a:ext>
+            </a:extLst>
+          </p:cNvPr>
+          <p:cNvPicPr>
+            <a:picLocks noChangeAspect="1"/>
+          </p:cNvPicPr>
+          <p:nvPr/>
+        </p:nvPicPr>
+        <p:blipFill>
+          <a:blip r:embed="rId3"/>
+          <a:stretch>
+            <a:fillRect/>
+          </a:stretch>
+        </p:blipFill>
+        <p:spPr>
+          <a:xfrm>
+            <a:off x="1171575" y="604837"/>
+            <a:ext cx="9848850" cy="5648325"/>
+          </a:xfrm>
+          <a:prstGeom prst="rect">
+            <a:avLst/>
+          </a:prstGeom>
+        </p:spPr>
+      </p:pic>
+    </p:spTree>
+    <p:extLst>
+      <p:ext uri="{BB962C8B-B14F-4D97-AF65-F5344CB8AC3E}">
+        <p14:creationId xmlns:p14="http://schemas.microsoft.com/office/powerpoint/2010/main" val="101437806"/>
+      </p:ext>
+    </p:extLst>
+  </p:cSld>
+  <p:clrMapOvr>
+    <a:masterClrMapping/>
+  </p:clrMapOvr>
+</p:sld>
+</file>
+
+<file path=ppt/slides/slide28.xml><?xml version="1.0" encoding="utf-8"?>
+<p:sld xmlns:a="http://schemas.openxmlformats.org/drawingml/2006/main" xmlns:r="http://schemas.openxmlformats.org/officeDocument/2006/relationships" xmlns:p="http://schemas.openxmlformats.org/presentationml/2006/main">
+  <p:cSld>
+    <p:spTree>
+      <p:nvGrpSpPr>
+        <p:cNvPr id="1" name=""/>
+        <p:cNvGrpSpPr/>
+        <p:nvPr/>
+      </p:nvGrpSpPr>
+      <p:grpSpPr>
+        <a:xfrm>
+          <a:off x="0" y="0"/>
+          <a:ext cx="0" cy="0"/>
+          <a:chOff x="0" y="0"/>
+          <a:chExt cx="0" cy="0"/>
+        </a:xfrm>
+      </p:grpSpPr>
+      <p:pic>
+        <p:nvPicPr>
+          <p:cNvPr id="2" name="Imagen 1">
+            <a:extLst>
+              <a:ext uri="{FF2B5EF4-FFF2-40B4-BE49-F238E27FC236}">
+                <a16:creationId xmlns:a16="http://schemas.microsoft.com/office/drawing/2014/main" id="{B577A17F-2C7A-44DB-9D2F-3FAECEDA5AD8}"/>
+              </a:ext>
+            </a:extLst>
+          </p:cNvPr>
+          <p:cNvPicPr>
+            <a:picLocks noChangeAspect="1"/>
+          </p:cNvPicPr>
+          <p:nvPr/>
+        </p:nvPicPr>
+        <p:blipFill>
+          <a:blip r:embed="rId3"/>
+          <a:stretch>
+            <a:fillRect/>
+          </a:stretch>
+        </p:blipFill>
+        <p:spPr>
+          <a:xfrm>
+            <a:off x="1552575" y="990600"/>
+            <a:ext cx="9086850" cy="4876800"/>
+          </a:xfrm>
+          <a:prstGeom prst="rect">
+            <a:avLst/>
+          </a:prstGeom>
+        </p:spPr>
+      </p:pic>
+    </p:spTree>
+    <p:extLst>
+      <p:ext uri="{BB962C8B-B14F-4D97-AF65-F5344CB8AC3E}">
+        <p14:creationId xmlns:p14="http://schemas.microsoft.com/office/powerpoint/2010/main" val="3262014300"/>
+      </p:ext>
+    </p:extLst>
+  </p:cSld>
+  <p:clrMapOvr>
+    <a:masterClrMapping/>
+  </p:clrMapOvr>
+</p:sld>
+</file>
+
+<file path=ppt/slides/slide29.xml><?xml version="1.0" encoding="utf-8"?>
+<p:sld xmlns:a="http://schemas.openxmlformats.org/drawingml/2006/main" xmlns:r="http://schemas.openxmlformats.org/officeDocument/2006/relationships" xmlns:p="http://schemas.openxmlformats.org/presentationml/2006/main">
+  <p:cSld>
+    <p:spTree>
+      <p:nvGrpSpPr>
+        <p:cNvPr id="1" name=""/>
+        <p:cNvGrpSpPr/>
+        <p:nvPr/>
+      </p:nvGrpSpPr>
+      <p:grpSpPr>
+        <a:xfrm>
+          <a:off x="0" y="0"/>
+          <a:ext cx="0" cy="0"/>
+          <a:chOff x="0" y="0"/>
+          <a:chExt cx="0" cy="0"/>
+        </a:xfrm>
+      </p:grpSpPr>
+      <p:pic>
+        <p:nvPicPr>
+          <p:cNvPr id="2" name="Imagen 1">
+            <a:extLst>
+              <a:ext uri="{FF2B5EF4-FFF2-40B4-BE49-F238E27FC236}">
+                <a16:creationId xmlns:a16="http://schemas.microsoft.com/office/drawing/2014/main" id="{9CB98139-364B-4C5E-8B51-358D6BACA91E}"/>
+              </a:ext>
+            </a:extLst>
+          </p:cNvPr>
+          <p:cNvPicPr>
+            <a:picLocks noChangeAspect="1"/>
+          </p:cNvPicPr>
+          <p:nvPr/>
+        </p:nvPicPr>
+        <p:blipFill>
+          <a:blip r:embed="rId3"/>
+          <a:stretch>
+            <a:fillRect/>
+          </a:stretch>
+        </p:blipFill>
+        <p:spPr>
+          <a:xfrm>
+            <a:off x="1552575" y="990600"/>
+            <a:ext cx="9086850" cy="4876800"/>
+          </a:xfrm>
+          <a:prstGeom prst="rect">
+            <a:avLst/>
+          </a:prstGeom>
+        </p:spPr>
+      </p:pic>
+    </p:spTree>
+    <p:extLst>
+      <p:ext uri="{BB962C8B-B14F-4D97-AF65-F5344CB8AC3E}">
+        <p14:creationId xmlns:p14="http://schemas.microsoft.com/office/powerpoint/2010/main" val="162520676"/>
       </p:ext>
     </p:extLst>
   </p:cSld>
@@ -6721,6 +10231,605 @@
     <p:extLst>
       <p:ext uri="{BB962C8B-B14F-4D97-AF65-F5344CB8AC3E}">
         <p14:creationId xmlns:p14="http://schemas.microsoft.com/office/powerpoint/2010/main" val="848915423"/>
+      </p:ext>
+    </p:extLst>
+  </p:cSld>
+  <p:clrMapOvr>
+    <a:masterClrMapping/>
+  </p:clrMapOvr>
+</p:sld>
+</file>
+
+<file path=ppt/slides/slide30.xml><?xml version="1.0" encoding="utf-8"?>
+<p:sld xmlns:a="http://schemas.openxmlformats.org/drawingml/2006/main" xmlns:r="http://schemas.openxmlformats.org/officeDocument/2006/relationships" xmlns:p="http://schemas.openxmlformats.org/presentationml/2006/main">
+  <p:cSld>
+    <p:spTree>
+      <p:nvGrpSpPr>
+        <p:cNvPr id="1" name=""/>
+        <p:cNvGrpSpPr/>
+        <p:nvPr/>
+      </p:nvGrpSpPr>
+      <p:grpSpPr>
+        <a:xfrm>
+          <a:off x="0" y="0"/>
+          <a:ext cx="0" cy="0"/>
+          <a:chOff x="0" y="0"/>
+          <a:chExt cx="0" cy="0"/>
+        </a:xfrm>
+      </p:grpSpPr>
+      <p:pic>
+        <p:nvPicPr>
+          <p:cNvPr id="2" name="Imagen 1">
+            <a:extLst>
+              <a:ext uri="{FF2B5EF4-FFF2-40B4-BE49-F238E27FC236}">
+                <a16:creationId xmlns:a16="http://schemas.microsoft.com/office/drawing/2014/main" id="{EE2A63C7-E6E8-49FA-9CBE-0234C2161756}"/>
+              </a:ext>
+            </a:extLst>
+          </p:cNvPr>
+          <p:cNvPicPr>
+            <a:picLocks noChangeAspect="1"/>
+          </p:cNvPicPr>
+          <p:nvPr/>
+        </p:nvPicPr>
+        <p:blipFill>
+          <a:blip r:embed="rId3"/>
+          <a:stretch>
+            <a:fillRect/>
+          </a:stretch>
+        </p:blipFill>
+        <p:spPr>
+          <a:xfrm>
+            <a:off x="1433512" y="990600"/>
+            <a:ext cx="9324975" cy="4876800"/>
+          </a:xfrm>
+          <a:prstGeom prst="rect">
+            <a:avLst/>
+          </a:prstGeom>
+        </p:spPr>
+      </p:pic>
+    </p:spTree>
+    <p:extLst>
+      <p:ext uri="{BB962C8B-B14F-4D97-AF65-F5344CB8AC3E}">
+        <p14:creationId xmlns:p14="http://schemas.microsoft.com/office/powerpoint/2010/main" val="1011729335"/>
+      </p:ext>
+    </p:extLst>
+  </p:cSld>
+  <p:clrMapOvr>
+    <a:masterClrMapping/>
+  </p:clrMapOvr>
+</p:sld>
+</file>
+
+<file path=ppt/slides/slide31.xml><?xml version="1.0" encoding="utf-8"?>
+<p:sld xmlns:a="http://schemas.openxmlformats.org/drawingml/2006/main" xmlns:r="http://schemas.openxmlformats.org/officeDocument/2006/relationships" xmlns:p="http://schemas.openxmlformats.org/presentationml/2006/main">
+  <p:cSld>
+    <p:spTree>
+      <p:nvGrpSpPr>
+        <p:cNvPr id="1" name=""/>
+        <p:cNvGrpSpPr/>
+        <p:nvPr/>
+      </p:nvGrpSpPr>
+      <p:grpSpPr>
+        <a:xfrm>
+          <a:off x="0" y="0"/>
+          <a:ext cx="0" cy="0"/>
+          <a:chOff x="0" y="0"/>
+          <a:chExt cx="0" cy="0"/>
+        </a:xfrm>
+      </p:grpSpPr>
+      <p:pic>
+        <p:nvPicPr>
+          <p:cNvPr id="2" name="Imagen 1">
+            <a:extLst>
+              <a:ext uri="{FF2B5EF4-FFF2-40B4-BE49-F238E27FC236}">
+                <a16:creationId xmlns:a16="http://schemas.microsoft.com/office/drawing/2014/main" id="{CFE36FE5-9CD6-4156-A0FB-AEA2C106C2E3}"/>
+              </a:ext>
+            </a:extLst>
+          </p:cNvPr>
+          <p:cNvPicPr>
+            <a:picLocks noChangeAspect="1"/>
+          </p:cNvPicPr>
+          <p:nvPr/>
+        </p:nvPicPr>
+        <p:blipFill>
+          <a:blip r:embed="rId3"/>
+          <a:stretch>
+            <a:fillRect/>
+          </a:stretch>
+        </p:blipFill>
+        <p:spPr>
+          <a:xfrm>
+            <a:off x="1433512" y="990600"/>
+            <a:ext cx="9324975" cy="4876800"/>
+          </a:xfrm>
+          <a:prstGeom prst="rect">
+            <a:avLst/>
+          </a:prstGeom>
+        </p:spPr>
+      </p:pic>
+    </p:spTree>
+    <p:extLst>
+      <p:ext uri="{BB962C8B-B14F-4D97-AF65-F5344CB8AC3E}">
+        <p14:creationId xmlns:p14="http://schemas.microsoft.com/office/powerpoint/2010/main" val="499794335"/>
+      </p:ext>
+    </p:extLst>
+  </p:cSld>
+  <p:clrMapOvr>
+    <a:masterClrMapping/>
+  </p:clrMapOvr>
+</p:sld>
+</file>
+
+<file path=ppt/slides/slide32.xml><?xml version="1.0" encoding="utf-8"?>
+<p:sld xmlns:a="http://schemas.openxmlformats.org/drawingml/2006/main" xmlns:r="http://schemas.openxmlformats.org/officeDocument/2006/relationships" xmlns:p="http://schemas.openxmlformats.org/presentationml/2006/main">
+  <p:cSld>
+    <p:spTree>
+      <p:nvGrpSpPr>
+        <p:cNvPr id="1" name=""/>
+        <p:cNvGrpSpPr/>
+        <p:nvPr/>
+      </p:nvGrpSpPr>
+      <p:grpSpPr>
+        <a:xfrm>
+          <a:off x="0" y="0"/>
+          <a:ext cx="0" cy="0"/>
+          <a:chOff x="0" y="0"/>
+          <a:chExt cx="0" cy="0"/>
+        </a:xfrm>
+      </p:grpSpPr>
+      <p:pic>
+        <p:nvPicPr>
+          <p:cNvPr id="2" name="Imagen 1">
+            <a:extLst>
+              <a:ext uri="{FF2B5EF4-FFF2-40B4-BE49-F238E27FC236}">
+                <a16:creationId xmlns:a16="http://schemas.microsoft.com/office/drawing/2014/main" id="{56D95FD6-5938-4A80-BBFE-27562115E964}"/>
+              </a:ext>
+            </a:extLst>
+          </p:cNvPr>
+          <p:cNvPicPr>
+            <a:picLocks noChangeAspect="1"/>
+          </p:cNvPicPr>
+          <p:nvPr/>
+        </p:nvPicPr>
+        <p:blipFill>
+          <a:blip r:embed="rId3"/>
+          <a:stretch>
+            <a:fillRect/>
+          </a:stretch>
+        </p:blipFill>
+        <p:spPr>
+          <a:xfrm>
+            <a:off x="1287945" y="0"/>
+            <a:ext cx="9616109" cy="6858000"/>
+          </a:xfrm>
+          <a:prstGeom prst="rect">
+            <a:avLst/>
+          </a:prstGeom>
+        </p:spPr>
+      </p:pic>
+    </p:spTree>
+    <p:extLst>
+      <p:ext uri="{BB962C8B-B14F-4D97-AF65-F5344CB8AC3E}">
+        <p14:creationId xmlns:p14="http://schemas.microsoft.com/office/powerpoint/2010/main" val="3385378869"/>
+      </p:ext>
+    </p:extLst>
+  </p:cSld>
+  <p:clrMapOvr>
+    <a:masterClrMapping/>
+  </p:clrMapOvr>
+</p:sld>
+</file>
+
+<file path=ppt/slides/slide33.xml><?xml version="1.0" encoding="utf-8"?>
+<p:sld xmlns:a="http://schemas.openxmlformats.org/drawingml/2006/main" xmlns:r="http://schemas.openxmlformats.org/officeDocument/2006/relationships" xmlns:p="http://schemas.openxmlformats.org/presentationml/2006/main">
+  <p:cSld>
+    <p:spTree>
+      <p:nvGrpSpPr>
+        <p:cNvPr id="1" name=""/>
+        <p:cNvGrpSpPr/>
+        <p:nvPr/>
+      </p:nvGrpSpPr>
+      <p:grpSpPr>
+        <a:xfrm>
+          <a:off x="0" y="0"/>
+          <a:ext cx="0" cy="0"/>
+          <a:chOff x="0" y="0"/>
+          <a:chExt cx="0" cy="0"/>
+        </a:xfrm>
+      </p:grpSpPr>
+      <p:pic>
+        <p:nvPicPr>
+          <p:cNvPr id="5" name="Imagen 4">
+            <a:extLst>
+              <a:ext uri="{FF2B5EF4-FFF2-40B4-BE49-F238E27FC236}">
+                <a16:creationId xmlns:a16="http://schemas.microsoft.com/office/drawing/2014/main" id="{F265D799-1524-42B2-9AE3-5BEA9F033D03}"/>
+              </a:ext>
+            </a:extLst>
+          </p:cNvPr>
+          <p:cNvPicPr>
+            <a:picLocks noChangeAspect="1"/>
+          </p:cNvPicPr>
+          <p:nvPr/>
+        </p:nvPicPr>
+        <p:blipFill rotWithShape="1">
+          <a:blip r:embed="rId3"/>
+          <a:srcRect l="57087"/>
+          <a:stretch/>
+        </p:blipFill>
+        <p:spPr>
+          <a:xfrm>
+            <a:off x="1272000" y="65314"/>
+            <a:ext cx="9288000" cy="6954929"/>
+          </a:xfrm>
+          <a:prstGeom prst="rect">
+            <a:avLst/>
+          </a:prstGeom>
+        </p:spPr>
+      </p:pic>
+    </p:spTree>
+    <p:extLst>
+      <p:ext uri="{BB962C8B-B14F-4D97-AF65-F5344CB8AC3E}">
+        <p14:creationId xmlns:p14="http://schemas.microsoft.com/office/powerpoint/2010/main" val="4035592945"/>
+      </p:ext>
+    </p:extLst>
+  </p:cSld>
+  <p:clrMapOvr>
+    <a:masterClrMapping/>
+  </p:clrMapOvr>
+</p:sld>
+</file>
+
+<file path=ppt/slides/slide34.xml><?xml version="1.0" encoding="utf-8"?>
+<p:sld xmlns:a="http://schemas.openxmlformats.org/drawingml/2006/main" xmlns:r="http://schemas.openxmlformats.org/officeDocument/2006/relationships" xmlns:p="http://schemas.openxmlformats.org/presentationml/2006/main">
+  <p:cSld>
+    <p:spTree>
+      <p:nvGrpSpPr>
+        <p:cNvPr id="1" name=""/>
+        <p:cNvGrpSpPr/>
+        <p:nvPr/>
+      </p:nvGrpSpPr>
+      <p:grpSpPr>
+        <a:xfrm>
+          <a:off x="0" y="0"/>
+          <a:ext cx="0" cy="0"/>
+          <a:chOff x="0" y="0"/>
+          <a:chExt cx="0" cy="0"/>
+        </a:xfrm>
+      </p:grpSpPr>
+      <p:pic>
+        <p:nvPicPr>
+          <p:cNvPr id="2" name="Imagen 1">
+            <a:extLst>
+              <a:ext uri="{FF2B5EF4-FFF2-40B4-BE49-F238E27FC236}">
+                <a16:creationId xmlns:a16="http://schemas.microsoft.com/office/drawing/2014/main" id="{8DAE39AB-7586-4A1A-B02E-E3FCFB6BAF9E}"/>
+              </a:ext>
+            </a:extLst>
+          </p:cNvPr>
+          <p:cNvPicPr>
+            <a:picLocks noChangeAspect="1"/>
+          </p:cNvPicPr>
+          <p:nvPr/>
+        </p:nvPicPr>
+        <p:blipFill>
+          <a:blip r:embed="rId3"/>
+          <a:stretch>
+            <a:fillRect/>
+          </a:stretch>
+        </p:blipFill>
+        <p:spPr>
+          <a:xfrm>
+            <a:off x="1614487" y="319087"/>
+            <a:ext cx="8963025" cy="6219825"/>
+          </a:xfrm>
+          <a:prstGeom prst="rect">
+            <a:avLst/>
+          </a:prstGeom>
+        </p:spPr>
+      </p:pic>
+    </p:spTree>
+    <p:extLst>
+      <p:ext uri="{BB962C8B-B14F-4D97-AF65-F5344CB8AC3E}">
+        <p14:creationId xmlns:p14="http://schemas.microsoft.com/office/powerpoint/2010/main" val="1078851048"/>
+      </p:ext>
+    </p:extLst>
+  </p:cSld>
+  <p:clrMapOvr>
+    <a:masterClrMapping/>
+  </p:clrMapOvr>
+</p:sld>
+</file>
+
+<file path=ppt/slides/slide35.xml><?xml version="1.0" encoding="utf-8"?>
+<p:sld xmlns:a="http://schemas.openxmlformats.org/drawingml/2006/main" xmlns:r="http://schemas.openxmlformats.org/officeDocument/2006/relationships" xmlns:p="http://schemas.openxmlformats.org/presentationml/2006/main">
+  <p:cSld>
+    <p:spTree>
+      <p:nvGrpSpPr>
+        <p:cNvPr id="1" name=""/>
+        <p:cNvGrpSpPr/>
+        <p:nvPr/>
+      </p:nvGrpSpPr>
+      <p:grpSpPr>
+        <a:xfrm>
+          <a:off x="0" y="0"/>
+          <a:ext cx="0" cy="0"/>
+          <a:chOff x="0" y="0"/>
+          <a:chExt cx="0" cy="0"/>
+        </a:xfrm>
+      </p:grpSpPr>
+      <p:pic>
+        <p:nvPicPr>
+          <p:cNvPr id="2" name="Imagen 1">
+            <a:extLst>
+              <a:ext uri="{FF2B5EF4-FFF2-40B4-BE49-F238E27FC236}">
+                <a16:creationId xmlns:a16="http://schemas.microsoft.com/office/drawing/2014/main" id="{A0A27EF9-ADC9-42D1-944B-EEFFC4F2FBC3}"/>
+              </a:ext>
+            </a:extLst>
+          </p:cNvPr>
+          <p:cNvPicPr>
+            <a:picLocks noChangeAspect="1"/>
+          </p:cNvPicPr>
+          <p:nvPr/>
+        </p:nvPicPr>
+        <p:blipFill>
+          <a:blip r:embed="rId3"/>
+          <a:stretch>
+            <a:fillRect/>
+          </a:stretch>
+        </p:blipFill>
+        <p:spPr>
+          <a:xfrm>
+            <a:off x="3305175" y="1695450"/>
+            <a:ext cx="5581650" cy="3467100"/>
+          </a:xfrm>
+          <a:prstGeom prst="rect">
+            <a:avLst/>
+          </a:prstGeom>
+        </p:spPr>
+      </p:pic>
+    </p:spTree>
+    <p:extLst>
+      <p:ext uri="{BB962C8B-B14F-4D97-AF65-F5344CB8AC3E}">
+        <p14:creationId xmlns:p14="http://schemas.microsoft.com/office/powerpoint/2010/main" val="3492633878"/>
+      </p:ext>
+    </p:extLst>
+  </p:cSld>
+  <p:clrMapOvr>
+    <a:masterClrMapping/>
+  </p:clrMapOvr>
+</p:sld>
+</file>
+
+<file path=ppt/slides/slide36.xml><?xml version="1.0" encoding="utf-8"?>
+<p:sld xmlns:a="http://schemas.openxmlformats.org/drawingml/2006/main" xmlns:r="http://schemas.openxmlformats.org/officeDocument/2006/relationships" xmlns:p="http://schemas.openxmlformats.org/presentationml/2006/main">
+  <p:cSld>
+    <p:spTree>
+      <p:nvGrpSpPr>
+        <p:cNvPr id="1" name=""/>
+        <p:cNvGrpSpPr/>
+        <p:nvPr/>
+      </p:nvGrpSpPr>
+      <p:grpSpPr>
+        <a:xfrm>
+          <a:off x="0" y="0"/>
+          <a:ext cx="0" cy="0"/>
+          <a:chOff x="0" y="0"/>
+          <a:chExt cx="0" cy="0"/>
+        </a:xfrm>
+      </p:grpSpPr>
+      <p:pic>
+        <p:nvPicPr>
+          <p:cNvPr id="2" name="Imagen 1">
+            <a:extLst>
+              <a:ext uri="{FF2B5EF4-FFF2-40B4-BE49-F238E27FC236}">
+                <a16:creationId xmlns:a16="http://schemas.microsoft.com/office/drawing/2014/main" id="{D7A6A62A-3D00-4794-A0B8-8C512E847591}"/>
+              </a:ext>
+            </a:extLst>
+          </p:cNvPr>
+          <p:cNvPicPr>
+            <a:picLocks noChangeAspect="1"/>
+          </p:cNvPicPr>
+          <p:nvPr/>
+        </p:nvPicPr>
+        <p:blipFill>
+          <a:blip r:embed="rId3"/>
+          <a:stretch>
+            <a:fillRect/>
+          </a:stretch>
+        </p:blipFill>
+        <p:spPr>
+          <a:xfrm>
+            <a:off x="1287945" y="0"/>
+            <a:ext cx="9616109" cy="6858000"/>
+          </a:xfrm>
+          <a:prstGeom prst="rect">
+            <a:avLst/>
+          </a:prstGeom>
+        </p:spPr>
+      </p:pic>
+    </p:spTree>
+    <p:extLst>
+      <p:ext uri="{BB962C8B-B14F-4D97-AF65-F5344CB8AC3E}">
+        <p14:creationId xmlns:p14="http://schemas.microsoft.com/office/powerpoint/2010/main" val="3359856313"/>
+      </p:ext>
+    </p:extLst>
+  </p:cSld>
+  <p:clrMapOvr>
+    <a:masterClrMapping/>
+  </p:clrMapOvr>
+</p:sld>
+</file>
+
+<file path=ppt/slides/slide37.xml><?xml version="1.0" encoding="utf-8"?>
+<p:sld xmlns:a="http://schemas.openxmlformats.org/drawingml/2006/main" xmlns:r="http://schemas.openxmlformats.org/officeDocument/2006/relationships" xmlns:p="http://schemas.openxmlformats.org/presentationml/2006/main">
+  <p:cSld>
+    <p:spTree>
+      <p:nvGrpSpPr>
+        <p:cNvPr id="1" name=""/>
+        <p:cNvGrpSpPr/>
+        <p:nvPr/>
+      </p:nvGrpSpPr>
+      <p:grpSpPr>
+        <a:xfrm>
+          <a:off x="0" y="0"/>
+          <a:ext cx="0" cy="0"/>
+          <a:chOff x="0" y="0"/>
+          <a:chExt cx="0" cy="0"/>
+        </a:xfrm>
+      </p:grpSpPr>
+      <p:pic>
+        <p:nvPicPr>
+          <p:cNvPr id="2" name="Imagen 1">
+            <a:extLst>
+              <a:ext uri="{FF2B5EF4-FFF2-40B4-BE49-F238E27FC236}">
+                <a16:creationId xmlns:a16="http://schemas.microsoft.com/office/drawing/2014/main" id="{166C8661-A8D8-4312-8227-11545FD970CE}"/>
+              </a:ext>
+            </a:extLst>
+          </p:cNvPr>
+          <p:cNvPicPr>
+            <a:picLocks noChangeAspect="1"/>
+          </p:cNvPicPr>
+          <p:nvPr/>
+        </p:nvPicPr>
+        <p:blipFill>
+          <a:blip r:embed="rId3"/>
+          <a:stretch>
+            <a:fillRect/>
+          </a:stretch>
+        </p:blipFill>
+        <p:spPr>
+          <a:xfrm>
+            <a:off x="1287945" y="0"/>
+            <a:ext cx="9616109" cy="6858000"/>
+          </a:xfrm>
+          <a:prstGeom prst="rect">
+            <a:avLst/>
+          </a:prstGeom>
+        </p:spPr>
+      </p:pic>
+    </p:spTree>
+    <p:extLst>
+      <p:ext uri="{BB962C8B-B14F-4D97-AF65-F5344CB8AC3E}">
+        <p14:creationId xmlns:p14="http://schemas.microsoft.com/office/powerpoint/2010/main" val="2027651639"/>
+      </p:ext>
+    </p:extLst>
+  </p:cSld>
+  <p:clrMapOvr>
+    <a:masterClrMapping/>
+  </p:clrMapOvr>
+</p:sld>
+</file>
+
+<file path=ppt/slides/slide38.xml><?xml version="1.0" encoding="utf-8"?>
+<p:sld xmlns:a="http://schemas.openxmlformats.org/drawingml/2006/main" xmlns:r="http://schemas.openxmlformats.org/officeDocument/2006/relationships" xmlns:p="http://schemas.openxmlformats.org/presentationml/2006/main">
+  <p:cSld>
+    <p:spTree>
+      <p:nvGrpSpPr>
+        <p:cNvPr id="1" name=""/>
+        <p:cNvGrpSpPr/>
+        <p:nvPr/>
+      </p:nvGrpSpPr>
+      <p:grpSpPr>
+        <a:xfrm>
+          <a:off x="0" y="0"/>
+          <a:ext cx="0" cy="0"/>
+          <a:chOff x="0" y="0"/>
+          <a:chExt cx="0" cy="0"/>
+        </a:xfrm>
+      </p:grpSpPr>
+      <p:pic>
+        <p:nvPicPr>
+          <p:cNvPr id="2" name="Imagen 1">
+            <a:extLst>
+              <a:ext uri="{FF2B5EF4-FFF2-40B4-BE49-F238E27FC236}">
+                <a16:creationId xmlns:a16="http://schemas.microsoft.com/office/drawing/2014/main" id="{3F96E1F9-1A23-4A63-8ADB-FA1946295818}"/>
+              </a:ext>
+            </a:extLst>
+          </p:cNvPr>
+          <p:cNvPicPr>
+            <a:picLocks noChangeAspect="1"/>
+          </p:cNvPicPr>
+          <p:nvPr/>
+        </p:nvPicPr>
+        <p:blipFill>
+          <a:blip r:embed="rId3"/>
+          <a:stretch>
+            <a:fillRect/>
+          </a:stretch>
+        </p:blipFill>
+        <p:spPr>
+          <a:xfrm>
+            <a:off x="1272791" y="0"/>
+            <a:ext cx="9646418" cy="6858000"/>
+          </a:xfrm>
+          <a:prstGeom prst="rect">
+            <a:avLst/>
+          </a:prstGeom>
+        </p:spPr>
+      </p:pic>
+    </p:spTree>
+    <p:extLst>
+      <p:ext uri="{BB962C8B-B14F-4D97-AF65-F5344CB8AC3E}">
+        <p14:creationId xmlns:p14="http://schemas.microsoft.com/office/powerpoint/2010/main" val="193434649"/>
+      </p:ext>
+    </p:extLst>
+  </p:cSld>
+  <p:clrMapOvr>
+    <a:masterClrMapping/>
+  </p:clrMapOvr>
+</p:sld>
+</file>
+
+<file path=ppt/slides/slide39.xml><?xml version="1.0" encoding="utf-8"?>
+<p:sld xmlns:a="http://schemas.openxmlformats.org/drawingml/2006/main" xmlns:r="http://schemas.openxmlformats.org/officeDocument/2006/relationships" xmlns:p="http://schemas.openxmlformats.org/presentationml/2006/main">
+  <p:cSld>
+    <p:spTree>
+      <p:nvGrpSpPr>
+        <p:cNvPr id="1" name=""/>
+        <p:cNvGrpSpPr/>
+        <p:nvPr/>
+      </p:nvGrpSpPr>
+      <p:grpSpPr>
+        <a:xfrm>
+          <a:off x="0" y="0"/>
+          <a:ext cx="0" cy="0"/>
+          <a:chOff x="0" y="0"/>
+          <a:chExt cx="0" cy="0"/>
+        </a:xfrm>
+      </p:grpSpPr>
+      <p:pic>
+        <p:nvPicPr>
+          <p:cNvPr id="2" name="Imagen 1">
+            <a:extLst>
+              <a:ext uri="{FF2B5EF4-FFF2-40B4-BE49-F238E27FC236}">
+                <a16:creationId xmlns:a16="http://schemas.microsoft.com/office/drawing/2014/main" id="{75D697E6-36BD-422D-AD8F-F108F0EF0392}"/>
+              </a:ext>
+            </a:extLst>
+          </p:cNvPr>
+          <p:cNvPicPr>
+            <a:picLocks noChangeAspect="1"/>
+          </p:cNvPicPr>
+          <p:nvPr/>
+        </p:nvPicPr>
+        <p:blipFill>
+          <a:blip r:embed="rId3"/>
+          <a:stretch>
+            <a:fillRect/>
+          </a:stretch>
+        </p:blipFill>
+        <p:spPr>
+          <a:xfrm>
+            <a:off x="1287945" y="0"/>
+            <a:ext cx="9616109" cy="6858000"/>
+          </a:xfrm>
+          <a:prstGeom prst="rect">
+            <a:avLst/>
+          </a:prstGeom>
+        </p:spPr>
+      </p:pic>
+    </p:spTree>
+    <p:extLst>
+      <p:ext uri="{BB962C8B-B14F-4D97-AF65-F5344CB8AC3E}">
+        <p14:creationId xmlns:p14="http://schemas.microsoft.com/office/powerpoint/2010/main" val="216495460"/>
       </p:ext>
     </p:extLst>
   </p:cSld>

</xml_diff>

<commit_message>
creación de API, creación de proyecto Xamarin
</commit_message>
<xml_diff>
--- a/Proyecto desde CERO.pptx
+++ b/Proyecto desde CERO.pptx
@@ -5,7 +5,7 @@
     <p:sldMasterId id="2147483648" r:id="rId1"/>
   </p:sldMasterIdLst>
   <p:notesMasterIdLst>
-    <p:notesMasterId r:id="rId41"/>
+    <p:notesMasterId r:id="rId60"/>
   </p:notesMasterIdLst>
   <p:sldIdLst>
     <p:sldId id="256" r:id="rId2"/>
@@ -47,6 +47,25 @@
     <p:sldId id="292" r:id="rId38"/>
     <p:sldId id="293" r:id="rId39"/>
     <p:sldId id="294" r:id="rId40"/>
+    <p:sldId id="295" r:id="rId41"/>
+    <p:sldId id="296" r:id="rId42"/>
+    <p:sldId id="297" r:id="rId43"/>
+    <p:sldId id="298" r:id="rId44"/>
+    <p:sldId id="299" r:id="rId45"/>
+    <p:sldId id="300" r:id="rId46"/>
+    <p:sldId id="301" r:id="rId47"/>
+    <p:sldId id="302" r:id="rId48"/>
+    <p:sldId id="303" r:id="rId49"/>
+    <p:sldId id="304" r:id="rId50"/>
+    <p:sldId id="305" r:id="rId51"/>
+    <p:sldId id="306" r:id="rId52"/>
+    <p:sldId id="307" r:id="rId53"/>
+    <p:sldId id="308" r:id="rId54"/>
+    <p:sldId id="309" r:id="rId55"/>
+    <p:sldId id="310" r:id="rId56"/>
+    <p:sldId id="311" r:id="rId57"/>
+    <p:sldId id="312" r:id="rId58"/>
+    <p:sldId id="313" r:id="rId59"/>
   </p:sldIdLst>
   <p:sldSz cx="12192000" cy="6858000"/>
   <p:notesSz cx="6858000" cy="9144000"/>
@@ -235,7 +254,7 @@
           <a:p>
             <a:fld id="{46FD0385-094A-4441-9213-65E004583FF4}" type="datetimeFigureOut">
               <a:rPr lang="es-MX" smtClean="0"/>
-              <a:t>04/11/2019</a:t>
+              <a:t>06/11/2019</a:t>
             </a:fld>
             <a:endParaRPr lang="es-MX"/>
           </a:p>
@@ -5054,6 +5073,186 @@
 </p:notes>
 </file>
 
+<file path=ppt/notesSlides/notesSlide38.xml><?xml version="1.0" encoding="utf-8"?>
+<p:notes xmlns:a="http://schemas.openxmlformats.org/drawingml/2006/main" xmlns:r="http://schemas.openxmlformats.org/officeDocument/2006/relationships" xmlns:p="http://schemas.openxmlformats.org/presentationml/2006/main">
+  <p:cSld>
+    <p:spTree>
+      <p:nvGrpSpPr>
+        <p:cNvPr id="1" name=""/>
+        <p:cNvGrpSpPr/>
+        <p:nvPr/>
+      </p:nvGrpSpPr>
+      <p:grpSpPr>
+        <a:xfrm>
+          <a:off x="0" y="0"/>
+          <a:ext cx="0" cy="0"/>
+          <a:chOff x="0" y="0"/>
+          <a:chExt cx="0" cy="0"/>
+        </a:xfrm>
+      </p:grpSpPr>
+      <p:sp>
+        <p:nvSpPr>
+          <p:cNvPr id="2" name="Marcador de imagen de diapositiva 1"/>
+          <p:cNvSpPr>
+            <a:spLocks noGrp="1" noRot="1" noChangeAspect="1"/>
+          </p:cNvSpPr>
+          <p:nvPr>
+            <p:ph type="sldImg"/>
+          </p:nvPr>
+        </p:nvSpPr>
+        <p:spPr/>
+      </p:sp>
+      <p:sp>
+        <p:nvSpPr>
+          <p:cNvPr id="3" name="Marcador de notas 2"/>
+          <p:cNvSpPr>
+            <a:spLocks noGrp="1"/>
+          </p:cNvSpPr>
+          <p:nvPr>
+            <p:ph type="body" idx="1"/>
+          </p:nvPr>
+        </p:nvSpPr>
+        <p:spPr/>
+        <p:txBody>
+          <a:bodyPr/>
+          <a:lstStyle/>
+          <a:p>
+            <a:r>
+              <a:rPr lang="es-ES" dirty="0"/>
+              <a:t>Creamos la carpeta API en la carpeta </a:t>
+            </a:r>
+            <a:r>
+              <a:rPr lang="es-ES" dirty="0" err="1"/>
+              <a:t>controllers</a:t>
+            </a:r>
+            <a:endParaRPr lang="es-MX" dirty="0"/>
+          </a:p>
+        </p:txBody>
+      </p:sp>
+      <p:sp>
+        <p:nvSpPr>
+          <p:cNvPr id="4" name="Marcador de número de diapositiva 3"/>
+          <p:cNvSpPr>
+            <a:spLocks noGrp="1"/>
+          </p:cNvSpPr>
+          <p:nvPr>
+            <p:ph type="sldNum" sz="quarter" idx="5"/>
+          </p:nvPr>
+        </p:nvSpPr>
+        <p:spPr/>
+        <p:txBody>
+          <a:bodyPr/>
+          <a:lstStyle/>
+          <a:p>
+            <a:fld id="{785ED18C-E05F-4FD2-A782-FC24AC302660}" type="slidenum">
+              <a:rPr lang="es-MX" smtClean="0"/>
+              <a:t>40</a:t>
+            </a:fld>
+            <a:endParaRPr lang="es-MX"/>
+          </a:p>
+        </p:txBody>
+      </p:sp>
+    </p:spTree>
+    <p:extLst>
+      <p:ext uri="{BB962C8B-B14F-4D97-AF65-F5344CB8AC3E}">
+        <p14:creationId xmlns:p14="http://schemas.microsoft.com/office/powerpoint/2010/main" val="887502137"/>
+      </p:ext>
+    </p:extLst>
+  </p:cSld>
+  <p:clrMapOvr>
+    <a:masterClrMapping/>
+  </p:clrMapOvr>
+</p:notes>
+</file>
+
+<file path=ppt/notesSlides/notesSlide39.xml><?xml version="1.0" encoding="utf-8"?>
+<p:notes xmlns:a="http://schemas.openxmlformats.org/drawingml/2006/main" xmlns:r="http://schemas.openxmlformats.org/officeDocument/2006/relationships" xmlns:p="http://schemas.openxmlformats.org/presentationml/2006/main">
+  <p:cSld>
+    <p:spTree>
+      <p:nvGrpSpPr>
+        <p:cNvPr id="1" name=""/>
+        <p:cNvGrpSpPr/>
+        <p:nvPr/>
+      </p:nvGrpSpPr>
+      <p:grpSpPr>
+        <a:xfrm>
+          <a:off x="0" y="0"/>
+          <a:ext cx="0" cy="0"/>
+          <a:chOff x="0" y="0"/>
+          <a:chExt cx="0" cy="0"/>
+        </a:xfrm>
+      </p:grpSpPr>
+      <p:sp>
+        <p:nvSpPr>
+          <p:cNvPr id="2" name="Marcador de imagen de diapositiva 1"/>
+          <p:cNvSpPr>
+            <a:spLocks noGrp="1" noRot="1" noChangeAspect="1"/>
+          </p:cNvSpPr>
+          <p:nvPr>
+            <p:ph type="sldImg"/>
+          </p:nvPr>
+        </p:nvSpPr>
+        <p:spPr/>
+      </p:sp>
+      <p:sp>
+        <p:nvSpPr>
+          <p:cNvPr id="3" name="Marcador de notas 2"/>
+          <p:cNvSpPr>
+            <a:spLocks noGrp="1"/>
+          </p:cNvSpPr>
+          <p:nvPr>
+            <p:ph type="body" idx="1"/>
+          </p:nvPr>
+        </p:nvSpPr>
+        <p:spPr/>
+        <p:txBody>
+          <a:bodyPr/>
+          <a:lstStyle/>
+          <a:p>
+            <a:r>
+              <a:rPr lang="es-ES" dirty="0"/>
+              <a:t>Creamos una clase para el API controlador de productos</a:t>
+            </a:r>
+            <a:endParaRPr lang="es-MX" dirty="0"/>
+          </a:p>
+        </p:txBody>
+      </p:sp>
+      <p:sp>
+        <p:nvSpPr>
+          <p:cNvPr id="4" name="Marcador de número de diapositiva 3"/>
+          <p:cNvSpPr>
+            <a:spLocks noGrp="1"/>
+          </p:cNvSpPr>
+          <p:nvPr>
+            <p:ph type="sldNum" sz="quarter" idx="5"/>
+          </p:nvPr>
+        </p:nvSpPr>
+        <p:spPr/>
+        <p:txBody>
+          <a:bodyPr/>
+          <a:lstStyle/>
+          <a:p>
+            <a:fld id="{785ED18C-E05F-4FD2-A782-FC24AC302660}" type="slidenum">
+              <a:rPr lang="es-MX" smtClean="0"/>
+              <a:t>41</a:t>
+            </a:fld>
+            <a:endParaRPr lang="es-MX"/>
+          </a:p>
+        </p:txBody>
+      </p:sp>
+    </p:spTree>
+    <p:extLst>
+      <p:ext uri="{BB962C8B-B14F-4D97-AF65-F5344CB8AC3E}">
+        <p14:creationId xmlns:p14="http://schemas.microsoft.com/office/powerpoint/2010/main" val="998731469"/>
+      </p:ext>
+    </p:extLst>
+  </p:cSld>
+  <p:clrMapOvr>
+    <a:masterClrMapping/>
+  </p:clrMapOvr>
+</p:notes>
+</file>
+
 <file path=ppt/notesSlides/notesSlide4.xml><?xml version="1.0" encoding="utf-8"?>
 <p:notes xmlns:a="http://schemas.openxmlformats.org/drawingml/2006/main" xmlns:r="http://schemas.openxmlformats.org/officeDocument/2006/relationships" xmlns:p="http://schemas.openxmlformats.org/presentationml/2006/main">
   <p:cSld>
@@ -5132,6 +5331,2323 @@
     <p:extLst>
       <p:ext uri="{BB962C8B-B14F-4D97-AF65-F5344CB8AC3E}">
         <p14:creationId xmlns:p14="http://schemas.microsoft.com/office/powerpoint/2010/main" val="3036930051"/>
+      </p:ext>
+    </p:extLst>
+  </p:cSld>
+  <p:clrMapOvr>
+    <a:masterClrMapping/>
+  </p:clrMapOvr>
+</p:notes>
+</file>
+
+<file path=ppt/notesSlides/notesSlide40.xml><?xml version="1.0" encoding="utf-8"?>
+<p:notes xmlns:a="http://schemas.openxmlformats.org/drawingml/2006/main" xmlns:r="http://schemas.openxmlformats.org/officeDocument/2006/relationships" xmlns:p="http://schemas.openxmlformats.org/presentationml/2006/main">
+  <p:cSld>
+    <p:spTree>
+      <p:nvGrpSpPr>
+        <p:cNvPr id="1" name=""/>
+        <p:cNvGrpSpPr/>
+        <p:nvPr/>
+      </p:nvGrpSpPr>
+      <p:grpSpPr>
+        <a:xfrm>
+          <a:off x="0" y="0"/>
+          <a:ext cx="0" cy="0"/>
+          <a:chOff x="0" y="0"/>
+          <a:chExt cx="0" cy="0"/>
+        </a:xfrm>
+      </p:grpSpPr>
+      <p:sp>
+        <p:nvSpPr>
+          <p:cNvPr id="2" name="Marcador de imagen de diapositiva 1"/>
+          <p:cNvSpPr>
+            <a:spLocks noGrp="1" noRot="1" noChangeAspect="1"/>
+          </p:cNvSpPr>
+          <p:nvPr>
+            <p:ph type="sldImg"/>
+          </p:nvPr>
+        </p:nvSpPr>
+        <p:spPr/>
+      </p:sp>
+      <p:sp>
+        <p:nvSpPr>
+          <p:cNvPr id="3" name="Marcador de notas 2"/>
+          <p:cNvSpPr>
+            <a:spLocks noGrp="1"/>
+          </p:cNvSpPr>
+          <p:nvPr>
+            <p:ph type="body" idx="1"/>
+          </p:nvPr>
+        </p:nvSpPr>
+        <p:spPr/>
+        <p:txBody>
+          <a:bodyPr/>
+          <a:lstStyle/>
+          <a:p>
+            <a:r>
+              <a:rPr lang="es-MX" sz="1200" kern="1200" dirty="0" err="1">
+                <a:solidFill>
+                  <a:schemeClr val="tx1"/>
+                </a:solidFill>
+                <a:latin typeface="+mn-lt"/>
+                <a:ea typeface="+mn-ea"/>
+                <a:cs typeface="+mn-cs"/>
+              </a:rPr>
+              <a:t>namespace</a:t>
+            </a:r>
+            <a:r>
+              <a:rPr lang="es-MX" sz="1200" kern="1200" dirty="0">
+                <a:solidFill>
+                  <a:schemeClr val="tx1"/>
+                </a:solidFill>
+                <a:latin typeface="+mn-lt"/>
+                <a:ea typeface="+mn-ea"/>
+                <a:cs typeface="+mn-cs"/>
+              </a:rPr>
+              <a:t> </a:t>
+            </a:r>
+            <a:r>
+              <a:rPr lang="es-MX" sz="1200" kern="1200" dirty="0" err="1">
+                <a:solidFill>
+                  <a:schemeClr val="tx1"/>
+                </a:solidFill>
+                <a:latin typeface="+mn-lt"/>
+                <a:ea typeface="+mn-ea"/>
+                <a:cs typeface="+mn-cs"/>
+              </a:rPr>
+              <a:t>Paw.Web.Controllers.API</a:t>
+            </a:r>
+            <a:endParaRPr lang="es-MX" sz="1200" kern="1200" dirty="0">
+              <a:solidFill>
+                <a:schemeClr val="tx1"/>
+              </a:solidFill>
+              <a:latin typeface="+mn-lt"/>
+              <a:ea typeface="+mn-ea"/>
+              <a:cs typeface="+mn-cs"/>
+            </a:endParaRPr>
+          </a:p>
+          <a:p>
+            <a:r>
+              <a:rPr lang="es-MX" sz="1200" kern="1200" dirty="0">
+                <a:solidFill>
+                  <a:schemeClr val="tx1"/>
+                </a:solidFill>
+                <a:latin typeface="+mn-lt"/>
+                <a:ea typeface="+mn-ea"/>
+                <a:cs typeface="+mn-cs"/>
+              </a:rPr>
+              <a:t>{</a:t>
+            </a:r>
+          </a:p>
+          <a:p>
+            <a:r>
+              <a:rPr lang="es-MX" sz="1200" kern="1200" dirty="0">
+                <a:solidFill>
+                  <a:schemeClr val="tx1"/>
+                </a:solidFill>
+                <a:latin typeface="+mn-lt"/>
+                <a:ea typeface="+mn-ea"/>
+                <a:cs typeface="+mn-cs"/>
+              </a:rPr>
+              <a:t>    </a:t>
+            </a:r>
+            <a:r>
+              <a:rPr lang="es-MX" sz="1200" kern="1200" dirty="0" err="1">
+                <a:solidFill>
+                  <a:schemeClr val="tx1"/>
+                </a:solidFill>
+                <a:latin typeface="+mn-lt"/>
+                <a:ea typeface="+mn-ea"/>
+                <a:cs typeface="+mn-cs"/>
+              </a:rPr>
+              <a:t>using</a:t>
+            </a:r>
+            <a:r>
+              <a:rPr lang="es-MX" sz="1200" kern="1200" dirty="0">
+                <a:solidFill>
+                  <a:schemeClr val="tx1"/>
+                </a:solidFill>
+                <a:latin typeface="+mn-lt"/>
+                <a:ea typeface="+mn-ea"/>
+                <a:cs typeface="+mn-cs"/>
+              </a:rPr>
+              <a:t> </a:t>
+            </a:r>
+            <a:r>
+              <a:rPr lang="es-MX" sz="1200" kern="1200" dirty="0" err="1">
+                <a:solidFill>
+                  <a:schemeClr val="tx1"/>
+                </a:solidFill>
+                <a:latin typeface="+mn-lt"/>
+                <a:ea typeface="+mn-ea"/>
+                <a:cs typeface="+mn-cs"/>
+              </a:rPr>
+              <a:t>Microsoft.AspNetCore.Mvc</a:t>
+            </a:r>
+            <a:r>
+              <a:rPr lang="es-MX" sz="1200" kern="1200" dirty="0">
+                <a:solidFill>
+                  <a:schemeClr val="tx1"/>
+                </a:solidFill>
+                <a:latin typeface="+mn-lt"/>
+                <a:ea typeface="+mn-ea"/>
+                <a:cs typeface="+mn-cs"/>
+              </a:rPr>
+              <a:t>;</a:t>
+            </a:r>
+          </a:p>
+          <a:p>
+            <a:endParaRPr lang="es-MX" sz="1200" kern="1200" dirty="0">
+              <a:solidFill>
+                <a:schemeClr val="tx1"/>
+              </a:solidFill>
+              <a:latin typeface="+mn-lt"/>
+              <a:ea typeface="+mn-ea"/>
+              <a:cs typeface="+mn-cs"/>
+            </a:endParaRPr>
+          </a:p>
+          <a:p>
+            <a:r>
+              <a:rPr lang="es-MX" sz="1200" kern="1200" dirty="0">
+                <a:solidFill>
+                  <a:schemeClr val="tx1"/>
+                </a:solidFill>
+                <a:latin typeface="+mn-lt"/>
+                <a:ea typeface="+mn-ea"/>
+                <a:cs typeface="+mn-cs"/>
+              </a:rPr>
+              <a:t>    </a:t>
+            </a:r>
+            <a:r>
+              <a:rPr lang="es-MX" sz="1200" kern="1200" dirty="0" err="1">
+                <a:solidFill>
+                  <a:schemeClr val="tx1"/>
+                </a:solidFill>
+                <a:latin typeface="+mn-lt"/>
+                <a:ea typeface="+mn-ea"/>
+                <a:cs typeface="+mn-cs"/>
+              </a:rPr>
+              <a:t>public</a:t>
+            </a:r>
+            <a:r>
+              <a:rPr lang="es-MX" sz="1200" kern="1200" dirty="0">
+                <a:solidFill>
+                  <a:schemeClr val="tx1"/>
+                </a:solidFill>
+                <a:latin typeface="+mn-lt"/>
+                <a:ea typeface="+mn-ea"/>
+                <a:cs typeface="+mn-cs"/>
+              </a:rPr>
+              <a:t> </a:t>
+            </a:r>
+            <a:r>
+              <a:rPr lang="es-MX" sz="1200" kern="1200" dirty="0" err="1">
+                <a:solidFill>
+                  <a:schemeClr val="tx1"/>
+                </a:solidFill>
+                <a:latin typeface="+mn-lt"/>
+                <a:ea typeface="+mn-ea"/>
+                <a:cs typeface="+mn-cs"/>
+              </a:rPr>
+              <a:t>class</a:t>
+            </a:r>
+            <a:r>
+              <a:rPr lang="es-MX" sz="1200" kern="1200" dirty="0">
+                <a:solidFill>
+                  <a:schemeClr val="tx1"/>
+                </a:solidFill>
+                <a:latin typeface="+mn-lt"/>
+                <a:ea typeface="+mn-ea"/>
+                <a:cs typeface="+mn-cs"/>
+              </a:rPr>
+              <a:t> </a:t>
+            </a:r>
+            <a:r>
+              <a:rPr lang="es-MX" sz="1200" kern="1200" dirty="0" err="1">
+                <a:solidFill>
+                  <a:schemeClr val="tx1"/>
+                </a:solidFill>
+                <a:latin typeface="+mn-lt"/>
+                <a:ea typeface="+mn-ea"/>
+                <a:cs typeface="+mn-cs"/>
+              </a:rPr>
+              <a:t>ProductsController:Controller</a:t>
+            </a:r>
+            <a:endParaRPr lang="es-MX" sz="1200" kern="1200" dirty="0">
+              <a:solidFill>
+                <a:schemeClr val="tx1"/>
+              </a:solidFill>
+              <a:latin typeface="+mn-lt"/>
+              <a:ea typeface="+mn-ea"/>
+              <a:cs typeface="+mn-cs"/>
+            </a:endParaRPr>
+          </a:p>
+          <a:p>
+            <a:r>
+              <a:rPr lang="es-MX" sz="1200" kern="1200" dirty="0">
+                <a:solidFill>
+                  <a:schemeClr val="tx1"/>
+                </a:solidFill>
+                <a:latin typeface="+mn-lt"/>
+                <a:ea typeface="+mn-ea"/>
+                <a:cs typeface="+mn-cs"/>
+              </a:rPr>
+              <a:t>    {</a:t>
+            </a:r>
+          </a:p>
+          <a:p>
+            <a:r>
+              <a:rPr lang="es-MX" sz="1200" kern="1200" dirty="0">
+                <a:solidFill>
+                  <a:schemeClr val="tx1"/>
+                </a:solidFill>
+                <a:latin typeface="+mn-lt"/>
+                <a:ea typeface="+mn-ea"/>
+                <a:cs typeface="+mn-cs"/>
+              </a:rPr>
+              <a:t>    }</a:t>
+            </a:r>
+          </a:p>
+          <a:p>
+            <a:r>
+              <a:rPr lang="es-MX" sz="1200" kern="1200" dirty="0">
+                <a:solidFill>
+                  <a:schemeClr val="tx1"/>
+                </a:solidFill>
+                <a:latin typeface="+mn-lt"/>
+                <a:ea typeface="+mn-ea"/>
+                <a:cs typeface="+mn-cs"/>
+              </a:rPr>
+              <a:t>}</a:t>
+            </a:r>
+          </a:p>
+          <a:p>
+            <a:endParaRPr lang="es-MX" dirty="0"/>
+          </a:p>
+        </p:txBody>
+      </p:sp>
+      <p:sp>
+        <p:nvSpPr>
+          <p:cNvPr id="4" name="Marcador de número de diapositiva 3"/>
+          <p:cNvSpPr>
+            <a:spLocks noGrp="1"/>
+          </p:cNvSpPr>
+          <p:nvPr>
+            <p:ph type="sldNum" sz="quarter" idx="5"/>
+          </p:nvPr>
+        </p:nvSpPr>
+        <p:spPr/>
+        <p:txBody>
+          <a:bodyPr/>
+          <a:lstStyle/>
+          <a:p>
+            <a:fld id="{785ED18C-E05F-4FD2-A782-FC24AC302660}" type="slidenum">
+              <a:rPr lang="es-MX" smtClean="0"/>
+              <a:t>42</a:t>
+            </a:fld>
+            <a:endParaRPr lang="es-MX"/>
+          </a:p>
+        </p:txBody>
+      </p:sp>
+    </p:spTree>
+    <p:extLst>
+      <p:ext uri="{BB962C8B-B14F-4D97-AF65-F5344CB8AC3E}">
+        <p14:creationId xmlns:p14="http://schemas.microsoft.com/office/powerpoint/2010/main" val="3165892173"/>
+      </p:ext>
+    </p:extLst>
+  </p:cSld>
+  <p:clrMapOvr>
+    <a:masterClrMapping/>
+  </p:clrMapOvr>
+</p:notes>
+</file>
+
+<file path=ppt/notesSlides/notesSlide41.xml><?xml version="1.0" encoding="utf-8"?>
+<p:notes xmlns:a="http://schemas.openxmlformats.org/drawingml/2006/main" xmlns:r="http://schemas.openxmlformats.org/officeDocument/2006/relationships" xmlns:p="http://schemas.openxmlformats.org/presentationml/2006/main">
+  <p:cSld>
+    <p:spTree>
+      <p:nvGrpSpPr>
+        <p:cNvPr id="1" name=""/>
+        <p:cNvGrpSpPr/>
+        <p:nvPr/>
+      </p:nvGrpSpPr>
+      <p:grpSpPr>
+        <a:xfrm>
+          <a:off x="0" y="0"/>
+          <a:ext cx="0" cy="0"/>
+          <a:chOff x="0" y="0"/>
+          <a:chExt cx="0" cy="0"/>
+        </a:xfrm>
+      </p:grpSpPr>
+      <p:sp>
+        <p:nvSpPr>
+          <p:cNvPr id="2" name="Marcador de imagen de diapositiva 1"/>
+          <p:cNvSpPr>
+            <a:spLocks noGrp="1" noRot="1" noChangeAspect="1"/>
+          </p:cNvSpPr>
+          <p:nvPr>
+            <p:ph type="sldImg"/>
+          </p:nvPr>
+        </p:nvSpPr>
+        <p:spPr/>
+      </p:sp>
+      <p:sp>
+        <p:nvSpPr>
+          <p:cNvPr id="3" name="Marcador de notas 2"/>
+          <p:cNvSpPr>
+            <a:spLocks noGrp="1"/>
+          </p:cNvSpPr>
+          <p:nvPr>
+            <p:ph type="body" idx="1"/>
+          </p:nvPr>
+        </p:nvSpPr>
+        <p:spPr/>
+        <p:txBody>
+          <a:bodyPr/>
+          <a:lstStyle/>
+          <a:p>
+            <a:r>
+              <a:rPr lang="es-ES" dirty="0"/>
+              <a:t>Enrutar el controlador</a:t>
+            </a:r>
+          </a:p>
+          <a:p>
+            <a:r>
+              <a:rPr lang="es-MX" sz="1200" kern="1200" dirty="0" err="1">
+                <a:solidFill>
+                  <a:schemeClr val="tx1"/>
+                </a:solidFill>
+                <a:latin typeface="+mn-lt"/>
+                <a:ea typeface="+mn-ea"/>
+                <a:cs typeface="+mn-cs"/>
+              </a:rPr>
+              <a:t>namespace</a:t>
+            </a:r>
+            <a:r>
+              <a:rPr lang="es-MX" sz="1200" kern="1200" dirty="0">
+                <a:solidFill>
+                  <a:schemeClr val="tx1"/>
+                </a:solidFill>
+                <a:latin typeface="+mn-lt"/>
+                <a:ea typeface="+mn-ea"/>
+                <a:cs typeface="+mn-cs"/>
+              </a:rPr>
+              <a:t> </a:t>
+            </a:r>
+            <a:r>
+              <a:rPr lang="es-MX" sz="1200" kern="1200" dirty="0" err="1">
+                <a:solidFill>
+                  <a:schemeClr val="tx1"/>
+                </a:solidFill>
+                <a:latin typeface="+mn-lt"/>
+                <a:ea typeface="+mn-ea"/>
+                <a:cs typeface="+mn-cs"/>
+              </a:rPr>
+              <a:t>Paw.Web.Controllers.API</a:t>
+            </a:r>
+            <a:endParaRPr lang="es-MX" sz="1200" kern="1200" dirty="0">
+              <a:solidFill>
+                <a:schemeClr val="tx1"/>
+              </a:solidFill>
+              <a:latin typeface="+mn-lt"/>
+              <a:ea typeface="+mn-ea"/>
+              <a:cs typeface="+mn-cs"/>
+            </a:endParaRPr>
+          </a:p>
+          <a:p>
+            <a:r>
+              <a:rPr lang="es-MX" sz="1200" kern="1200" dirty="0">
+                <a:solidFill>
+                  <a:schemeClr val="tx1"/>
+                </a:solidFill>
+                <a:latin typeface="+mn-lt"/>
+                <a:ea typeface="+mn-ea"/>
+                <a:cs typeface="+mn-cs"/>
+              </a:rPr>
+              <a:t>{</a:t>
+            </a:r>
+          </a:p>
+          <a:p>
+            <a:r>
+              <a:rPr lang="es-MX" sz="1200" kern="1200" dirty="0">
+                <a:solidFill>
+                  <a:schemeClr val="tx1"/>
+                </a:solidFill>
+                <a:latin typeface="+mn-lt"/>
+                <a:ea typeface="+mn-ea"/>
+                <a:cs typeface="+mn-cs"/>
+              </a:rPr>
+              <a:t>    </a:t>
+            </a:r>
+            <a:r>
+              <a:rPr lang="es-MX" sz="1200" kern="1200" dirty="0" err="1">
+                <a:solidFill>
+                  <a:schemeClr val="tx1"/>
+                </a:solidFill>
+                <a:latin typeface="+mn-lt"/>
+                <a:ea typeface="+mn-ea"/>
+                <a:cs typeface="+mn-cs"/>
+              </a:rPr>
+              <a:t>using</a:t>
+            </a:r>
+            <a:r>
+              <a:rPr lang="es-MX" sz="1200" kern="1200" dirty="0">
+                <a:solidFill>
+                  <a:schemeClr val="tx1"/>
+                </a:solidFill>
+                <a:latin typeface="+mn-lt"/>
+                <a:ea typeface="+mn-ea"/>
+                <a:cs typeface="+mn-cs"/>
+              </a:rPr>
+              <a:t> </a:t>
+            </a:r>
+            <a:r>
+              <a:rPr lang="es-MX" sz="1200" kern="1200" dirty="0" err="1">
+                <a:solidFill>
+                  <a:schemeClr val="tx1"/>
+                </a:solidFill>
+                <a:latin typeface="+mn-lt"/>
+                <a:ea typeface="+mn-ea"/>
+                <a:cs typeface="+mn-cs"/>
+              </a:rPr>
+              <a:t>Microsoft.AspNetCore.Mvc</a:t>
+            </a:r>
+            <a:r>
+              <a:rPr lang="es-MX" sz="1200" kern="1200" dirty="0">
+                <a:solidFill>
+                  <a:schemeClr val="tx1"/>
+                </a:solidFill>
+                <a:latin typeface="+mn-lt"/>
+                <a:ea typeface="+mn-ea"/>
+                <a:cs typeface="+mn-cs"/>
+              </a:rPr>
+              <a:t>;</a:t>
+            </a:r>
+          </a:p>
+          <a:p>
+            <a:endParaRPr lang="es-MX" sz="1200" kern="1200" dirty="0">
+              <a:solidFill>
+                <a:schemeClr val="tx1"/>
+              </a:solidFill>
+              <a:latin typeface="+mn-lt"/>
+              <a:ea typeface="+mn-ea"/>
+              <a:cs typeface="+mn-cs"/>
+            </a:endParaRPr>
+          </a:p>
+          <a:p>
+            <a:r>
+              <a:rPr lang="es-MX" sz="1200" kern="1200" dirty="0">
+                <a:solidFill>
+                  <a:schemeClr val="tx1"/>
+                </a:solidFill>
+                <a:latin typeface="+mn-lt"/>
+                <a:ea typeface="+mn-ea"/>
+                <a:cs typeface="+mn-cs"/>
+              </a:rPr>
+              <a:t>    [</a:t>
+            </a:r>
+            <a:r>
+              <a:rPr lang="es-MX" sz="1200" kern="1200" dirty="0" err="1">
+                <a:solidFill>
+                  <a:schemeClr val="tx1"/>
+                </a:solidFill>
+                <a:latin typeface="+mn-lt"/>
+                <a:ea typeface="+mn-ea"/>
+                <a:cs typeface="+mn-cs"/>
+              </a:rPr>
+              <a:t>Route</a:t>
+            </a:r>
+            <a:r>
+              <a:rPr lang="es-MX" sz="1200" kern="1200" dirty="0">
+                <a:solidFill>
+                  <a:schemeClr val="tx1"/>
+                </a:solidFill>
+                <a:latin typeface="+mn-lt"/>
+                <a:ea typeface="+mn-ea"/>
+                <a:cs typeface="+mn-cs"/>
+              </a:rPr>
+              <a:t>("api/[</a:t>
+            </a:r>
+            <a:r>
+              <a:rPr lang="es-MX" sz="1200" kern="1200" dirty="0" err="1">
+                <a:solidFill>
+                  <a:schemeClr val="tx1"/>
+                </a:solidFill>
+                <a:latin typeface="+mn-lt"/>
+                <a:ea typeface="+mn-ea"/>
+                <a:cs typeface="+mn-cs"/>
+              </a:rPr>
+              <a:t>Controller</a:t>
+            </a:r>
+            <a:r>
+              <a:rPr lang="es-MX" sz="1200" kern="1200" dirty="0">
+                <a:solidFill>
+                  <a:schemeClr val="tx1"/>
+                </a:solidFill>
+                <a:latin typeface="+mn-lt"/>
+                <a:ea typeface="+mn-ea"/>
+                <a:cs typeface="+mn-cs"/>
+              </a:rPr>
+              <a:t>]")]</a:t>
+            </a:r>
+          </a:p>
+          <a:p>
+            <a:r>
+              <a:rPr lang="es-MX" sz="1200" kern="1200" dirty="0">
+                <a:solidFill>
+                  <a:schemeClr val="tx1"/>
+                </a:solidFill>
+                <a:latin typeface="+mn-lt"/>
+                <a:ea typeface="+mn-ea"/>
+                <a:cs typeface="+mn-cs"/>
+              </a:rPr>
+              <a:t>    </a:t>
+            </a:r>
+            <a:r>
+              <a:rPr lang="es-MX" sz="1200" kern="1200" dirty="0" err="1">
+                <a:solidFill>
+                  <a:schemeClr val="tx1"/>
+                </a:solidFill>
+                <a:latin typeface="+mn-lt"/>
+                <a:ea typeface="+mn-ea"/>
+                <a:cs typeface="+mn-cs"/>
+              </a:rPr>
+              <a:t>public</a:t>
+            </a:r>
+            <a:r>
+              <a:rPr lang="es-MX" sz="1200" kern="1200" dirty="0">
+                <a:solidFill>
+                  <a:schemeClr val="tx1"/>
+                </a:solidFill>
+                <a:latin typeface="+mn-lt"/>
+                <a:ea typeface="+mn-ea"/>
+                <a:cs typeface="+mn-cs"/>
+              </a:rPr>
+              <a:t> </a:t>
+            </a:r>
+            <a:r>
+              <a:rPr lang="es-MX" sz="1200" kern="1200" dirty="0" err="1">
+                <a:solidFill>
+                  <a:schemeClr val="tx1"/>
+                </a:solidFill>
+                <a:latin typeface="+mn-lt"/>
+                <a:ea typeface="+mn-ea"/>
+                <a:cs typeface="+mn-cs"/>
+              </a:rPr>
+              <a:t>class</a:t>
+            </a:r>
+            <a:r>
+              <a:rPr lang="es-MX" sz="1200" kern="1200" dirty="0">
+                <a:solidFill>
+                  <a:schemeClr val="tx1"/>
+                </a:solidFill>
+                <a:latin typeface="+mn-lt"/>
+                <a:ea typeface="+mn-ea"/>
+                <a:cs typeface="+mn-cs"/>
+              </a:rPr>
+              <a:t> </a:t>
+            </a:r>
+            <a:r>
+              <a:rPr lang="es-MX" sz="1200" kern="1200" dirty="0" err="1">
+                <a:solidFill>
+                  <a:schemeClr val="tx1"/>
+                </a:solidFill>
+                <a:latin typeface="+mn-lt"/>
+                <a:ea typeface="+mn-ea"/>
+                <a:cs typeface="+mn-cs"/>
+              </a:rPr>
+              <a:t>ProductsController:Controller</a:t>
+            </a:r>
+            <a:endParaRPr lang="es-MX" sz="1200" kern="1200" dirty="0">
+              <a:solidFill>
+                <a:schemeClr val="tx1"/>
+              </a:solidFill>
+              <a:latin typeface="+mn-lt"/>
+              <a:ea typeface="+mn-ea"/>
+              <a:cs typeface="+mn-cs"/>
+            </a:endParaRPr>
+          </a:p>
+          <a:p>
+            <a:r>
+              <a:rPr lang="es-MX" sz="1200" kern="1200" dirty="0">
+                <a:solidFill>
+                  <a:schemeClr val="tx1"/>
+                </a:solidFill>
+                <a:latin typeface="+mn-lt"/>
+                <a:ea typeface="+mn-ea"/>
+                <a:cs typeface="+mn-cs"/>
+              </a:rPr>
+              <a:t>    {</a:t>
+            </a:r>
+          </a:p>
+          <a:p>
+            <a:r>
+              <a:rPr lang="es-MX" sz="1200" kern="1200" dirty="0">
+                <a:solidFill>
+                  <a:schemeClr val="tx1"/>
+                </a:solidFill>
+                <a:latin typeface="+mn-lt"/>
+                <a:ea typeface="+mn-ea"/>
+                <a:cs typeface="+mn-cs"/>
+              </a:rPr>
+              <a:t>    }</a:t>
+            </a:r>
+          </a:p>
+          <a:p>
+            <a:r>
+              <a:rPr lang="es-MX" sz="1200" kern="1200" dirty="0">
+                <a:solidFill>
+                  <a:schemeClr val="tx1"/>
+                </a:solidFill>
+                <a:latin typeface="+mn-lt"/>
+                <a:ea typeface="+mn-ea"/>
+                <a:cs typeface="+mn-cs"/>
+              </a:rPr>
+              <a:t>}</a:t>
+            </a:r>
+          </a:p>
+          <a:p>
+            <a:endParaRPr lang="es-MX" dirty="0"/>
+          </a:p>
+        </p:txBody>
+      </p:sp>
+      <p:sp>
+        <p:nvSpPr>
+          <p:cNvPr id="4" name="Marcador de número de diapositiva 3"/>
+          <p:cNvSpPr>
+            <a:spLocks noGrp="1"/>
+          </p:cNvSpPr>
+          <p:nvPr>
+            <p:ph type="sldNum" sz="quarter" idx="5"/>
+          </p:nvPr>
+        </p:nvSpPr>
+        <p:spPr/>
+        <p:txBody>
+          <a:bodyPr/>
+          <a:lstStyle/>
+          <a:p>
+            <a:fld id="{785ED18C-E05F-4FD2-A782-FC24AC302660}" type="slidenum">
+              <a:rPr lang="es-MX" smtClean="0"/>
+              <a:t>43</a:t>
+            </a:fld>
+            <a:endParaRPr lang="es-MX"/>
+          </a:p>
+        </p:txBody>
+      </p:sp>
+    </p:spTree>
+    <p:extLst>
+      <p:ext uri="{BB962C8B-B14F-4D97-AF65-F5344CB8AC3E}">
+        <p14:creationId xmlns:p14="http://schemas.microsoft.com/office/powerpoint/2010/main" val="2963305530"/>
+      </p:ext>
+    </p:extLst>
+  </p:cSld>
+  <p:clrMapOvr>
+    <a:masterClrMapping/>
+  </p:clrMapOvr>
+</p:notes>
+</file>
+
+<file path=ppt/notesSlides/notesSlide42.xml><?xml version="1.0" encoding="utf-8"?>
+<p:notes xmlns:a="http://schemas.openxmlformats.org/drawingml/2006/main" xmlns:r="http://schemas.openxmlformats.org/officeDocument/2006/relationships" xmlns:p="http://schemas.openxmlformats.org/presentationml/2006/main">
+  <p:cSld>
+    <p:spTree>
+      <p:nvGrpSpPr>
+        <p:cNvPr id="1" name=""/>
+        <p:cNvGrpSpPr/>
+        <p:nvPr/>
+      </p:nvGrpSpPr>
+      <p:grpSpPr>
+        <a:xfrm>
+          <a:off x="0" y="0"/>
+          <a:ext cx="0" cy="0"/>
+          <a:chOff x="0" y="0"/>
+          <a:chExt cx="0" cy="0"/>
+        </a:xfrm>
+      </p:grpSpPr>
+      <p:sp>
+        <p:nvSpPr>
+          <p:cNvPr id="2" name="Marcador de imagen de diapositiva 1"/>
+          <p:cNvSpPr>
+            <a:spLocks noGrp="1" noRot="1" noChangeAspect="1"/>
+          </p:cNvSpPr>
+          <p:nvPr>
+            <p:ph type="sldImg"/>
+          </p:nvPr>
+        </p:nvSpPr>
+        <p:spPr/>
+      </p:sp>
+      <p:sp>
+        <p:nvSpPr>
+          <p:cNvPr id="3" name="Marcador de notas 2"/>
+          <p:cNvSpPr>
+            <a:spLocks noGrp="1"/>
+          </p:cNvSpPr>
+          <p:nvPr>
+            <p:ph type="body" idx="1"/>
+          </p:nvPr>
+        </p:nvSpPr>
+        <p:spPr/>
+        <p:txBody>
+          <a:bodyPr/>
+          <a:lstStyle/>
+          <a:p>
+            <a:r>
+              <a:rPr lang="es-ES" dirty="0"/>
+              <a:t>Creamos el constructor de la clase </a:t>
+            </a:r>
+            <a:r>
+              <a:rPr lang="es-ES" dirty="0" err="1"/>
+              <a:t>ProductsController</a:t>
+            </a:r>
+            <a:endParaRPr lang="es-ES" dirty="0"/>
+          </a:p>
+          <a:p>
+            <a:r>
+              <a:rPr lang="es-MX" sz="1200" kern="1200" dirty="0" err="1">
+                <a:solidFill>
+                  <a:schemeClr val="tx1"/>
+                </a:solidFill>
+                <a:latin typeface="+mn-lt"/>
+                <a:ea typeface="+mn-ea"/>
+                <a:cs typeface="+mn-cs"/>
+              </a:rPr>
+              <a:t>namespace</a:t>
+            </a:r>
+            <a:r>
+              <a:rPr lang="es-MX" sz="1200" kern="1200" dirty="0">
+                <a:solidFill>
+                  <a:schemeClr val="tx1"/>
+                </a:solidFill>
+                <a:latin typeface="+mn-lt"/>
+                <a:ea typeface="+mn-ea"/>
+                <a:cs typeface="+mn-cs"/>
+              </a:rPr>
+              <a:t> </a:t>
+            </a:r>
+            <a:r>
+              <a:rPr lang="es-MX" sz="1200" kern="1200" dirty="0" err="1">
+                <a:solidFill>
+                  <a:schemeClr val="tx1"/>
+                </a:solidFill>
+                <a:latin typeface="+mn-lt"/>
+                <a:ea typeface="+mn-ea"/>
+                <a:cs typeface="+mn-cs"/>
+              </a:rPr>
+              <a:t>Paw.Web.Controllers.API</a:t>
+            </a:r>
+            <a:endParaRPr lang="es-MX" sz="1200" kern="1200" dirty="0">
+              <a:solidFill>
+                <a:schemeClr val="tx1"/>
+              </a:solidFill>
+              <a:latin typeface="+mn-lt"/>
+              <a:ea typeface="+mn-ea"/>
+              <a:cs typeface="+mn-cs"/>
+            </a:endParaRPr>
+          </a:p>
+          <a:p>
+            <a:r>
+              <a:rPr lang="es-MX" sz="1200" kern="1200" dirty="0">
+                <a:solidFill>
+                  <a:schemeClr val="tx1"/>
+                </a:solidFill>
+                <a:latin typeface="+mn-lt"/>
+                <a:ea typeface="+mn-ea"/>
+                <a:cs typeface="+mn-cs"/>
+              </a:rPr>
+              <a:t>{</a:t>
+            </a:r>
+          </a:p>
+          <a:p>
+            <a:r>
+              <a:rPr lang="es-MX" sz="1200" kern="1200" dirty="0">
+                <a:solidFill>
+                  <a:schemeClr val="tx1"/>
+                </a:solidFill>
+                <a:latin typeface="+mn-lt"/>
+                <a:ea typeface="+mn-ea"/>
+                <a:cs typeface="+mn-cs"/>
+              </a:rPr>
+              <a:t>    </a:t>
+            </a:r>
+            <a:r>
+              <a:rPr lang="es-MX" sz="1200" kern="1200" dirty="0" err="1">
+                <a:solidFill>
+                  <a:schemeClr val="tx1"/>
+                </a:solidFill>
+                <a:latin typeface="+mn-lt"/>
+                <a:ea typeface="+mn-ea"/>
+                <a:cs typeface="+mn-cs"/>
+              </a:rPr>
+              <a:t>using</a:t>
+            </a:r>
+            <a:r>
+              <a:rPr lang="es-MX" sz="1200" kern="1200" dirty="0">
+                <a:solidFill>
+                  <a:schemeClr val="tx1"/>
+                </a:solidFill>
+                <a:latin typeface="+mn-lt"/>
+                <a:ea typeface="+mn-ea"/>
+                <a:cs typeface="+mn-cs"/>
+              </a:rPr>
+              <a:t> </a:t>
+            </a:r>
+            <a:r>
+              <a:rPr lang="es-MX" sz="1200" kern="1200" dirty="0" err="1">
+                <a:solidFill>
+                  <a:schemeClr val="tx1"/>
+                </a:solidFill>
+                <a:latin typeface="+mn-lt"/>
+                <a:ea typeface="+mn-ea"/>
+                <a:cs typeface="+mn-cs"/>
+              </a:rPr>
+              <a:t>Microsoft.AspNetCore.Mvc</a:t>
+            </a:r>
+            <a:r>
+              <a:rPr lang="es-MX" sz="1200" kern="1200" dirty="0">
+                <a:solidFill>
+                  <a:schemeClr val="tx1"/>
+                </a:solidFill>
+                <a:latin typeface="+mn-lt"/>
+                <a:ea typeface="+mn-ea"/>
+                <a:cs typeface="+mn-cs"/>
+              </a:rPr>
+              <a:t>;</a:t>
+            </a:r>
+          </a:p>
+          <a:p>
+            <a:r>
+              <a:rPr lang="es-MX" sz="1200" kern="1200" dirty="0">
+                <a:solidFill>
+                  <a:schemeClr val="tx1"/>
+                </a:solidFill>
+                <a:latin typeface="+mn-lt"/>
+                <a:ea typeface="+mn-ea"/>
+                <a:cs typeface="+mn-cs"/>
+              </a:rPr>
+              <a:t>    </a:t>
+            </a:r>
+            <a:r>
+              <a:rPr lang="es-MX" sz="1200" kern="1200" dirty="0" err="1">
+                <a:solidFill>
+                  <a:schemeClr val="tx1"/>
+                </a:solidFill>
+                <a:latin typeface="+mn-lt"/>
+                <a:ea typeface="+mn-ea"/>
+                <a:cs typeface="+mn-cs"/>
+              </a:rPr>
+              <a:t>using</a:t>
+            </a:r>
+            <a:r>
+              <a:rPr lang="es-MX" sz="1200" kern="1200" dirty="0">
+                <a:solidFill>
+                  <a:schemeClr val="tx1"/>
+                </a:solidFill>
+                <a:latin typeface="+mn-lt"/>
+                <a:ea typeface="+mn-ea"/>
+                <a:cs typeface="+mn-cs"/>
+              </a:rPr>
+              <a:t> </a:t>
+            </a:r>
+            <a:r>
+              <a:rPr lang="es-MX" sz="1200" kern="1200" dirty="0" err="1">
+                <a:solidFill>
+                  <a:schemeClr val="tx1"/>
+                </a:solidFill>
+                <a:latin typeface="+mn-lt"/>
+                <a:ea typeface="+mn-ea"/>
+                <a:cs typeface="+mn-cs"/>
+              </a:rPr>
+              <a:t>Paw.Web.Data</a:t>
+            </a:r>
+            <a:r>
+              <a:rPr lang="es-MX" sz="1200" kern="1200" dirty="0">
+                <a:solidFill>
+                  <a:schemeClr val="tx1"/>
+                </a:solidFill>
+                <a:latin typeface="+mn-lt"/>
+                <a:ea typeface="+mn-ea"/>
+                <a:cs typeface="+mn-cs"/>
+              </a:rPr>
+              <a:t>;</a:t>
+            </a:r>
+          </a:p>
+          <a:p>
+            <a:endParaRPr lang="es-MX" sz="1200" kern="1200" dirty="0">
+              <a:solidFill>
+                <a:schemeClr val="tx1"/>
+              </a:solidFill>
+              <a:latin typeface="+mn-lt"/>
+              <a:ea typeface="+mn-ea"/>
+              <a:cs typeface="+mn-cs"/>
+            </a:endParaRPr>
+          </a:p>
+          <a:p>
+            <a:r>
+              <a:rPr lang="es-MX" sz="1200" kern="1200" dirty="0">
+                <a:solidFill>
+                  <a:schemeClr val="tx1"/>
+                </a:solidFill>
+                <a:latin typeface="+mn-lt"/>
+                <a:ea typeface="+mn-ea"/>
+                <a:cs typeface="+mn-cs"/>
+              </a:rPr>
+              <a:t>    [</a:t>
+            </a:r>
+            <a:r>
+              <a:rPr lang="es-MX" sz="1200" kern="1200" dirty="0" err="1">
+                <a:solidFill>
+                  <a:schemeClr val="tx1"/>
+                </a:solidFill>
+                <a:latin typeface="+mn-lt"/>
+                <a:ea typeface="+mn-ea"/>
+                <a:cs typeface="+mn-cs"/>
+              </a:rPr>
+              <a:t>Route</a:t>
+            </a:r>
+            <a:r>
+              <a:rPr lang="es-MX" sz="1200" kern="1200" dirty="0">
+                <a:solidFill>
+                  <a:schemeClr val="tx1"/>
+                </a:solidFill>
+                <a:latin typeface="+mn-lt"/>
+                <a:ea typeface="+mn-ea"/>
+                <a:cs typeface="+mn-cs"/>
+              </a:rPr>
+              <a:t>("api/[</a:t>
+            </a:r>
+            <a:r>
+              <a:rPr lang="es-MX" sz="1200" kern="1200" dirty="0" err="1">
+                <a:solidFill>
+                  <a:schemeClr val="tx1"/>
+                </a:solidFill>
+                <a:latin typeface="+mn-lt"/>
+                <a:ea typeface="+mn-ea"/>
+                <a:cs typeface="+mn-cs"/>
+              </a:rPr>
+              <a:t>Controller</a:t>
+            </a:r>
+            <a:r>
+              <a:rPr lang="es-MX" sz="1200" kern="1200" dirty="0">
+                <a:solidFill>
+                  <a:schemeClr val="tx1"/>
+                </a:solidFill>
+                <a:latin typeface="+mn-lt"/>
+                <a:ea typeface="+mn-ea"/>
+                <a:cs typeface="+mn-cs"/>
+              </a:rPr>
+              <a:t>]")]</a:t>
+            </a:r>
+          </a:p>
+          <a:p>
+            <a:r>
+              <a:rPr lang="es-MX" sz="1200" kern="1200" dirty="0">
+                <a:solidFill>
+                  <a:schemeClr val="tx1"/>
+                </a:solidFill>
+                <a:latin typeface="+mn-lt"/>
+                <a:ea typeface="+mn-ea"/>
+                <a:cs typeface="+mn-cs"/>
+              </a:rPr>
+              <a:t>    </a:t>
+            </a:r>
+            <a:r>
+              <a:rPr lang="es-MX" sz="1200" kern="1200" dirty="0" err="1">
+                <a:solidFill>
+                  <a:schemeClr val="tx1"/>
+                </a:solidFill>
+                <a:latin typeface="+mn-lt"/>
+                <a:ea typeface="+mn-ea"/>
+                <a:cs typeface="+mn-cs"/>
+              </a:rPr>
+              <a:t>public</a:t>
+            </a:r>
+            <a:r>
+              <a:rPr lang="es-MX" sz="1200" kern="1200" dirty="0">
+                <a:solidFill>
+                  <a:schemeClr val="tx1"/>
+                </a:solidFill>
+                <a:latin typeface="+mn-lt"/>
+                <a:ea typeface="+mn-ea"/>
+                <a:cs typeface="+mn-cs"/>
+              </a:rPr>
+              <a:t> </a:t>
+            </a:r>
+            <a:r>
+              <a:rPr lang="es-MX" sz="1200" kern="1200" dirty="0" err="1">
+                <a:solidFill>
+                  <a:schemeClr val="tx1"/>
+                </a:solidFill>
+                <a:latin typeface="+mn-lt"/>
+                <a:ea typeface="+mn-ea"/>
+                <a:cs typeface="+mn-cs"/>
+              </a:rPr>
+              <a:t>class</a:t>
+            </a:r>
+            <a:r>
+              <a:rPr lang="es-MX" sz="1200" kern="1200" dirty="0">
+                <a:solidFill>
+                  <a:schemeClr val="tx1"/>
+                </a:solidFill>
+                <a:latin typeface="+mn-lt"/>
+                <a:ea typeface="+mn-ea"/>
+                <a:cs typeface="+mn-cs"/>
+              </a:rPr>
+              <a:t> </a:t>
+            </a:r>
+            <a:r>
+              <a:rPr lang="es-MX" sz="1200" kern="1200" dirty="0" err="1">
+                <a:solidFill>
+                  <a:schemeClr val="tx1"/>
+                </a:solidFill>
+                <a:latin typeface="+mn-lt"/>
+                <a:ea typeface="+mn-ea"/>
+                <a:cs typeface="+mn-cs"/>
+              </a:rPr>
+              <a:t>ProductsController:Controller</a:t>
+            </a:r>
+            <a:endParaRPr lang="es-MX" sz="1200" kern="1200" dirty="0">
+              <a:solidFill>
+                <a:schemeClr val="tx1"/>
+              </a:solidFill>
+              <a:latin typeface="+mn-lt"/>
+              <a:ea typeface="+mn-ea"/>
+              <a:cs typeface="+mn-cs"/>
+            </a:endParaRPr>
+          </a:p>
+          <a:p>
+            <a:r>
+              <a:rPr lang="es-MX" sz="1200" kern="1200" dirty="0">
+                <a:solidFill>
+                  <a:schemeClr val="tx1"/>
+                </a:solidFill>
+                <a:latin typeface="+mn-lt"/>
+                <a:ea typeface="+mn-ea"/>
+                <a:cs typeface="+mn-cs"/>
+              </a:rPr>
+              <a:t>    {</a:t>
+            </a:r>
+          </a:p>
+          <a:p>
+            <a:r>
+              <a:rPr lang="es-MX" sz="1200" kern="1200" dirty="0">
+                <a:solidFill>
+                  <a:schemeClr val="tx1"/>
+                </a:solidFill>
+                <a:latin typeface="+mn-lt"/>
+                <a:ea typeface="+mn-ea"/>
+                <a:cs typeface="+mn-cs"/>
+              </a:rPr>
+              <a:t>        </a:t>
+            </a:r>
+            <a:r>
+              <a:rPr lang="es-MX" sz="1200" kern="1200" dirty="0" err="1">
+                <a:solidFill>
+                  <a:schemeClr val="tx1"/>
+                </a:solidFill>
+                <a:latin typeface="+mn-lt"/>
+                <a:ea typeface="+mn-ea"/>
+                <a:cs typeface="+mn-cs"/>
+              </a:rPr>
+              <a:t>private</a:t>
+            </a:r>
+            <a:r>
+              <a:rPr lang="es-MX" sz="1200" kern="1200" dirty="0">
+                <a:solidFill>
+                  <a:schemeClr val="tx1"/>
+                </a:solidFill>
+                <a:latin typeface="+mn-lt"/>
+                <a:ea typeface="+mn-ea"/>
+                <a:cs typeface="+mn-cs"/>
+              </a:rPr>
+              <a:t> </a:t>
+            </a:r>
+            <a:r>
+              <a:rPr lang="es-MX" sz="1200" kern="1200" dirty="0" err="1">
+                <a:solidFill>
+                  <a:schemeClr val="tx1"/>
+                </a:solidFill>
+                <a:latin typeface="+mn-lt"/>
+                <a:ea typeface="+mn-ea"/>
+                <a:cs typeface="+mn-cs"/>
+              </a:rPr>
+              <a:t>readonly</a:t>
+            </a:r>
+            <a:r>
+              <a:rPr lang="es-MX" sz="1200" kern="1200" dirty="0">
+                <a:solidFill>
+                  <a:schemeClr val="tx1"/>
+                </a:solidFill>
+                <a:latin typeface="+mn-lt"/>
+                <a:ea typeface="+mn-ea"/>
+                <a:cs typeface="+mn-cs"/>
+              </a:rPr>
+              <a:t> </a:t>
+            </a:r>
+            <a:r>
+              <a:rPr lang="es-MX" sz="1200" kern="1200" dirty="0" err="1">
+                <a:solidFill>
+                  <a:schemeClr val="tx1"/>
+                </a:solidFill>
+                <a:latin typeface="+mn-lt"/>
+                <a:ea typeface="+mn-ea"/>
+                <a:cs typeface="+mn-cs"/>
+              </a:rPr>
+              <a:t>DataContext</a:t>
+            </a:r>
+            <a:r>
+              <a:rPr lang="es-MX" sz="1200" kern="1200" dirty="0">
+                <a:solidFill>
+                  <a:schemeClr val="tx1"/>
+                </a:solidFill>
+                <a:latin typeface="+mn-lt"/>
+                <a:ea typeface="+mn-ea"/>
+                <a:cs typeface="+mn-cs"/>
+              </a:rPr>
+              <a:t> </a:t>
+            </a:r>
+            <a:r>
+              <a:rPr lang="es-MX" sz="1200" kern="1200" dirty="0" err="1">
+                <a:solidFill>
+                  <a:schemeClr val="tx1"/>
+                </a:solidFill>
+                <a:latin typeface="+mn-lt"/>
+                <a:ea typeface="+mn-ea"/>
+                <a:cs typeface="+mn-cs"/>
+              </a:rPr>
+              <a:t>dataContext</a:t>
+            </a:r>
+            <a:r>
+              <a:rPr lang="es-MX" sz="1200" kern="1200" dirty="0">
+                <a:solidFill>
+                  <a:schemeClr val="tx1"/>
+                </a:solidFill>
+                <a:latin typeface="+mn-lt"/>
+                <a:ea typeface="+mn-ea"/>
+                <a:cs typeface="+mn-cs"/>
+              </a:rPr>
+              <a:t>;</a:t>
+            </a:r>
+          </a:p>
+          <a:p>
+            <a:endParaRPr lang="es-MX" sz="1200" kern="1200" dirty="0">
+              <a:solidFill>
+                <a:schemeClr val="tx1"/>
+              </a:solidFill>
+              <a:latin typeface="+mn-lt"/>
+              <a:ea typeface="+mn-ea"/>
+              <a:cs typeface="+mn-cs"/>
+            </a:endParaRPr>
+          </a:p>
+          <a:p>
+            <a:r>
+              <a:rPr lang="es-MX" sz="1200" kern="1200" dirty="0">
+                <a:solidFill>
+                  <a:schemeClr val="tx1"/>
+                </a:solidFill>
+                <a:latin typeface="+mn-lt"/>
+                <a:ea typeface="+mn-ea"/>
+                <a:cs typeface="+mn-cs"/>
+              </a:rPr>
+              <a:t>        </a:t>
+            </a:r>
+            <a:r>
+              <a:rPr lang="es-MX" sz="1200" kern="1200" dirty="0" err="1">
+                <a:solidFill>
+                  <a:schemeClr val="tx1"/>
+                </a:solidFill>
+                <a:latin typeface="+mn-lt"/>
+                <a:ea typeface="+mn-ea"/>
+                <a:cs typeface="+mn-cs"/>
+              </a:rPr>
+              <a:t>public</a:t>
+            </a:r>
+            <a:r>
+              <a:rPr lang="es-MX" sz="1200" kern="1200" dirty="0">
+                <a:solidFill>
+                  <a:schemeClr val="tx1"/>
+                </a:solidFill>
+                <a:latin typeface="+mn-lt"/>
+                <a:ea typeface="+mn-ea"/>
+                <a:cs typeface="+mn-cs"/>
+              </a:rPr>
+              <a:t> </a:t>
+            </a:r>
+            <a:r>
+              <a:rPr lang="es-MX" sz="1200" kern="1200" dirty="0" err="1">
+                <a:solidFill>
+                  <a:schemeClr val="tx1"/>
+                </a:solidFill>
+                <a:latin typeface="+mn-lt"/>
+                <a:ea typeface="+mn-ea"/>
+                <a:cs typeface="+mn-cs"/>
+              </a:rPr>
+              <a:t>ProductsController</a:t>
+            </a:r>
+            <a:r>
+              <a:rPr lang="es-MX" sz="1200" kern="1200" dirty="0">
+                <a:solidFill>
+                  <a:schemeClr val="tx1"/>
+                </a:solidFill>
+                <a:latin typeface="+mn-lt"/>
+                <a:ea typeface="+mn-ea"/>
+                <a:cs typeface="+mn-cs"/>
+              </a:rPr>
+              <a:t>(</a:t>
+            </a:r>
+            <a:r>
+              <a:rPr lang="es-MX" sz="1200" kern="1200" dirty="0" err="1">
+                <a:solidFill>
+                  <a:schemeClr val="tx1"/>
+                </a:solidFill>
+                <a:latin typeface="+mn-lt"/>
+                <a:ea typeface="+mn-ea"/>
+                <a:cs typeface="+mn-cs"/>
+              </a:rPr>
+              <a:t>DataContext</a:t>
+            </a:r>
+            <a:r>
+              <a:rPr lang="es-MX" sz="1200" kern="1200" dirty="0">
+                <a:solidFill>
+                  <a:schemeClr val="tx1"/>
+                </a:solidFill>
+                <a:latin typeface="+mn-lt"/>
+                <a:ea typeface="+mn-ea"/>
+                <a:cs typeface="+mn-cs"/>
+              </a:rPr>
+              <a:t> </a:t>
+            </a:r>
+            <a:r>
+              <a:rPr lang="es-MX" sz="1200" kern="1200" dirty="0" err="1">
+                <a:solidFill>
+                  <a:schemeClr val="tx1"/>
+                </a:solidFill>
+                <a:latin typeface="+mn-lt"/>
+                <a:ea typeface="+mn-ea"/>
+                <a:cs typeface="+mn-cs"/>
+              </a:rPr>
+              <a:t>dataContext</a:t>
+            </a:r>
+            <a:r>
+              <a:rPr lang="es-MX" sz="1200" kern="1200" dirty="0">
+                <a:solidFill>
+                  <a:schemeClr val="tx1"/>
+                </a:solidFill>
+                <a:latin typeface="+mn-lt"/>
+                <a:ea typeface="+mn-ea"/>
+                <a:cs typeface="+mn-cs"/>
+              </a:rPr>
+              <a:t>)</a:t>
+            </a:r>
+          </a:p>
+          <a:p>
+            <a:r>
+              <a:rPr lang="es-MX" sz="1200" kern="1200" dirty="0">
+                <a:solidFill>
+                  <a:schemeClr val="tx1"/>
+                </a:solidFill>
+                <a:latin typeface="+mn-lt"/>
+                <a:ea typeface="+mn-ea"/>
+                <a:cs typeface="+mn-cs"/>
+              </a:rPr>
+              <a:t>        {</a:t>
+            </a:r>
+          </a:p>
+          <a:p>
+            <a:r>
+              <a:rPr lang="es-MX" sz="1200" kern="1200" dirty="0">
+                <a:solidFill>
+                  <a:schemeClr val="tx1"/>
+                </a:solidFill>
+                <a:latin typeface="+mn-lt"/>
+                <a:ea typeface="+mn-ea"/>
+                <a:cs typeface="+mn-cs"/>
+              </a:rPr>
+              <a:t>            </a:t>
+            </a:r>
+            <a:r>
+              <a:rPr lang="es-MX" sz="1200" kern="1200" dirty="0" err="1">
+                <a:solidFill>
+                  <a:schemeClr val="tx1"/>
+                </a:solidFill>
+                <a:latin typeface="+mn-lt"/>
+                <a:ea typeface="+mn-ea"/>
+                <a:cs typeface="+mn-cs"/>
+              </a:rPr>
+              <a:t>this.dataContext</a:t>
+            </a:r>
+            <a:r>
+              <a:rPr lang="es-MX" sz="1200" kern="1200" dirty="0">
+                <a:solidFill>
+                  <a:schemeClr val="tx1"/>
+                </a:solidFill>
+                <a:latin typeface="+mn-lt"/>
+                <a:ea typeface="+mn-ea"/>
+                <a:cs typeface="+mn-cs"/>
+              </a:rPr>
+              <a:t> = </a:t>
+            </a:r>
+            <a:r>
+              <a:rPr lang="es-MX" sz="1200" kern="1200" dirty="0" err="1">
+                <a:solidFill>
+                  <a:schemeClr val="tx1"/>
+                </a:solidFill>
+                <a:latin typeface="+mn-lt"/>
+                <a:ea typeface="+mn-ea"/>
+                <a:cs typeface="+mn-cs"/>
+              </a:rPr>
+              <a:t>dataContext</a:t>
+            </a:r>
+            <a:r>
+              <a:rPr lang="es-MX" sz="1200" kern="1200" dirty="0">
+                <a:solidFill>
+                  <a:schemeClr val="tx1"/>
+                </a:solidFill>
+                <a:latin typeface="+mn-lt"/>
+                <a:ea typeface="+mn-ea"/>
+                <a:cs typeface="+mn-cs"/>
+              </a:rPr>
+              <a:t>;</a:t>
+            </a:r>
+          </a:p>
+          <a:p>
+            <a:r>
+              <a:rPr lang="es-MX" sz="1200" kern="1200" dirty="0">
+                <a:solidFill>
+                  <a:schemeClr val="tx1"/>
+                </a:solidFill>
+                <a:latin typeface="+mn-lt"/>
+                <a:ea typeface="+mn-ea"/>
+                <a:cs typeface="+mn-cs"/>
+              </a:rPr>
+              <a:t>        }</a:t>
+            </a:r>
+          </a:p>
+          <a:p>
+            <a:r>
+              <a:rPr lang="es-MX" sz="1200" kern="1200" dirty="0">
+                <a:solidFill>
+                  <a:schemeClr val="tx1"/>
+                </a:solidFill>
+                <a:latin typeface="+mn-lt"/>
+                <a:ea typeface="+mn-ea"/>
+                <a:cs typeface="+mn-cs"/>
+              </a:rPr>
+              <a:t>    }</a:t>
+            </a:r>
+          </a:p>
+          <a:p>
+            <a:r>
+              <a:rPr lang="es-MX" sz="1200" kern="1200" dirty="0">
+                <a:solidFill>
+                  <a:schemeClr val="tx1"/>
+                </a:solidFill>
+                <a:latin typeface="+mn-lt"/>
+                <a:ea typeface="+mn-ea"/>
+                <a:cs typeface="+mn-cs"/>
+              </a:rPr>
+              <a:t>}</a:t>
+            </a:r>
+          </a:p>
+          <a:p>
+            <a:endParaRPr lang="es-MX" dirty="0"/>
+          </a:p>
+        </p:txBody>
+      </p:sp>
+      <p:sp>
+        <p:nvSpPr>
+          <p:cNvPr id="4" name="Marcador de número de diapositiva 3"/>
+          <p:cNvSpPr>
+            <a:spLocks noGrp="1"/>
+          </p:cNvSpPr>
+          <p:nvPr>
+            <p:ph type="sldNum" sz="quarter" idx="5"/>
+          </p:nvPr>
+        </p:nvSpPr>
+        <p:spPr/>
+        <p:txBody>
+          <a:bodyPr/>
+          <a:lstStyle/>
+          <a:p>
+            <a:fld id="{785ED18C-E05F-4FD2-A782-FC24AC302660}" type="slidenum">
+              <a:rPr lang="es-MX" smtClean="0"/>
+              <a:t>44</a:t>
+            </a:fld>
+            <a:endParaRPr lang="es-MX"/>
+          </a:p>
+        </p:txBody>
+      </p:sp>
+    </p:spTree>
+    <p:extLst>
+      <p:ext uri="{BB962C8B-B14F-4D97-AF65-F5344CB8AC3E}">
+        <p14:creationId xmlns:p14="http://schemas.microsoft.com/office/powerpoint/2010/main" val="2907145380"/>
+      </p:ext>
+    </p:extLst>
+  </p:cSld>
+  <p:clrMapOvr>
+    <a:masterClrMapping/>
+  </p:clrMapOvr>
+</p:notes>
+</file>
+
+<file path=ppt/notesSlides/notesSlide43.xml><?xml version="1.0" encoding="utf-8"?>
+<p:notes xmlns:a="http://schemas.openxmlformats.org/drawingml/2006/main" xmlns:r="http://schemas.openxmlformats.org/officeDocument/2006/relationships" xmlns:p="http://schemas.openxmlformats.org/presentationml/2006/main">
+  <p:cSld>
+    <p:spTree>
+      <p:nvGrpSpPr>
+        <p:cNvPr id="1" name=""/>
+        <p:cNvGrpSpPr/>
+        <p:nvPr/>
+      </p:nvGrpSpPr>
+      <p:grpSpPr>
+        <a:xfrm>
+          <a:off x="0" y="0"/>
+          <a:ext cx="0" cy="0"/>
+          <a:chOff x="0" y="0"/>
+          <a:chExt cx="0" cy="0"/>
+        </a:xfrm>
+      </p:grpSpPr>
+      <p:sp>
+        <p:nvSpPr>
+          <p:cNvPr id="2" name="Marcador de imagen de diapositiva 1"/>
+          <p:cNvSpPr>
+            <a:spLocks noGrp="1" noRot="1" noChangeAspect="1"/>
+          </p:cNvSpPr>
+          <p:nvPr>
+            <p:ph type="sldImg"/>
+          </p:nvPr>
+        </p:nvSpPr>
+        <p:spPr/>
+      </p:sp>
+      <p:sp>
+        <p:nvSpPr>
+          <p:cNvPr id="3" name="Marcador de notas 2"/>
+          <p:cNvSpPr>
+            <a:spLocks noGrp="1"/>
+          </p:cNvSpPr>
+          <p:nvPr>
+            <p:ph type="body" idx="1"/>
+          </p:nvPr>
+        </p:nvSpPr>
+        <p:spPr/>
+        <p:txBody>
+          <a:bodyPr/>
+          <a:lstStyle/>
+          <a:p>
+            <a:r>
+              <a:rPr lang="es-ES" dirty="0"/>
+              <a:t>Crear un método que regrese todos los productos</a:t>
+            </a:r>
+          </a:p>
+          <a:p>
+            <a:endParaRPr lang="es-MX" sz="1200" kern="1200" dirty="0">
+              <a:solidFill>
+                <a:schemeClr val="tx1"/>
+              </a:solidFill>
+              <a:latin typeface="+mn-lt"/>
+              <a:ea typeface="+mn-ea"/>
+              <a:cs typeface="+mn-cs"/>
+            </a:endParaRPr>
+          </a:p>
+          <a:p>
+            <a:endParaRPr lang="es-MX" sz="1200" kern="1200" dirty="0">
+              <a:solidFill>
+                <a:schemeClr val="tx1"/>
+              </a:solidFill>
+              <a:latin typeface="+mn-lt"/>
+              <a:ea typeface="+mn-ea"/>
+              <a:cs typeface="+mn-cs"/>
+            </a:endParaRPr>
+          </a:p>
+          <a:p>
+            <a:r>
+              <a:rPr lang="es-MX" sz="1200" kern="1200" dirty="0">
+                <a:solidFill>
+                  <a:schemeClr val="tx1"/>
+                </a:solidFill>
+                <a:latin typeface="+mn-lt"/>
+                <a:ea typeface="+mn-ea"/>
+                <a:cs typeface="+mn-cs"/>
+              </a:rPr>
+              <a:t>        [</a:t>
+            </a:r>
+            <a:r>
+              <a:rPr lang="es-MX" sz="1200" kern="1200" dirty="0" err="1">
+                <a:solidFill>
+                  <a:schemeClr val="tx1"/>
+                </a:solidFill>
+                <a:latin typeface="+mn-lt"/>
+                <a:ea typeface="+mn-ea"/>
+                <a:cs typeface="+mn-cs"/>
+              </a:rPr>
+              <a:t>HttpGet</a:t>
+            </a:r>
+            <a:r>
+              <a:rPr lang="es-MX" sz="1200" kern="1200" dirty="0">
+                <a:solidFill>
+                  <a:schemeClr val="tx1"/>
+                </a:solidFill>
+                <a:latin typeface="+mn-lt"/>
+                <a:ea typeface="+mn-ea"/>
+                <a:cs typeface="+mn-cs"/>
+              </a:rPr>
+              <a:t>]</a:t>
+            </a:r>
+          </a:p>
+          <a:p>
+            <a:r>
+              <a:rPr lang="es-MX" sz="1200" kern="1200" dirty="0">
+                <a:solidFill>
+                  <a:schemeClr val="tx1"/>
+                </a:solidFill>
+                <a:latin typeface="+mn-lt"/>
+                <a:ea typeface="+mn-ea"/>
+                <a:cs typeface="+mn-cs"/>
+              </a:rPr>
+              <a:t>        </a:t>
+            </a:r>
+            <a:r>
+              <a:rPr lang="es-MX" sz="1200" kern="1200" dirty="0" err="1">
+                <a:solidFill>
+                  <a:schemeClr val="tx1"/>
+                </a:solidFill>
+                <a:latin typeface="+mn-lt"/>
+                <a:ea typeface="+mn-ea"/>
+                <a:cs typeface="+mn-cs"/>
+              </a:rPr>
+              <a:t>public</a:t>
+            </a:r>
+            <a:r>
+              <a:rPr lang="es-MX" sz="1200" kern="1200" dirty="0">
+                <a:solidFill>
+                  <a:schemeClr val="tx1"/>
+                </a:solidFill>
+                <a:latin typeface="+mn-lt"/>
+                <a:ea typeface="+mn-ea"/>
+                <a:cs typeface="+mn-cs"/>
+              </a:rPr>
+              <a:t> </a:t>
+            </a:r>
+            <a:r>
+              <a:rPr lang="es-MX" sz="1200" kern="1200" dirty="0" err="1">
+                <a:solidFill>
+                  <a:schemeClr val="tx1"/>
+                </a:solidFill>
+                <a:latin typeface="+mn-lt"/>
+                <a:ea typeface="+mn-ea"/>
+                <a:cs typeface="+mn-cs"/>
+              </a:rPr>
+              <a:t>IActionResult</a:t>
+            </a:r>
+            <a:r>
+              <a:rPr lang="es-MX" sz="1200" kern="1200" dirty="0">
+                <a:solidFill>
+                  <a:schemeClr val="tx1"/>
+                </a:solidFill>
+                <a:latin typeface="+mn-lt"/>
+                <a:ea typeface="+mn-ea"/>
+                <a:cs typeface="+mn-cs"/>
+              </a:rPr>
+              <a:t> </a:t>
+            </a:r>
+            <a:r>
+              <a:rPr lang="es-MX" sz="1200" kern="1200" dirty="0" err="1">
+                <a:solidFill>
+                  <a:schemeClr val="tx1"/>
+                </a:solidFill>
+                <a:latin typeface="+mn-lt"/>
+                <a:ea typeface="+mn-ea"/>
+                <a:cs typeface="+mn-cs"/>
+              </a:rPr>
+              <a:t>GetProducts</a:t>
+            </a:r>
+            <a:r>
+              <a:rPr lang="es-MX" sz="1200" kern="1200" dirty="0">
+                <a:solidFill>
+                  <a:schemeClr val="tx1"/>
+                </a:solidFill>
+                <a:latin typeface="+mn-lt"/>
+                <a:ea typeface="+mn-ea"/>
+                <a:cs typeface="+mn-cs"/>
+              </a:rPr>
+              <a:t>()</a:t>
+            </a:r>
+          </a:p>
+          <a:p>
+            <a:r>
+              <a:rPr lang="es-MX" sz="1200" kern="1200" dirty="0">
+                <a:solidFill>
+                  <a:schemeClr val="tx1"/>
+                </a:solidFill>
+                <a:latin typeface="+mn-lt"/>
+                <a:ea typeface="+mn-ea"/>
+                <a:cs typeface="+mn-cs"/>
+              </a:rPr>
+              <a:t>        {</a:t>
+            </a:r>
+          </a:p>
+          <a:p>
+            <a:r>
+              <a:rPr lang="es-MX" sz="1200" kern="1200" dirty="0">
+                <a:solidFill>
+                  <a:schemeClr val="tx1"/>
+                </a:solidFill>
+                <a:latin typeface="+mn-lt"/>
+                <a:ea typeface="+mn-ea"/>
+                <a:cs typeface="+mn-cs"/>
+              </a:rPr>
+              <a:t>            //TODO</a:t>
+            </a:r>
+          </a:p>
+          <a:p>
+            <a:r>
+              <a:rPr lang="en-US" sz="1200" kern="1200" dirty="0">
+                <a:solidFill>
+                  <a:schemeClr val="tx1"/>
+                </a:solidFill>
+                <a:latin typeface="+mn-lt"/>
+                <a:ea typeface="+mn-ea"/>
+                <a:cs typeface="+mn-cs"/>
+              </a:rPr>
+              <a:t>            return Ok(</a:t>
+            </a:r>
+            <a:r>
+              <a:rPr lang="en-US" sz="1200" kern="1200" dirty="0" err="1">
+                <a:solidFill>
+                  <a:schemeClr val="tx1"/>
+                </a:solidFill>
+                <a:latin typeface="+mn-lt"/>
+                <a:ea typeface="+mn-ea"/>
+                <a:cs typeface="+mn-cs"/>
+              </a:rPr>
+              <a:t>this.dataContext.Products</a:t>
+            </a:r>
+            <a:r>
+              <a:rPr lang="en-US" sz="1200" kern="1200" dirty="0">
+                <a:solidFill>
+                  <a:schemeClr val="tx1"/>
+                </a:solidFill>
+                <a:latin typeface="+mn-lt"/>
+                <a:ea typeface="+mn-ea"/>
+                <a:cs typeface="+mn-cs"/>
+              </a:rPr>
+              <a:t>);</a:t>
+            </a:r>
+          </a:p>
+          <a:p>
+            <a:r>
+              <a:rPr lang="es-MX" sz="1200" kern="1200" dirty="0">
+                <a:solidFill>
+                  <a:schemeClr val="tx1"/>
+                </a:solidFill>
+                <a:latin typeface="+mn-lt"/>
+                <a:ea typeface="+mn-ea"/>
+                <a:cs typeface="+mn-cs"/>
+              </a:rPr>
+              <a:t>        }</a:t>
+            </a:r>
+            <a:endParaRPr lang="es-MX" dirty="0"/>
+          </a:p>
+        </p:txBody>
+      </p:sp>
+      <p:sp>
+        <p:nvSpPr>
+          <p:cNvPr id="4" name="Marcador de número de diapositiva 3"/>
+          <p:cNvSpPr>
+            <a:spLocks noGrp="1"/>
+          </p:cNvSpPr>
+          <p:nvPr>
+            <p:ph type="sldNum" sz="quarter" idx="5"/>
+          </p:nvPr>
+        </p:nvSpPr>
+        <p:spPr/>
+        <p:txBody>
+          <a:bodyPr/>
+          <a:lstStyle/>
+          <a:p>
+            <a:fld id="{785ED18C-E05F-4FD2-A782-FC24AC302660}" type="slidenum">
+              <a:rPr lang="es-MX" smtClean="0"/>
+              <a:t>45</a:t>
+            </a:fld>
+            <a:endParaRPr lang="es-MX"/>
+          </a:p>
+        </p:txBody>
+      </p:sp>
+    </p:spTree>
+    <p:extLst>
+      <p:ext uri="{BB962C8B-B14F-4D97-AF65-F5344CB8AC3E}">
+        <p14:creationId xmlns:p14="http://schemas.microsoft.com/office/powerpoint/2010/main" val="3441867771"/>
+      </p:ext>
+    </p:extLst>
+  </p:cSld>
+  <p:clrMapOvr>
+    <a:masterClrMapping/>
+  </p:clrMapOvr>
+</p:notes>
+</file>
+
+<file path=ppt/notesSlides/notesSlide44.xml><?xml version="1.0" encoding="utf-8"?>
+<p:notes xmlns:a="http://schemas.openxmlformats.org/drawingml/2006/main" xmlns:r="http://schemas.openxmlformats.org/officeDocument/2006/relationships" xmlns:p="http://schemas.openxmlformats.org/presentationml/2006/main">
+  <p:cSld>
+    <p:spTree>
+      <p:nvGrpSpPr>
+        <p:cNvPr id="1" name=""/>
+        <p:cNvGrpSpPr/>
+        <p:nvPr/>
+      </p:nvGrpSpPr>
+      <p:grpSpPr>
+        <a:xfrm>
+          <a:off x="0" y="0"/>
+          <a:ext cx="0" cy="0"/>
+          <a:chOff x="0" y="0"/>
+          <a:chExt cx="0" cy="0"/>
+        </a:xfrm>
+      </p:grpSpPr>
+      <p:sp>
+        <p:nvSpPr>
+          <p:cNvPr id="2" name="Marcador de imagen de diapositiva 1"/>
+          <p:cNvSpPr>
+            <a:spLocks noGrp="1" noRot="1" noChangeAspect="1"/>
+          </p:cNvSpPr>
+          <p:nvPr>
+            <p:ph type="sldImg"/>
+          </p:nvPr>
+        </p:nvSpPr>
+        <p:spPr/>
+      </p:sp>
+      <p:sp>
+        <p:nvSpPr>
+          <p:cNvPr id="3" name="Marcador de notas 2"/>
+          <p:cNvSpPr>
+            <a:spLocks noGrp="1"/>
+          </p:cNvSpPr>
+          <p:nvPr>
+            <p:ph type="body" idx="1"/>
+          </p:nvPr>
+        </p:nvSpPr>
+        <p:spPr/>
+        <p:txBody>
+          <a:bodyPr/>
+          <a:lstStyle/>
+          <a:p>
+            <a:r>
+              <a:rPr lang="es-ES" dirty="0"/>
+              <a:t>Creamos la carpeta </a:t>
+            </a:r>
+            <a:r>
+              <a:rPr lang="es-ES" dirty="0" err="1"/>
+              <a:t>frontend</a:t>
+            </a:r>
+            <a:endParaRPr lang="es-MX" dirty="0"/>
+          </a:p>
+        </p:txBody>
+      </p:sp>
+      <p:sp>
+        <p:nvSpPr>
+          <p:cNvPr id="4" name="Marcador de número de diapositiva 3"/>
+          <p:cNvSpPr>
+            <a:spLocks noGrp="1"/>
+          </p:cNvSpPr>
+          <p:nvPr>
+            <p:ph type="sldNum" sz="quarter" idx="5"/>
+          </p:nvPr>
+        </p:nvSpPr>
+        <p:spPr/>
+        <p:txBody>
+          <a:bodyPr/>
+          <a:lstStyle/>
+          <a:p>
+            <a:fld id="{785ED18C-E05F-4FD2-A782-FC24AC302660}" type="slidenum">
+              <a:rPr lang="es-MX" smtClean="0"/>
+              <a:t>47</a:t>
+            </a:fld>
+            <a:endParaRPr lang="es-MX"/>
+          </a:p>
+        </p:txBody>
+      </p:sp>
+    </p:spTree>
+    <p:extLst>
+      <p:ext uri="{BB962C8B-B14F-4D97-AF65-F5344CB8AC3E}">
+        <p14:creationId xmlns:p14="http://schemas.microsoft.com/office/powerpoint/2010/main" val="541962997"/>
+      </p:ext>
+    </p:extLst>
+  </p:cSld>
+  <p:clrMapOvr>
+    <a:masterClrMapping/>
+  </p:clrMapOvr>
+</p:notes>
+</file>
+
+<file path=ppt/notesSlides/notesSlide45.xml><?xml version="1.0" encoding="utf-8"?>
+<p:notes xmlns:a="http://schemas.openxmlformats.org/drawingml/2006/main" xmlns:r="http://schemas.openxmlformats.org/officeDocument/2006/relationships" xmlns:p="http://schemas.openxmlformats.org/presentationml/2006/main">
+  <p:cSld>
+    <p:spTree>
+      <p:nvGrpSpPr>
+        <p:cNvPr id="1" name=""/>
+        <p:cNvGrpSpPr/>
+        <p:nvPr/>
+      </p:nvGrpSpPr>
+      <p:grpSpPr>
+        <a:xfrm>
+          <a:off x="0" y="0"/>
+          <a:ext cx="0" cy="0"/>
+          <a:chOff x="0" y="0"/>
+          <a:chExt cx="0" cy="0"/>
+        </a:xfrm>
+      </p:grpSpPr>
+      <p:sp>
+        <p:nvSpPr>
+          <p:cNvPr id="2" name="Marcador de imagen de diapositiva 1"/>
+          <p:cNvSpPr>
+            <a:spLocks noGrp="1" noRot="1" noChangeAspect="1"/>
+          </p:cNvSpPr>
+          <p:nvPr>
+            <p:ph type="sldImg"/>
+          </p:nvPr>
+        </p:nvSpPr>
+        <p:spPr/>
+      </p:sp>
+      <p:sp>
+        <p:nvSpPr>
+          <p:cNvPr id="3" name="Marcador de notas 2"/>
+          <p:cNvSpPr>
+            <a:spLocks noGrp="1"/>
+          </p:cNvSpPr>
+          <p:nvPr>
+            <p:ph type="body" idx="1"/>
+          </p:nvPr>
+        </p:nvSpPr>
+        <p:spPr/>
+        <p:txBody>
+          <a:bodyPr/>
+          <a:lstStyle/>
+          <a:p>
+            <a:r>
+              <a:rPr lang="es-ES" dirty="0"/>
+              <a:t>Creamos la carpeta </a:t>
+            </a:r>
+            <a:r>
+              <a:rPr lang="es-ES" dirty="0" err="1"/>
+              <a:t>froms</a:t>
+            </a:r>
+            <a:endParaRPr lang="es-MX" dirty="0"/>
+          </a:p>
+        </p:txBody>
+      </p:sp>
+      <p:sp>
+        <p:nvSpPr>
+          <p:cNvPr id="4" name="Marcador de número de diapositiva 3"/>
+          <p:cNvSpPr>
+            <a:spLocks noGrp="1"/>
+          </p:cNvSpPr>
+          <p:nvPr>
+            <p:ph type="sldNum" sz="quarter" idx="5"/>
+          </p:nvPr>
+        </p:nvSpPr>
+        <p:spPr/>
+        <p:txBody>
+          <a:bodyPr/>
+          <a:lstStyle/>
+          <a:p>
+            <a:fld id="{785ED18C-E05F-4FD2-A782-FC24AC302660}" type="slidenum">
+              <a:rPr lang="es-MX" smtClean="0"/>
+              <a:t>48</a:t>
+            </a:fld>
+            <a:endParaRPr lang="es-MX"/>
+          </a:p>
+        </p:txBody>
+      </p:sp>
+    </p:spTree>
+    <p:extLst>
+      <p:ext uri="{BB962C8B-B14F-4D97-AF65-F5344CB8AC3E}">
+        <p14:creationId xmlns:p14="http://schemas.microsoft.com/office/powerpoint/2010/main" val="3753353294"/>
+      </p:ext>
+    </p:extLst>
+  </p:cSld>
+  <p:clrMapOvr>
+    <a:masterClrMapping/>
+  </p:clrMapOvr>
+</p:notes>
+</file>
+
+<file path=ppt/notesSlides/notesSlide46.xml><?xml version="1.0" encoding="utf-8"?>
+<p:notes xmlns:a="http://schemas.openxmlformats.org/drawingml/2006/main" xmlns:r="http://schemas.openxmlformats.org/officeDocument/2006/relationships" xmlns:p="http://schemas.openxmlformats.org/presentationml/2006/main">
+  <p:cSld>
+    <p:spTree>
+      <p:nvGrpSpPr>
+        <p:cNvPr id="1" name=""/>
+        <p:cNvGrpSpPr/>
+        <p:nvPr/>
+      </p:nvGrpSpPr>
+      <p:grpSpPr>
+        <a:xfrm>
+          <a:off x="0" y="0"/>
+          <a:ext cx="0" cy="0"/>
+          <a:chOff x="0" y="0"/>
+          <a:chExt cx="0" cy="0"/>
+        </a:xfrm>
+      </p:grpSpPr>
+      <p:sp>
+        <p:nvSpPr>
+          <p:cNvPr id="2" name="Marcador de imagen de diapositiva 1"/>
+          <p:cNvSpPr>
+            <a:spLocks noGrp="1" noRot="1" noChangeAspect="1"/>
+          </p:cNvSpPr>
+          <p:nvPr>
+            <p:ph type="sldImg"/>
+          </p:nvPr>
+        </p:nvSpPr>
+        <p:spPr/>
+      </p:sp>
+      <p:sp>
+        <p:nvSpPr>
+          <p:cNvPr id="3" name="Marcador de notas 2"/>
+          <p:cNvSpPr>
+            <a:spLocks noGrp="1"/>
+          </p:cNvSpPr>
+          <p:nvPr>
+            <p:ph type="body" idx="1"/>
+          </p:nvPr>
+        </p:nvSpPr>
+        <p:spPr/>
+        <p:txBody>
+          <a:bodyPr/>
+          <a:lstStyle/>
+          <a:p>
+            <a:r>
+              <a:rPr lang="es-ES" dirty="0"/>
+              <a:t>Creamos el proyecto </a:t>
+            </a:r>
+            <a:r>
+              <a:rPr lang="es-ES" dirty="0" err="1"/>
+              <a:t>Xamarin</a:t>
+            </a:r>
+            <a:r>
+              <a:rPr lang="es-ES" dirty="0"/>
+              <a:t> </a:t>
+            </a:r>
+            <a:r>
+              <a:rPr lang="es-ES" dirty="0" err="1"/>
+              <a:t>Forms</a:t>
+            </a:r>
+            <a:endParaRPr lang="es-MX" dirty="0"/>
+          </a:p>
+        </p:txBody>
+      </p:sp>
+      <p:sp>
+        <p:nvSpPr>
+          <p:cNvPr id="4" name="Marcador de número de diapositiva 3"/>
+          <p:cNvSpPr>
+            <a:spLocks noGrp="1"/>
+          </p:cNvSpPr>
+          <p:nvPr>
+            <p:ph type="sldNum" sz="quarter" idx="5"/>
+          </p:nvPr>
+        </p:nvSpPr>
+        <p:spPr/>
+        <p:txBody>
+          <a:bodyPr/>
+          <a:lstStyle/>
+          <a:p>
+            <a:fld id="{785ED18C-E05F-4FD2-A782-FC24AC302660}" type="slidenum">
+              <a:rPr lang="es-MX" smtClean="0"/>
+              <a:t>49</a:t>
+            </a:fld>
+            <a:endParaRPr lang="es-MX"/>
+          </a:p>
+        </p:txBody>
+      </p:sp>
+    </p:spTree>
+    <p:extLst>
+      <p:ext uri="{BB962C8B-B14F-4D97-AF65-F5344CB8AC3E}">
+        <p14:creationId xmlns:p14="http://schemas.microsoft.com/office/powerpoint/2010/main" val="2695577435"/>
+      </p:ext>
+    </p:extLst>
+  </p:cSld>
+  <p:clrMapOvr>
+    <a:masterClrMapping/>
+  </p:clrMapOvr>
+</p:notes>
+</file>
+
+<file path=ppt/notesSlides/notesSlide47.xml><?xml version="1.0" encoding="utf-8"?>
+<p:notes xmlns:a="http://schemas.openxmlformats.org/drawingml/2006/main" xmlns:r="http://schemas.openxmlformats.org/officeDocument/2006/relationships" xmlns:p="http://schemas.openxmlformats.org/presentationml/2006/main">
+  <p:cSld>
+    <p:spTree>
+      <p:nvGrpSpPr>
+        <p:cNvPr id="1" name=""/>
+        <p:cNvGrpSpPr/>
+        <p:nvPr/>
+      </p:nvGrpSpPr>
+      <p:grpSpPr>
+        <a:xfrm>
+          <a:off x="0" y="0"/>
+          <a:ext cx="0" cy="0"/>
+          <a:chOff x="0" y="0"/>
+          <a:chExt cx="0" cy="0"/>
+        </a:xfrm>
+      </p:grpSpPr>
+      <p:sp>
+        <p:nvSpPr>
+          <p:cNvPr id="2" name="Marcador de imagen de diapositiva 1"/>
+          <p:cNvSpPr>
+            <a:spLocks noGrp="1" noRot="1" noChangeAspect="1"/>
+          </p:cNvSpPr>
+          <p:nvPr>
+            <p:ph type="sldImg"/>
+          </p:nvPr>
+        </p:nvSpPr>
+        <p:spPr/>
+      </p:sp>
+      <p:sp>
+        <p:nvSpPr>
+          <p:cNvPr id="3" name="Marcador de notas 2"/>
+          <p:cNvSpPr>
+            <a:spLocks noGrp="1"/>
+          </p:cNvSpPr>
+          <p:nvPr>
+            <p:ph type="body" idx="1"/>
+          </p:nvPr>
+        </p:nvSpPr>
+        <p:spPr/>
+        <p:txBody>
+          <a:bodyPr/>
+          <a:lstStyle/>
+          <a:p>
+            <a:r>
+              <a:rPr lang="es-ES" dirty="0"/>
+              <a:t>Configuramos el </a:t>
+            </a:r>
+            <a:r>
+              <a:rPr lang="es-ES" dirty="0" err="1"/>
+              <a:t>pryecto</a:t>
+            </a:r>
+            <a:endParaRPr lang="es-MX" dirty="0"/>
+          </a:p>
+        </p:txBody>
+      </p:sp>
+      <p:sp>
+        <p:nvSpPr>
+          <p:cNvPr id="4" name="Marcador de número de diapositiva 3"/>
+          <p:cNvSpPr>
+            <a:spLocks noGrp="1"/>
+          </p:cNvSpPr>
+          <p:nvPr>
+            <p:ph type="sldNum" sz="quarter" idx="5"/>
+          </p:nvPr>
+        </p:nvSpPr>
+        <p:spPr/>
+        <p:txBody>
+          <a:bodyPr/>
+          <a:lstStyle/>
+          <a:p>
+            <a:fld id="{785ED18C-E05F-4FD2-A782-FC24AC302660}" type="slidenum">
+              <a:rPr lang="es-MX" smtClean="0"/>
+              <a:t>50</a:t>
+            </a:fld>
+            <a:endParaRPr lang="es-MX"/>
+          </a:p>
+        </p:txBody>
+      </p:sp>
+    </p:spTree>
+    <p:extLst>
+      <p:ext uri="{BB962C8B-B14F-4D97-AF65-F5344CB8AC3E}">
+        <p14:creationId xmlns:p14="http://schemas.microsoft.com/office/powerpoint/2010/main" val="3242467973"/>
+      </p:ext>
+    </p:extLst>
+  </p:cSld>
+  <p:clrMapOvr>
+    <a:masterClrMapping/>
+  </p:clrMapOvr>
+</p:notes>
+</file>
+
+<file path=ppt/notesSlides/notesSlide48.xml><?xml version="1.0" encoding="utf-8"?>
+<p:notes xmlns:a="http://schemas.openxmlformats.org/drawingml/2006/main" xmlns:r="http://schemas.openxmlformats.org/officeDocument/2006/relationships" xmlns:p="http://schemas.openxmlformats.org/presentationml/2006/main">
+  <p:cSld>
+    <p:spTree>
+      <p:nvGrpSpPr>
+        <p:cNvPr id="1" name=""/>
+        <p:cNvGrpSpPr/>
+        <p:nvPr/>
+      </p:nvGrpSpPr>
+      <p:grpSpPr>
+        <a:xfrm>
+          <a:off x="0" y="0"/>
+          <a:ext cx="0" cy="0"/>
+          <a:chOff x="0" y="0"/>
+          <a:chExt cx="0" cy="0"/>
+        </a:xfrm>
+      </p:grpSpPr>
+      <p:sp>
+        <p:nvSpPr>
+          <p:cNvPr id="2" name="Marcador de imagen de diapositiva 1"/>
+          <p:cNvSpPr>
+            <a:spLocks noGrp="1" noRot="1" noChangeAspect="1"/>
+          </p:cNvSpPr>
+          <p:nvPr>
+            <p:ph type="sldImg"/>
+          </p:nvPr>
+        </p:nvSpPr>
+        <p:spPr/>
+      </p:sp>
+      <p:sp>
+        <p:nvSpPr>
+          <p:cNvPr id="3" name="Marcador de notas 2"/>
+          <p:cNvSpPr>
+            <a:spLocks noGrp="1"/>
+          </p:cNvSpPr>
+          <p:nvPr>
+            <p:ph type="body" idx="1"/>
+          </p:nvPr>
+        </p:nvSpPr>
+        <p:spPr/>
+        <p:txBody>
+          <a:bodyPr/>
+          <a:lstStyle/>
+          <a:p>
+            <a:r>
+              <a:rPr lang="es-ES" dirty="0"/>
+              <a:t>Seleccionamos la plantilla en blanco para Android y iOS</a:t>
+            </a:r>
+            <a:endParaRPr lang="es-MX" dirty="0"/>
+          </a:p>
+        </p:txBody>
+      </p:sp>
+      <p:sp>
+        <p:nvSpPr>
+          <p:cNvPr id="4" name="Marcador de número de diapositiva 3"/>
+          <p:cNvSpPr>
+            <a:spLocks noGrp="1"/>
+          </p:cNvSpPr>
+          <p:nvPr>
+            <p:ph type="sldNum" sz="quarter" idx="5"/>
+          </p:nvPr>
+        </p:nvSpPr>
+        <p:spPr/>
+        <p:txBody>
+          <a:bodyPr/>
+          <a:lstStyle/>
+          <a:p>
+            <a:fld id="{785ED18C-E05F-4FD2-A782-FC24AC302660}" type="slidenum">
+              <a:rPr lang="es-MX" smtClean="0"/>
+              <a:t>51</a:t>
+            </a:fld>
+            <a:endParaRPr lang="es-MX"/>
+          </a:p>
+        </p:txBody>
+      </p:sp>
+    </p:spTree>
+    <p:extLst>
+      <p:ext uri="{BB962C8B-B14F-4D97-AF65-F5344CB8AC3E}">
+        <p14:creationId xmlns:p14="http://schemas.microsoft.com/office/powerpoint/2010/main" val="3087188598"/>
+      </p:ext>
+    </p:extLst>
+  </p:cSld>
+  <p:clrMapOvr>
+    <a:masterClrMapping/>
+  </p:clrMapOvr>
+</p:notes>
+</file>
+
+<file path=ppt/notesSlides/notesSlide49.xml><?xml version="1.0" encoding="utf-8"?>
+<p:notes xmlns:a="http://schemas.openxmlformats.org/drawingml/2006/main" xmlns:r="http://schemas.openxmlformats.org/officeDocument/2006/relationships" xmlns:p="http://schemas.openxmlformats.org/presentationml/2006/main">
+  <p:cSld>
+    <p:spTree>
+      <p:nvGrpSpPr>
+        <p:cNvPr id="1" name=""/>
+        <p:cNvGrpSpPr/>
+        <p:nvPr/>
+      </p:nvGrpSpPr>
+      <p:grpSpPr>
+        <a:xfrm>
+          <a:off x="0" y="0"/>
+          <a:ext cx="0" cy="0"/>
+          <a:chOff x="0" y="0"/>
+          <a:chExt cx="0" cy="0"/>
+        </a:xfrm>
+      </p:grpSpPr>
+      <p:sp>
+        <p:nvSpPr>
+          <p:cNvPr id="2" name="Marcador de imagen de diapositiva 1"/>
+          <p:cNvSpPr>
+            <a:spLocks noGrp="1" noRot="1" noChangeAspect="1"/>
+          </p:cNvSpPr>
+          <p:nvPr>
+            <p:ph type="sldImg"/>
+          </p:nvPr>
+        </p:nvSpPr>
+        <p:spPr/>
+      </p:sp>
+      <p:sp>
+        <p:nvSpPr>
+          <p:cNvPr id="3" name="Marcador de notas 2"/>
+          <p:cNvSpPr>
+            <a:spLocks noGrp="1"/>
+          </p:cNvSpPr>
+          <p:nvPr>
+            <p:ph type="body" idx="1"/>
+          </p:nvPr>
+        </p:nvSpPr>
+        <p:spPr/>
+        <p:txBody>
+          <a:bodyPr/>
+          <a:lstStyle/>
+          <a:p>
+            <a:r>
+              <a:rPr lang="es-ES" dirty="0"/>
+              <a:t>Verificamos que </a:t>
+            </a:r>
+            <a:r>
+              <a:rPr lang="es-ES" dirty="0" err="1"/>
+              <a:t>esten</a:t>
+            </a:r>
+            <a:r>
+              <a:rPr lang="es-ES" dirty="0"/>
+              <a:t> los proyectos en las carpetas correspondientes</a:t>
+            </a:r>
+          </a:p>
+          <a:p>
+            <a:r>
+              <a:rPr lang="es-ES" dirty="0"/>
+              <a:t>Sino</a:t>
+            </a:r>
+          </a:p>
+          <a:p>
+            <a:r>
+              <a:rPr lang="es-ES" dirty="0"/>
+              <a:t>moverlas</a:t>
+            </a:r>
+            <a:endParaRPr lang="es-MX" dirty="0"/>
+          </a:p>
+        </p:txBody>
+      </p:sp>
+      <p:sp>
+        <p:nvSpPr>
+          <p:cNvPr id="4" name="Marcador de número de diapositiva 3"/>
+          <p:cNvSpPr>
+            <a:spLocks noGrp="1"/>
+          </p:cNvSpPr>
+          <p:nvPr>
+            <p:ph type="sldNum" sz="quarter" idx="5"/>
+          </p:nvPr>
+        </p:nvSpPr>
+        <p:spPr/>
+        <p:txBody>
+          <a:bodyPr/>
+          <a:lstStyle/>
+          <a:p>
+            <a:fld id="{785ED18C-E05F-4FD2-A782-FC24AC302660}" type="slidenum">
+              <a:rPr lang="es-MX" smtClean="0"/>
+              <a:t>52</a:t>
+            </a:fld>
+            <a:endParaRPr lang="es-MX"/>
+          </a:p>
+        </p:txBody>
+      </p:sp>
+    </p:spTree>
+    <p:extLst>
+      <p:ext uri="{BB962C8B-B14F-4D97-AF65-F5344CB8AC3E}">
+        <p14:creationId xmlns:p14="http://schemas.microsoft.com/office/powerpoint/2010/main" val="3380260724"/>
       </p:ext>
     </p:extLst>
   </p:cSld>
@@ -5219,6 +7735,481 @@
     <p:extLst>
       <p:ext uri="{BB962C8B-B14F-4D97-AF65-F5344CB8AC3E}">
         <p14:creationId xmlns:p14="http://schemas.microsoft.com/office/powerpoint/2010/main" val="706102499"/>
+      </p:ext>
+    </p:extLst>
+  </p:cSld>
+  <p:clrMapOvr>
+    <a:masterClrMapping/>
+  </p:clrMapOvr>
+</p:notes>
+</file>
+
+<file path=ppt/notesSlides/notesSlide50.xml><?xml version="1.0" encoding="utf-8"?>
+<p:notes xmlns:a="http://schemas.openxmlformats.org/drawingml/2006/main" xmlns:r="http://schemas.openxmlformats.org/officeDocument/2006/relationships" xmlns:p="http://schemas.openxmlformats.org/presentationml/2006/main">
+  <p:cSld>
+    <p:spTree>
+      <p:nvGrpSpPr>
+        <p:cNvPr id="1" name=""/>
+        <p:cNvGrpSpPr/>
+        <p:nvPr/>
+      </p:nvGrpSpPr>
+      <p:grpSpPr>
+        <a:xfrm>
+          <a:off x="0" y="0"/>
+          <a:ext cx="0" cy="0"/>
+          <a:chOff x="0" y="0"/>
+          <a:chExt cx="0" cy="0"/>
+        </a:xfrm>
+      </p:grpSpPr>
+      <p:sp>
+        <p:nvSpPr>
+          <p:cNvPr id="2" name="Marcador de imagen de diapositiva 1"/>
+          <p:cNvSpPr>
+            <a:spLocks noGrp="1" noRot="1" noChangeAspect="1"/>
+          </p:cNvSpPr>
+          <p:nvPr>
+            <p:ph type="sldImg"/>
+          </p:nvPr>
+        </p:nvSpPr>
+        <p:spPr/>
+      </p:sp>
+      <p:sp>
+        <p:nvSpPr>
+          <p:cNvPr id="3" name="Marcador de notas 2"/>
+          <p:cNvSpPr>
+            <a:spLocks noGrp="1"/>
+          </p:cNvSpPr>
+          <p:nvPr>
+            <p:ph type="body" idx="1"/>
+          </p:nvPr>
+        </p:nvSpPr>
+        <p:spPr/>
+        <p:txBody>
+          <a:bodyPr/>
+          <a:lstStyle/>
+          <a:p>
+            <a:r>
+              <a:rPr lang="es-ES" dirty="0"/>
+              <a:t>Mover proyectos a la carpeta </a:t>
+            </a:r>
+            <a:r>
+              <a:rPr lang="es-ES" dirty="0" err="1"/>
+              <a:t>Forms</a:t>
+            </a:r>
+            <a:endParaRPr lang="es-ES" dirty="0"/>
+          </a:p>
+          <a:p>
+            <a:r>
+              <a:rPr lang="es-ES" dirty="0"/>
+              <a:t>Arrastrar y soltar</a:t>
+            </a:r>
+            <a:endParaRPr lang="es-MX" dirty="0"/>
+          </a:p>
+        </p:txBody>
+      </p:sp>
+      <p:sp>
+        <p:nvSpPr>
+          <p:cNvPr id="4" name="Marcador de número de diapositiva 3"/>
+          <p:cNvSpPr>
+            <a:spLocks noGrp="1"/>
+          </p:cNvSpPr>
+          <p:nvPr>
+            <p:ph type="sldNum" sz="quarter" idx="5"/>
+          </p:nvPr>
+        </p:nvSpPr>
+        <p:spPr/>
+        <p:txBody>
+          <a:bodyPr/>
+          <a:lstStyle/>
+          <a:p>
+            <a:fld id="{785ED18C-E05F-4FD2-A782-FC24AC302660}" type="slidenum">
+              <a:rPr lang="es-MX" smtClean="0"/>
+              <a:t>53</a:t>
+            </a:fld>
+            <a:endParaRPr lang="es-MX"/>
+          </a:p>
+        </p:txBody>
+      </p:sp>
+    </p:spTree>
+    <p:extLst>
+      <p:ext uri="{BB962C8B-B14F-4D97-AF65-F5344CB8AC3E}">
+        <p14:creationId xmlns:p14="http://schemas.microsoft.com/office/powerpoint/2010/main" val="1972919447"/>
+      </p:ext>
+    </p:extLst>
+  </p:cSld>
+  <p:clrMapOvr>
+    <a:masterClrMapping/>
+  </p:clrMapOvr>
+</p:notes>
+</file>
+
+<file path=ppt/notesSlides/notesSlide51.xml><?xml version="1.0" encoding="utf-8"?>
+<p:notes xmlns:a="http://schemas.openxmlformats.org/drawingml/2006/main" xmlns:r="http://schemas.openxmlformats.org/officeDocument/2006/relationships" xmlns:p="http://schemas.openxmlformats.org/presentationml/2006/main">
+  <p:cSld>
+    <p:spTree>
+      <p:nvGrpSpPr>
+        <p:cNvPr id="1" name=""/>
+        <p:cNvGrpSpPr/>
+        <p:nvPr/>
+      </p:nvGrpSpPr>
+      <p:grpSpPr>
+        <a:xfrm>
+          <a:off x="0" y="0"/>
+          <a:ext cx="0" cy="0"/>
+          <a:chOff x="0" y="0"/>
+          <a:chExt cx="0" cy="0"/>
+        </a:xfrm>
+      </p:grpSpPr>
+      <p:sp>
+        <p:nvSpPr>
+          <p:cNvPr id="2" name="Marcador de imagen de diapositiva 1"/>
+          <p:cNvSpPr>
+            <a:spLocks noGrp="1" noRot="1" noChangeAspect="1"/>
+          </p:cNvSpPr>
+          <p:nvPr>
+            <p:ph type="sldImg"/>
+          </p:nvPr>
+        </p:nvSpPr>
+        <p:spPr/>
+      </p:sp>
+      <p:sp>
+        <p:nvSpPr>
+          <p:cNvPr id="3" name="Marcador de notas 2"/>
+          <p:cNvSpPr>
+            <a:spLocks noGrp="1"/>
+          </p:cNvSpPr>
+          <p:nvPr>
+            <p:ph type="body" idx="1"/>
+          </p:nvPr>
+        </p:nvSpPr>
+        <p:spPr/>
+        <p:txBody>
+          <a:bodyPr/>
+          <a:lstStyle/>
+          <a:p>
+            <a:r>
+              <a:rPr lang="es-ES" dirty="0"/>
+              <a:t>Ejecutamos el </a:t>
+            </a:r>
+            <a:r>
+              <a:rPr lang="es-ES" dirty="0" err="1"/>
+              <a:t>proeycto</a:t>
+            </a:r>
+            <a:r>
+              <a:rPr lang="es-ES" dirty="0"/>
+              <a:t> Android</a:t>
+            </a:r>
+            <a:endParaRPr lang="es-MX" dirty="0"/>
+          </a:p>
+        </p:txBody>
+      </p:sp>
+      <p:sp>
+        <p:nvSpPr>
+          <p:cNvPr id="4" name="Marcador de número de diapositiva 3"/>
+          <p:cNvSpPr>
+            <a:spLocks noGrp="1"/>
+          </p:cNvSpPr>
+          <p:nvPr>
+            <p:ph type="sldNum" sz="quarter" idx="5"/>
+          </p:nvPr>
+        </p:nvSpPr>
+        <p:spPr/>
+        <p:txBody>
+          <a:bodyPr/>
+          <a:lstStyle/>
+          <a:p>
+            <a:fld id="{785ED18C-E05F-4FD2-A782-FC24AC302660}" type="slidenum">
+              <a:rPr lang="es-MX" smtClean="0"/>
+              <a:t>54</a:t>
+            </a:fld>
+            <a:endParaRPr lang="es-MX"/>
+          </a:p>
+        </p:txBody>
+      </p:sp>
+    </p:spTree>
+    <p:extLst>
+      <p:ext uri="{BB962C8B-B14F-4D97-AF65-F5344CB8AC3E}">
+        <p14:creationId xmlns:p14="http://schemas.microsoft.com/office/powerpoint/2010/main" val="3475706394"/>
+      </p:ext>
+    </p:extLst>
+  </p:cSld>
+  <p:clrMapOvr>
+    <a:masterClrMapping/>
+  </p:clrMapOvr>
+</p:notes>
+</file>
+
+<file path=ppt/notesSlides/notesSlide52.xml><?xml version="1.0" encoding="utf-8"?>
+<p:notes xmlns:a="http://schemas.openxmlformats.org/drawingml/2006/main" xmlns:r="http://schemas.openxmlformats.org/officeDocument/2006/relationships" xmlns:p="http://schemas.openxmlformats.org/presentationml/2006/main">
+  <p:cSld>
+    <p:spTree>
+      <p:nvGrpSpPr>
+        <p:cNvPr id="1" name=""/>
+        <p:cNvGrpSpPr/>
+        <p:nvPr/>
+      </p:nvGrpSpPr>
+      <p:grpSpPr>
+        <a:xfrm>
+          <a:off x="0" y="0"/>
+          <a:ext cx="0" cy="0"/>
+          <a:chOff x="0" y="0"/>
+          <a:chExt cx="0" cy="0"/>
+        </a:xfrm>
+      </p:grpSpPr>
+      <p:sp>
+        <p:nvSpPr>
+          <p:cNvPr id="2" name="Marcador de imagen de diapositiva 1"/>
+          <p:cNvSpPr>
+            <a:spLocks noGrp="1" noRot="1" noChangeAspect="1"/>
+          </p:cNvSpPr>
+          <p:nvPr>
+            <p:ph type="sldImg"/>
+          </p:nvPr>
+        </p:nvSpPr>
+        <p:spPr/>
+      </p:sp>
+      <p:sp>
+        <p:nvSpPr>
+          <p:cNvPr id="3" name="Marcador de notas 2"/>
+          <p:cNvSpPr>
+            <a:spLocks noGrp="1"/>
+          </p:cNvSpPr>
+          <p:nvPr>
+            <p:ph type="body" idx="1"/>
+          </p:nvPr>
+        </p:nvSpPr>
+        <p:spPr/>
+        <p:txBody>
+          <a:bodyPr/>
+          <a:lstStyle/>
+          <a:p>
+            <a:r>
+              <a:rPr lang="es-ES" dirty="0"/>
+              <a:t>Instalar </a:t>
+            </a:r>
+            <a:r>
+              <a:rPr lang="es-ES" dirty="0" err="1"/>
+              <a:t>vysor</a:t>
+            </a:r>
+            <a:r>
+              <a:rPr lang="es-ES" dirty="0"/>
+              <a:t> para conectar el móvil y verlo en la computadora</a:t>
+            </a:r>
+            <a:endParaRPr lang="es-MX" dirty="0"/>
+          </a:p>
+        </p:txBody>
+      </p:sp>
+      <p:sp>
+        <p:nvSpPr>
+          <p:cNvPr id="4" name="Marcador de número de diapositiva 3"/>
+          <p:cNvSpPr>
+            <a:spLocks noGrp="1"/>
+          </p:cNvSpPr>
+          <p:nvPr>
+            <p:ph type="sldNum" sz="quarter" idx="5"/>
+          </p:nvPr>
+        </p:nvSpPr>
+        <p:spPr/>
+        <p:txBody>
+          <a:bodyPr/>
+          <a:lstStyle/>
+          <a:p>
+            <a:fld id="{785ED18C-E05F-4FD2-A782-FC24AC302660}" type="slidenum">
+              <a:rPr lang="es-MX" smtClean="0"/>
+              <a:t>55</a:t>
+            </a:fld>
+            <a:endParaRPr lang="es-MX"/>
+          </a:p>
+        </p:txBody>
+      </p:sp>
+    </p:spTree>
+    <p:extLst>
+      <p:ext uri="{BB962C8B-B14F-4D97-AF65-F5344CB8AC3E}">
+        <p14:creationId xmlns:p14="http://schemas.microsoft.com/office/powerpoint/2010/main" val="2026883134"/>
+      </p:ext>
+    </p:extLst>
+  </p:cSld>
+  <p:clrMapOvr>
+    <a:masterClrMapping/>
+  </p:clrMapOvr>
+</p:notes>
+</file>
+
+<file path=ppt/notesSlides/notesSlide53.xml><?xml version="1.0" encoding="utf-8"?>
+<p:notes xmlns:a="http://schemas.openxmlformats.org/drawingml/2006/main" xmlns:r="http://schemas.openxmlformats.org/officeDocument/2006/relationships" xmlns:p="http://schemas.openxmlformats.org/presentationml/2006/main">
+  <p:cSld>
+    <p:spTree>
+      <p:nvGrpSpPr>
+        <p:cNvPr id="1" name=""/>
+        <p:cNvGrpSpPr/>
+        <p:nvPr/>
+      </p:nvGrpSpPr>
+      <p:grpSpPr>
+        <a:xfrm>
+          <a:off x="0" y="0"/>
+          <a:ext cx="0" cy="0"/>
+          <a:chOff x="0" y="0"/>
+          <a:chExt cx="0" cy="0"/>
+        </a:xfrm>
+      </p:grpSpPr>
+      <p:sp>
+        <p:nvSpPr>
+          <p:cNvPr id="2" name="Marcador de imagen de diapositiva 1"/>
+          <p:cNvSpPr>
+            <a:spLocks noGrp="1" noRot="1" noChangeAspect="1"/>
+          </p:cNvSpPr>
+          <p:nvPr>
+            <p:ph type="sldImg"/>
+          </p:nvPr>
+        </p:nvSpPr>
+        <p:spPr/>
+      </p:sp>
+      <p:sp>
+        <p:nvSpPr>
+          <p:cNvPr id="3" name="Marcador de notas 2"/>
+          <p:cNvSpPr>
+            <a:spLocks noGrp="1"/>
+          </p:cNvSpPr>
+          <p:nvPr>
+            <p:ph type="body" idx="1"/>
+          </p:nvPr>
+        </p:nvSpPr>
+        <p:spPr/>
+        <p:txBody>
+          <a:bodyPr/>
+          <a:lstStyle/>
+          <a:p>
+            <a:r>
+              <a:rPr lang="es-ES" dirty="0"/>
+              <a:t>Ya se reconoció el móvil en visual </a:t>
+            </a:r>
+            <a:r>
+              <a:rPr lang="es-ES" dirty="0" err="1"/>
+              <a:t>studio</a:t>
+            </a:r>
+            <a:endParaRPr lang="es-MX" dirty="0"/>
+          </a:p>
+        </p:txBody>
+      </p:sp>
+      <p:sp>
+        <p:nvSpPr>
+          <p:cNvPr id="4" name="Marcador de número de diapositiva 3"/>
+          <p:cNvSpPr>
+            <a:spLocks noGrp="1"/>
+          </p:cNvSpPr>
+          <p:nvPr>
+            <p:ph type="sldNum" sz="quarter" idx="5"/>
+          </p:nvPr>
+        </p:nvSpPr>
+        <p:spPr/>
+        <p:txBody>
+          <a:bodyPr/>
+          <a:lstStyle/>
+          <a:p>
+            <a:fld id="{785ED18C-E05F-4FD2-A782-FC24AC302660}" type="slidenum">
+              <a:rPr lang="es-MX" smtClean="0"/>
+              <a:t>57</a:t>
+            </a:fld>
+            <a:endParaRPr lang="es-MX"/>
+          </a:p>
+        </p:txBody>
+      </p:sp>
+    </p:spTree>
+    <p:extLst>
+      <p:ext uri="{BB962C8B-B14F-4D97-AF65-F5344CB8AC3E}">
+        <p14:creationId xmlns:p14="http://schemas.microsoft.com/office/powerpoint/2010/main" val="3229531893"/>
+      </p:ext>
+    </p:extLst>
+  </p:cSld>
+  <p:clrMapOvr>
+    <a:masterClrMapping/>
+  </p:clrMapOvr>
+</p:notes>
+</file>
+
+<file path=ppt/notesSlides/notesSlide54.xml><?xml version="1.0" encoding="utf-8"?>
+<p:notes xmlns:a="http://schemas.openxmlformats.org/drawingml/2006/main" xmlns:r="http://schemas.openxmlformats.org/officeDocument/2006/relationships" xmlns:p="http://schemas.openxmlformats.org/presentationml/2006/main">
+  <p:cSld>
+    <p:spTree>
+      <p:nvGrpSpPr>
+        <p:cNvPr id="1" name=""/>
+        <p:cNvGrpSpPr/>
+        <p:nvPr/>
+      </p:nvGrpSpPr>
+      <p:grpSpPr>
+        <a:xfrm>
+          <a:off x="0" y="0"/>
+          <a:ext cx="0" cy="0"/>
+          <a:chOff x="0" y="0"/>
+          <a:chExt cx="0" cy="0"/>
+        </a:xfrm>
+      </p:grpSpPr>
+      <p:sp>
+        <p:nvSpPr>
+          <p:cNvPr id="2" name="Marcador de imagen de diapositiva 1"/>
+          <p:cNvSpPr>
+            <a:spLocks noGrp="1" noRot="1" noChangeAspect="1"/>
+          </p:cNvSpPr>
+          <p:nvPr>
+            <p:ph type="sldImg"/>
+          </p:nvPr>
+        </p:nvSpPr>
+        <p:spPr/>
+      </p:sp>
+      <p:sp>
+        <p:nvSpPr>
+          <p:cNvPr id="3" name="Marcador de notas 2"/>
+          <p:cNvSpPr>
+            <a:spLocks noGrp="1"/>
+          </p:cNvSpPr>
+          <p:nvPr>
+            <p:ph type="body" idx="1"/>
+          </p:nvPr>
+        </p:nvSpPr>
+        <p:spPr/>
+        <p:txBody>
+          <a:bodyPr/>
+          <a:lstStyle/>
+          <a:p>
+            <a:r>
+              <a:rPr lang="es-ES" dirty="0"/>
+              <a:t>Verificar que se </a:t>
+            </a:r>
+            <a:r>
+              <a:rPr lang="es-ES"/>
+              <a:t>haya ejecutado</a:t>
+            </a:r>
+            <a:endParaRPr lang="es-MX"/>
+          </a:p>
+        </p:txBody>
+      </p:sp>
+      <p:sp>
+        <p:nvSpPr>
+          <p:cNvPr id="4" name="Marcador de número de diapositiva 3"/>
+          <p:cNvSpPr>
+            <a:spLocks noGrp="1"/>
+          </p:cNvSpPr>
+          <p:nvPr>
+            <p:ph type="sldNum" sz="quarter" idx="5"/>
+          </p:nvPr>
+        </p:nvSpPr>
+        <p:spPr/>
+        <p:txBody>
+          <a:bodyPr/>
+          <a:lstStyle/>
+          <a:p>
+            <a:fld id="{785ED18C-E05F-4FD2-A782-FC24AC302660}" type="slidenum">
+              <a:rPr lang="es-MX" smtClean="0"/>
+              <a:t>58</a:t>
+            </a:fld>
+            <a:endParaRPr lang="es-MX"/>
+          </a:p>
+        </p:txBody>
+      </p:sp>
+    </p:spTree>
+    <p:extLst>
+      <p:ext uri="{BB962C8B-B14F-4D97-AF65-F5344CB8AC3E}">
+        <p14:creationId xmlns:p14="http://schemas.microsoft.com/office/powerpoint/2010/main" val="4047218955"/>
       </p:ext>
     </p:extLst>
   </p:cSld>
@@ -5741,7 +8732,7 @@
           <a:p>
             <a:fld id="{A6297428-E98A-4102-8DAC-D4A32A47CC0E}" type="datetimeFigureOut">
               <a:rPr lang="es-MX" smtClean="0"/>
-              <a:t>04/11/2019</a:t>
+              <a:t>06/11/2019</a:t>
             </a:fld>
             <a:endParaRPr lang="es-MX"/>
           </a:p>
@@ -5941,7 +8932,7 @@
           <a:p>
             <a:fld id="{A6297428-E98A-4102-8DAC-D4A32A47CC0E}" type="datetimeFigureOut">
               <a:rPr lang="es-MX" smtClean="0"/>
-              <a:t>04/11/2019</a:t>
+              <a:t>06/11/2019</a:t>
             </a:fld>
             <a:endParaRPr lang="es-MX"/>
           </a:p>
@@ -6151,7 +9142,7 @@
           <a:p>
             <a:fld id="{A6297428-E98A-4102-8DAC-D4A32A47CC0E}" type="datetimeFigureOut">
               <a:rPr lang="es-MX" smtClean="0"/>
-              <a:t>04/11/2019</a:t>
+              <a:t>06/11/2019</a:t>
             </a:fld>
             <a:endParaRPr lang="es-MX"/>
           </a:p>
@@ -6351,7 +9342,7 @@
           <a:p>
             <a:fld id="{A6297428-E98A-4102-8DAC-D4A32A47CC0E}" type="datetimeFigureOut">
               <a:rPr lang="es-MX" smtClean="0"/>
-              <a:t>04/11/2019</a:t>
+              <a:t>06/11/2019</a:t>
             </a:fld>
             <a:endParaRPr lang="es-MX"/>
           </a:p>
@@ -6627,7 +9618,7 @@
           <a:p>
             <a:fld id="{A6297428-E98A-4102-8DAC-D4A32A47CC0E}" type="datetimeFigureOut">
               <a:rPr lang="es-MX" smtClean="0"/>
-              <a:t>04/11/2019</a:t>
+              <a:t>06/11/2019</a:t>
             </a:fld>
             <a:endParaRPr lang="es-MX"/>
           </a:p>
@@ -6895,7 +9886,7 @@
           <a:p>
             <a:fld id="{A6297428-E98A-4102-8DAC-D4A32A47CC0E}" type="datetimeFigureOut">
               <a:rPr lang="es-MX" smtClean="0"/>
-              <a:t>04/11/2019</a:t>
+              <a:t>06/11/2019</a:t>
             </a:fld>
             <a:endParaRPr lang="es-MX"/>
           </a:p>
@@ -7310,7 +10301,7 @@
           <a:p>
             <a:fld id="{A6297428-E98A-4102-8DAC-D4A32A47CC0E}" type="datetimeFigureOut">
               <a:rPr lang="es-MX" smtClean="0"/>
-              <a:t>04/11/2019</a:t>
+              <a:t>06/11/2019</a:t>
             </a:fld>
             <a:endParaRPr lang="es-MX"/>
           </a:p>
@@ -7452,7 +10443,7 @@
           <a:p>
             <a:fld id="{A6297428-E98A-4102-8DAC-D4A32A47CC0E}" type="datetimeFigureOut">
               <a:rPr lang="es-MX" smtClean="0"/>
-              <a:t>04/11/2019</a:t>
+              <a:t>06/11/2019</a:t>
             </a:fld>
             <a:endParaRPr lang="es-MX"/>
           </a:p>
@@ -7565,7 +10556,7 @@
           <a:p>
             <a:fld id="{A6297428-E98A-4102-8DAC-D4A32A47CC0E}" type="datetimeFigureOut">
               <a:rPr lang="es-MX" smtClean="0"/>
-              <a:t>04/11/2019</a:t>
+              <a:t>06/11/2019</a:t>
             </a:fld>
             <a:endParaRPr lang="es-MX"/>
           </a:p>
@@ -7878,7 +10869,7 @@
           <a:p>
             <a:fld id="{A6297428-E98A-4102-8DAC-D4A32A47CC0E}" type="datetimeFigureOut">
               <a:rPr lang="es-MX" smtClean="0"/>
-              <a:t>04/11/2019</a:t>
+              <a:t>06/11/2019</a:t>
             </a:fld>
             <a:endParaRPr lang="es-MX"/>
           </a:p>
@@ -8167,7 +11158,7 @@
           <a:p>
             <a:fld id="{A6297428-E98A-4102-8DAC-D4A32A47CC0E}" type="datetimeFigureOut">
               <a:rPr lang="es-MX" smtClean="0"/>
-              <a:t>04/11/2019</a:t>
+              <a:t>06/11/2019</a:t>
             </a:fld>
             <a:endParaRPr lang="es-MX"/>
           </a:p>
@@ -8410,7 +11401,7 @@
           <a:p>
             <a:fld id="{A6297428-E98A-4102-8DAC-D4A32A47CC0E}" type="datetimeFigureOut">
               <a:rPr lang="es-MX" smtClean="0"/>
-              <a:t>04/11/2019</a:t>
+              <a:t>06/11/2019</a:t>
             </a:fld>
             <a:endParaRPr lang="es-MX"/>
           </a:p>
@@ -10899,6 +13890,612 @@
 </p:sld>
 </file>
 
+<file path=ppt/slides/slide40.xml><?xml version="1.0" encoding="utf-8"?>
+<p:sld xmlns:a="http://schemas.openxmlformats.org/drawingml/2006/main" xmlns:r="http://schemas.openxmlformats.org/officeDocument/2006/relationships" xmlns:p="http://schemas.openxmlformats.org/presentationml/2006/main">
+  <p:cSld>
+    <p:spTree>
+      <p:nvGrpSpPr>
+        <p:cNvPr id="1" name=""/>
+        <p:cNvGrpSpPr/>
+        <p:nvPr/>
+      </p:nvGrpSpPr>
+      <p:grpSpPr>
+        <a:xfrm>
+          <a:off x="0" y="0"/>
+          <a:ext cx="0" cy="0"/>
+          <a:chOff x="0" y="0"/>
+          <a:chExt cx="0" cy="0"/>
+        </a:xfrm>
+      </p:grpSpPr>
+      <p:pic>
+        <p:nvPicPr>
+          <p:cNvPr id="2" name="Imagen 1">
+            <a:extLst>
+              <a:ext uri="{FF2B5EF4-FFF2-40B4-BE49-F238E27FC236}">
+                <a16:creationId xmlns:a16="http://schemas.microsoft.com/office/drawing/2014/main" id="{145877CA-672F-44AD-B8CB-8144C7979DEB}"/>
+              </a:ext>
+            </a:extLst>
+          </p:cNvPr>
+          <p:cNvPicPr>
+            <a:picLocks noChangeAspect="1"/>
+          </p:cNvPicPr>
+          <p:nvPr/>
+        </p:nvPicPr>
+        <p:blipFill>
+          <a:blip r:embed="rId3"/>
+          <a:stretch>
+            <a:fillRect/>
+          </a:stretch>
+        </p:blipFill>
+        <p:spPr>
+          <a:xfrm>
+            <a:off x="0" y="163602"/>
+            <a:ext cx="12192000" cy="6530795"/>
+          </a:xfrm>
+          <a:prstGeom prst="rect">
+            <a:avLst/>
+          </a:prstGeom>
+        </p:spPr>
+      </p:pic>
+    </p:spTree>
+    <p:extLst>
+      <p:ext uri="{BB962C8B-B14F-4D97-AF65-F5344CB8AC3E}">
+        <p14:creationId xmlns:p14="http://schemas.microsoft.com/office/powerpoint/2010/main" val="3883458890"/>
+      </p:ext>
+    </p:extLst>
+  </p:cSld>
+  <p:clrMapOvr>
+    <a:masterClrMapping/>
+  </p:clrMapOvr>
+</p:sld>
+</file>
+
+<file path=ppt/slides/slide41.xml><?xml version="1.0" encoding="utf-8"?>
+<p:sld xmlns:a="http://schemas.openxmlformats.org/drawingml/2006/main" xmlns:r="http://schemas.openxmlformats.org/officeDocument/2006/relationships" xmlns:p="http://schemas.openxmlformats.org/presentationml/2006/main">
+  <p:cSld>
+    <p:spTree>
+      <p:nvGrpSpPr>
+        <p:cNvPr id="1" name=""/>
+        <p:cNvGrpSpPr/>
+        <p:nvPr/>
+      </p:nvGrpSpPr>
+      <p:grpSpPr>
+        <a:xfrm>
+          <a:off x="0" y="0"/>
+          <a:ext cx="0" cy="0"/>
+          <a:chOff x="0" y="0"/>
+          <a:chExt cx="0" cy="0"/>
+        </a:xfrm>
+      </p:grpSpPr>
+      <p:pic>
+        <p:nvPicPr>
+          <p:cNvPr id="2" name="Imagen 1">
+            <a:extLst>
+              <a:ext uri="{FF2B5EF4-FFF2-40B4-BE49-F238E27FC236}">
+                <a16:creationId xmlns:a16="http://schemas.microsoft.com/office/drawing/2014/main" id="{35E92470-2635-49D5-99BD-1D32105502D7}"/>
+              </a:ext>
+            </a:extLst>
+          </p:cNvPr>
+          <p:cNvPicPr>
+            <a:picLocks noChangeAspect="1"/>
+          </p:cNvPicPr>
+          <p:nvPr/>
+        </p:nvPicPr>
+        <p:blipFill>
+          <a:blip r:embed="rId3"/>
+          <a:stretch>
+            <a:fillRect/>
+          </a:stretch>
+        </p:blipFill>
+        <p:spPr>
+          <a:xfrm>
+            <a:off x="2262187" y="690562"/>
+            <a:ext cx="7667625" cy="5476875"/>
+          </a:xfrm>
+          <a:prstGeom prst="rect">
+            <a:avLst/>
+          </a:prstGeom>
+        </p:spPr>
+      </p:pic>
+    </p:spTree>
+    <p:extLst>
+      <p:ext uri="{BB962C8B-B14F-4D97-AF65-F5344CB8AC3E}">
+        <p14:creationId xmlns:p14="http://schemas.microsoft.com/office/powerpoint/2010/main" val="1724593842"/>
+      </p:ext>
+    </p:extLst>
+  </p:cSld>
+  <p:clrMapOvr>
+    <a:masterClrMapping/>
+  </p:clrMapOvr>
+</p:sld>
+</file>
+
+<file path=ppt/slides/slide42.xml><?xml version="1.0" encoding="utf-8"?>
+<p:sld xmlns:a="http://schemas.openxmlformats.org/drawingml/2006/main" xmlns:r="http://schemas.openxmlformats.org/officeDocument/2006/relationships" xmlns:p="http://schemas.openxmlformats.org/presentationml/2006/main">
+  <p:cSld>
+    <p:spTree>
+      <p:nvGrpSpPr>
+        <p:cNvPr id="1" name=""/>
+        <p:cNvGrpSpPr/>
+        <p:nvPr/>
+      </p:nvGrpSpPr>
+      <p:grpSpPr>
+        <a:xfrm>
+          <a:off x="0" y="0"/>
+          <a:ext cx="0" cy="0"/>
+          <a:chOff x="0" y="0"/>
+          <a:chExt cx="0" cy="0"/>
+        </a:xfrm>
+      </p:grpSpPr>
+      <p:pic>
+        <p:nvPicPr>
+          <p:cNvPr id="2" name="Imagen 1">
+            <a:extLst>
+              <a:ext uri="{FF2B5EF4-FFF2-40B4-BE49-F238E27FC236}">
+                <a16:creationId xmlns:a16="http://schemas.microsoft.com/office/drawing/2014/main" id="{1D389450-6BBA-4013-AD40-0E81097EAF93}"/>
+              </a:ext>
+            </a:extLst>
+          </p:cNvPr>
+          <p:cNvPicPr>
+            <a:picLocks noChangeAspect="1"/>
+          </p:cNvPicPr>
+          <p:nvPr/>
+        </p:nvPicPr>
+        <p:blipFill>
+          <a:blip r:embed="rId3"/>
+          <a:stretch>
+            <a:fillRect/>
+          </a:stretch>
+        </p:blipFill>
+        <p:spPr>
+          <a:xfrm>
+            <a:off x="1287945" y="0"/>
+            <a:ext cx="9616109" cy="6858000"/>
+          </a:xfrm>
+          <a:prstGeom prst="rect">
+            <a:avLst/>
+          </a:prstGeom>
+        </p:spPr>
+      </p:pic>
+    </p:spTree>
+    <p:extLst>
+      <p:ext uri="{BB962C8B-B14F-4D97-AF65-F5344CB8AC3E}">
+        <p14:creationId xmlns:p14="http://schemas.microsoft.com/office/powerpoint/2010/main" val="344008266"/>
+      </p:ext>
+    </p:extLst>
+  </p:cSld>
+  <p:clrMapOvr>
+    <a:masterClrMapping/>
+  </p:clrMapOvr>
+</p:sld>
+</file>
+
+<file path=ppt/slides/slide43.xml><?xml version="1.0" encoding="utf-8"?>
+<p:sld xmlns:a="http://schemas.openxmlformats.org/drawingml/2006/main" xmlns:r="http://schemas.openxmlformats.org/officeDocument/2006/relationships" xmlns:p="http://schemas.openxmlformats.org/presentationml/2006/main">
+  <p:cSld>
+    <p:spTree>
+      <p:nvGrpSpPr>
+        <p:cNvPr id="1" name=""/>
+        <p:cNvGrpSpPr/>
+        <p:nvPr/>
+      </p:nvGrpSpPr>
+      <p:grpSpPr>
+        <a:xfrm>
+          <a:off x="0" y="0"/>
+          <a:ext cx="0" cy="0"/>
+          <a:chOff x="0" y="0"/>
+          <a:chExt cx="0" cy="0"/>
+        </a:xfrm>
+      </p:grpSpPr>
+      <p:pic>
+        <p:nvPicPr>
+          <p:cNvPr id="2" name="Imagen 1">
+            <a:extLst>
+              <a:ext uri="{FF2B5EF4-FFF2-40B4-BE49-F238E27FC236}">
+                <a16:creationId xmlns:a16="http://schemas.microsoft.com/office/drawing/2014/main" id="{F03BC1B8-8700-4F86-9269-C7A42CAA0114}"/>
+              </a:ext>
+            </a:extLst>
+          </p:cNvPr>
+          <p:cNvPicPr>
+            <a:picLocks noChangeAspect="1"/>
+          </p:cNvPicPr>
+          <p:nvPr/>
+        </p:nvPicPr>
+        <p:blipFill>
+          <a:blip r:embed="rId3"/>
+          <a:stretch>
+            <a:fillRect/>
+          </a:stretch>
+        </p:blipFill>
+        <p:spPr>
+          <a:xfrm>
+            <a:off x="1287945" y="0"/>
+            <a:ext cx="9616109" cy="6858000"/>
+          </a:xfrm>
+          <a:prstGeom prst="rect">
+            <a:avLst/>
+          </a:prstGeom>
+        </p:spPr>
+      </p:pic>
+    </p:spTree>
+    <p:extLst>
+      <p:ext uri="{BB962C8B-B14F-4D97-AF65-F5344CB8AC3E}">
+        <p14:creationId xmlns:p14="http://schemas.microsoft.com/office/powerpoint/2010/main" val="291720200"/>
+      </p:ext>
+    </p:extLst>
+  </p:cSld>
+  <p:clrMapOvr>
+    <a:masterClrMapping/>
+  </p:clrMapOvr>
+</p:sld>
+</file>
+
+<file path=ppt/slides/slide44.xml><?xml version="1.0" encoding="utf-8"?>
+<p:sld xmlns:a="http://schemas.openxmlformats.org/drawingml/2006/main" xmlns:r="http://schemas.openxmlformats.org/officeDocument/2006/relationships" xmlns:p="http://schemas.openxmlformats.org/presentationml/2006/main">
+  <p:cSld>
+    <p:spTree>
+      <p:nvGrpSpPr>
+        <p:cNvPr id="1" name=""/>
+        <p:cNvGrpSpPr/>
+        <p:nvPr/>
+      </p:nvGrpSpPr>
+      <p:grpSpPr>
+        <a:xfrm>
+          <a:off x="0" y="0"/>
+          <a:ext cx="0" cy="0"/>
+          <a:chOff x="0" y="0"/>
+          <a:chExt cx="0" cy="0"/>
+        </a:xfrm>
+      </p:grpSpPr>
+      <p:pic>
+        <p:nvPicPr>
+          <p:cNvPr id="2" name="Imagen 1">
+            <a:extLst>
+              <a:ext uri="{FF2B5EF4-FFF2-40B4-BE49-F238E27FC236}">
+                <a16:creationId xmlns:a16="http://schemas.microsoft.com/office/drawing/2014/main" id="{4BAACD7F-AA3E-4CBC-BE0B-FA7CF3D8E737}"/>
+              </a:ext>
+            </a:extLst>
+          </p:cNvPr>
+          <p:cNvPicPr>
+            <a:picLocks noChangeAspect="1"/>
+          </p:cNvPicPr>
+          <p:nvPr/>
+        </p:nvPicPr>
+        <p:blipFill>
+          <a:blip r:embed="rId3"/>
+          <a:stretch>
+            <a:fillRect/>
+          </a:stretch>
+        </p:blipFill>
+        <p:spPr>
+          <a:xfrm>
+            <a:off x="1287945" y="0"/>
+            <a:ext cx="9616109" cy="6858000"/>
+          </a:xfrm>
+          <a:prstGeom prst="rect">
+            <a:avLst/>
+          </a:prstGeom>
+        </p:spPr>
+      </p:pic>
+    </p:spTree>
+    <p:extLst>
+      <p:ext uri="{BB962C8B-B14F-4D97-AF65-F5344CB8AC3E}">
+        <p14:creationId xmlns:p14="http://schemas.microsoft.com/office/powerpoint/2010/main" val="1140724877"/>
+      </p:ext>
+    </p:extLst>
+  </p:cSld>
+  <p:clrMapOvr>
+    <a:masterClrMapping/>
+  </p:clrMapOvr>
+</p:sld>
+</file>
+
+<file path=ppt/slides/slide45.xml><?xml version="1.0" encoding="utf-8"?>
+<p:sld xmlns:a="http://schemas.openxmlformats.org/drawingml/2006/main" xmlns:r="http://schemas.openxmlformats.org/officeDocument/2006/relationships" xmlns:p="http://schemas.openxmlformats.org/presentationml/2006/main">
+  <p:cSld>
+    <p:spTree>
+      <p:nvGrpSpPr>
+        <p:cNvPr id="1" name=""/>
+        <p:cNvGrpSpPr/>
+        <p:nvPr/>
+      </p:nvGrpSpPr>
+      <p:grpSpPr>
+        <a:xfrm>
+          <a:off x="0" y="0"/>
+          <a:ext cx="0" cy="0"/>
+          <a:chOff x="0" y="0"/>
+          <a:chExt cx="0" cy="0"/>
+        </a:xfrm>
+      </p:grpSpPr>
+      <p:pic>
+        <p:nvPicPr>
+          <p:cNvPr id="2" name="Imagen 1">
+            <a:extLst>
+              <a:ext uri="{FF2B5EF4-FFF2-40B4-BE49-F238E27FC236}">
+                <a16:creationId xmlns:a16="http://schemas.microsoft.com/office/drawing/2014/main" id="{A7D39F1D-7D12-4513-8016-EE4208515C5D}"/>
+              </a:ext>
+            </a:extLst>
+          </p:cNvPr>
+          <p:cNvPicPr>
+            <a:picLocks noChangeAspect="1"/>
+          </p:cNvPicPr>
+          <p:nvPr/>
+        </p:nvPicPr>
+        <p:blipFill>
+          <a:blip r:embed="rId3"/>
+          <a:stretch>
+            <a:fillRect/>
+          </a:stretch>
+        </p:blipFill>
+        <p:spPr>
+          <a:xfrm>
+            <a:off x="1287945" y="0"/>
+            <a:ext cx="9616109" cy="6858000"/>
+          </a:xfrm>
+          <a:prstGeom prst="rect">
+            <a:avLst/>
+          </a:prstGeom>
+        </p:spPr>
+      </p:pic>
+    </p:spTree>
+    <p:extLst>
+      <p:ext uri="{BB962C8B-B14F-4D97-AF65-F5344CB8AC3E}">
+        <p14:creationId xmlns:p14="http://schemas.microsoft.com/office/powerpoint/2010/main" val="1289808864"/>
+      </p:ext>
+    </p:extLst>
+  </p:cSld>
+  <p:clrMapOvr>
+    <a:masterClrMapping/>
+  </p:clrMapOvr>
+</p:sld>
+</file>
+
+<file path=ppt/slides/slide46.xml><?xml version="1.0" encoding="utf-8"?>
+<p:sld xmlns:a="http://schemas.openxmlformats.org/drawingml/2006/main" xmlns:r="http://schemas.openxmlformats.org/officeDocument/2006/relationships" xmlns:p="http://schemas.openxmlformats.org/presentationml/2006/main">
+  <p:cSld>
+    <p:spTree>
+      <p:nvGrpSpPr>
+        <p:cNvPr id="1" name=""/>
+        <p:cNvGrpSpPr/>
+        <p:nvPr/>
+      </p:nvGrpSpPr>
+      <p:grpSpPr>
+        <a:xfrm>
+          <a:off x="0" y="0"/>
+          <a:ext cx="0" cy="0"/>
+          <a:chOff x="0" y="0"/>
+          <a:chExt cx="0" cy="0"/>
+        </a:xfrm>
+      </p:grpSpPr>
+      <p:sp>
+        <p:nvSpPr>
+          <p:cNvPr id="2" name="Título 1">
+            <a:extLst>
+              <a:ext uri="{FF2B5EF4-FFF2-40B4-BE49-F238E27FC236}">
+                <a16:creationId xmlns:a16="http://schemas.microsoft.com/office/drawing/2014/main" id="{7928C355-1E42-4C53-A50E-DDAABEDF1F6A}"/>
+              </a:ext>
+            </a:extLst>
+          </p:cNvPr>
+          <p:cNvSpPr>
+            <a:spLocks noGrp="1"/>
+          </p:cNvSpPr>
+          <p:nvPr>
+            <p:ph type="ctrTitle"/>
+          </p:nvPr>
+        </p:nvSpPr>
+        <p:spPr/>
+        <p:txBody>
+          <a:bodyPr/>
+          <a:lstStyle/>
+          <a:p>
+            <a:r>
+              <a:rPr lang="es-ES" dirty="0"/>
+              <a:t>TODO esto es para el app</a:t>
+            </a:r>
+            <a:endParaRPr lang="es-MX" dirty="0"/>
+          </a:p>
+        </p:txBody>
+      </p:sp>
+      <p:sp>
+        <p:nvSpPr>
+          <p:cNvPr id="3" name="Subtítulo 2">
+            <a:extLst>
+              <a:ext uri="{FF2B5EF4-FFF2-40B4-BE49-F238E27FC236}">
+                <a16:creationId xmlns:a16="http://schemas.microsoft.com/office/drawing/2014/main" id="{0A8F49E5-0142-4ADB-8E4E-625A6DF29948}"/>
+              </a:ext>
+            </a:extLst>
+          </p:cNvPr>
+          <p:cNvSpPr>
+            <a:spLocks noGrp="1"/>
+          </p:cNvSpPr>
+          <p:nvPr>
+            <p:ph type="subTitle" idx="1"/>
+          </p:nvPr>
+        </p:nvSpPr>
+        <p:spPr/>
+        <p:txBody>
+          <a:bodyPr/>
+          <a:lstStyle/>
+          <a:p>
+            <a:r>
+              <a:rPr lang="es-ES" dirty="0" err="1"/>
+              <a:t>Movil</a:t>
+            </a:r>
+            <a:r>
+              <a:rPr lang="es-ES" dirty="0"/>
+              <a:t> en </a:t>
+            </a:r>
+            <a:r>
+              <a:rPr lang="es-ES" dirty="0" err="1"/>
+              <a:t>android</a:t>
+            </a:r>
+            <a:endParaRPr lang="es-MX" dirty="0"/>
+          </a:p>
+        </p:txBody>
+      </p:sp>
+    </p:spTree>
+    <p:extLst>
+      <p:ext uri="{BB962C8B-B14F-4D97-AF65-F5344CB8AC3E}">
+        <p14:creationId xmlns:p14="http://schemas.microsoft.com/office/powerpoint/2010/main" val="1614807434"/>
+      </p:ext>
+    </p:extLst>
+  </p:cSld>
+  <p:clrMapOvr>
+    <a:masterClrMapping/>
+  </p:clrMapOvr>
+</p:sld>
+</file>
+
+<file path=ppt/slides/slide47.xml><?xml version="1.0" encoding="utf-8"?>
+<p:sld xmlns:a="http://schemas.openxmlformats.org/drawingml/2006/main" xmlns:r="http://schemas.openxmlformats.org/officeDocument/2006/relationships" xmlns:p="http://schemas.openxmlformats.org/presentationml/2006/main">
+  <p:cSld>
+    <p:spTree>
+      <p:nvGrpSpPr>
+        <p:cNvPr id="1" name=""/>
+        <p:cNvGrpSpPr/>
+        <p:nvPr/>
+      </p:nvGrpSpPr>
+      <p:grpSpPr>
+        <a:xfrm>
+          <a:off x="0" y="0"/>
+          <a:ext cx="0" cy="0"/>
+          <a:chOff x="0" y="0"/>
+          <a:chExt cx="0" cy="0"/>
+        </a:xfrm>
+      </p:grpSpPr>
+      <p:pic>
+        <p:nvPicPr>
+          <p:cNvPr id="2" name="Imagen 1">
+            <a:extLst>
+              <a:ext uri="{FF2B5EF4-FFF2-40B4-BE49-F238E27FC236}">
+                <a16:creationId xmlns:a16="http://schemas.microsoft.com/office/drawing/2014/main" id="{F50FF76D-C8A9-4040-880A-5A3D52465F05}"/>
+              </a:ext>
+            </a:extLst>
+          </p:cNvPr>
+          <p:cNvPicPr>
+            <a:picLocks noChangeAspect="1"/>
+          </p:cNvPicPr>
+          <p:nvPr/>
+        </p:nvPicPr>
+        <p:blipFill>
+          <a:blip r:embed="rId3"/>
+          <a:stretch>
+            <a:fillRect/>
+          </a:stretch>
+        </p:blipFill>
+        <p:spPr>
+          <a:xfrm>
+            <a:off x="1287945" y="0"/>
+            <a:ext cx="9616109" cy="6858000"/>
+          </a:xfrm>
+          <a:prstGeom prst="rect">
+            <a:avLst/>
+          </a:prstGeom>
+        </p:spPr>
+      </p:pic>
+    </p:spTree>
+    <p:extLst>
+      <p:ext uri="{BB962C8B-B14F-4D97-AF65-F5344CB8AC3E}">
+        <p14:creationId xmlns:p14="http://schemas.microsoft.com/office/powerpoint/2010/main" val="4246370519"/>
+      </p:ext>
+    </p:extLst>
+  </p:cSld>
+  <p:clrMapOvr>
+    <a:masterClrMapping/>
+  </p:clrMapOvr>
+</p:sld>
+</file>
+
+<file path=ppt/slides/slide48.xml><?xml version="1.0" encoding="utf-8"?>
+<p:sld xmlns:a="http://schemas.openxmlformats.org/drawingml/2006/main" xmlns:r="http://schemas.openxmlformats.org/officeDocument/2006/relationships" xmlns:p="http://schemas.openxmlformats.org/presentationml/2006/main">
+  <p:cSld>
+    <p:spTree>
+      <p:nvGrpSpPr>
+        <p:cNvPr id="1" name=""/>
+        <p:cNvGrpSpPr/>
+        <p:nvPr/>
+      </p:nvGrpSpPr>
+      <p:grpSpPr>
+        <a:xfrm>
+          <a:off x="0" y="0"/>
+          <a:ext cx="0" cy="0"/>
+          <a:chOff x="0" y="0"/>
+          <a:chExt cx="0" cy="0"/>
+        </a:xfrm>
+      </p:grpSpPr>
+    </p:spTree>
+    <p:extLst>
+      <p:ext uri="{BB962C8B-B14F-4D97-AF65-F5344CB8AC3E}">
+        <p14:creationId xmlns:p14="http://schemas.microsoft.com/office/powerpoint/2010/main" val="3967690567"/>
+      </p:ext>
+    </p:extLst>
+  </p:cSld>
+  <p:clrMapOvr>
+    <a:masterClrMapping/>
+  </p:clrMapOvr>
+</p:sld>
+</file>
+
+<file path=ppt/slides/slide49.xml><?xml version="1.0" encoding="utf-8"?>
+<p:sld xmlns:a="http://schemas.openxmlformats.org/drawingml/2006/main" xmlns:r="http://schemas.openxmlformats.org/officeDocument/2006/relationships" xmlns:p="http://schemas.openxmlformats.org/presentationml/2006/main">
+  <p:cSld>
+    <p:spTree>
+      <p:nvGrpSpPr>
+        <p:cNvPr id="1" name=""/>
+        <p:cNvGrpSpPr/>
+        <p:nvPr/>
+      </p:nvGrpSpPr>
+      <p:grpSpPr>
+        <a:xfrm>
+          <a:off x="0" y="0"/>
+          <a:ext cx="0" cy="0"/>
+          <a:chOff x="0" y="0"/>
+          <a:chExt cx="0" cy="0"/>
+        </a:xfrm>
+      </p:grpSpPr>
+      <p:pic>
+        <p:nvPicPr>
+          <p:cNvPr id="2" name="Imagen 1">
+            <a:extLst>
+              <a:ext uri="{FF2B5EF4-FFF2-40B4-BE49-F238E27FC236}">
+                <a16:creationId xmlns:a16="http://schemas.microsoft.com/office/drawing/2014/main" id="{733AAC3D-754E-472C-A2CE-8DCB5813518D}"/>
+              </a:ext>
+            </a:extLst>
+          </p:cNvPr>
+          <p:cNvPicPr>
+            <a:picLocks noChangeAspect="1"/>
+          </p:cNvPicPr>
+          <p:nvPr/>
+        </p:nvPicPr>
+        <p:blipFill>
+          <a:blip r:embed="rId3"/>
+          <a:stretch>
+            <a:fillRect/>
+          </a:stretch>
+        </p:blipFill>
+        <p:spPr>
+          <a:xfrm>
+            <a:off x="1219200" y="47625"/>
+            <a:ext cx="9753600" cy="6762750"/>
+          </a:xfrm>
+          <a:prstGeom prst="rect">
+            <a:avLst/>
+          </a:prstGeom>
+        </p:spPr>
+      </p:pic>
+    </p:spTree>
+    <p:extLst>
+      <p:ext uri="{BB962C8B-B14F-4D97-AF65-F5344CB8AC3E}">
+        <p14:creationId xmlns:p14="http://schemas.microsoft.com/office/powerpoint/2010/main" val="2200765525"/>
+      </p:ext>
+    </p:extLst>
+  </p:cSld>
+  <p:clrMapOvr>
+    <a:masterClrMapping/>
+  </p:clrMapOvr>
+</p:sld>
+</file>
+
 <file path=ppt/slides/slide5.xml><?xml version="1.0" encoding="utf-8"?>
 <p:sld xmlns:a="http://schemas.openxmlformats.org/drawingml/2006/main" xmlns:r="http://schemas.openxmlformats.org/officeDocument/2006/relationships" xmlns:p="http://schemas.openxmlformats.org/presentationml/2006/main">
   <p:cSld>
@@ -10950,6 +14547,546 @@
     <p:extLst>
       <p:ext uri="{BB962C8B-B14F-4D97-AF65-F5344CB8AC3E}">
         <p14:creationId xmlns:p14="http://schemas.microsoft.com/office/powerpoint/2010/main" val="846599979"/>
+      </p:ext>
+    </p:extLst>
+  </p:cSld>
+  <p:clrMapOvr>
+    <a:masterClrMapping/>
+  </p:clrMapOvr>
+</p:sld>
+</file>
+
+<file path=ppt/slides/slide50.xml><?xml version="1.0" encoding="utf-8"?>
+<p:sld xmlns:a="http://schemas.openxmlformats.org/drawingml/2006/main" xmlns:r="http://schemas.openxmlformats.org/officeDocument/2006/relationships" xmlns:p="http://schemas.openxmlformats.org/presentationml/2006/main">
+  <p:cSld>
+    <p:spTree>
+      <p:nvGrpSpPr>
+        <p:cNvPr id="1" name=""/>
+        <p:cNvGrpSpPr/>
+        <p:nvPr/>
+      </p:nvGrpSpPr>
+      <p:grpSpPr>
+        <a:xfrm>
+          <a:off x="0" y="0"/>
+          <a:ext cx="0" cy="0"/>
+          <a:chOff x="0" y="0"/>
+          <a:chExt cx="0" cy="0"/>
+        </a:xfrm>
+      </p:grpSpPr>
+      <p:pic>
+        <p:nvPicPr>
+          <p:cNvPr id="2" name="Imagen 1">
+            <a:extLst>
+              <a:ext uri="{FF2B5EF4-FFF2-40B4-BE49-F238E27FC236}">
+                <a16:creationId xmlns:a16="http://schemas.microsoft.com/office/drawing/2014/main" id="{D13EC843-014C-4281-8D10-592926F221AA}"/>
+              </a:ext>
+            </a:extLst>
+          </p:cNvPr>
+          <p:cNvPicPr>
+            <a:picLocks noChangeAspect="1"/>
+          </p:cNvPicPr>
+          <p:nvPr/>
+        </p:nvPicPr>
+        <p:blipFill>
+          <a:blip r:embed="rId3"/>
+          <a:stretch>
+            <a:fillRect/>
+          </a:stretch>
+        </p:blipFill>
+        <p:spPr>
+          <a:xfrm>
+            <a:off x="1219200" y="47625"/>
+            <a:ext cx="9753600" cy="6762750"/>
+          </a:xfrm>
+          <a:prstGeom prst="rect">
+            <a:avLst/>
+          </a:prstGeom>
+        </p:spPr>
+      </p:pic>
+    </p:spTree>
+    <p:extLst>
+      <p:ext uri="{BB962C8B-B14F-4D97-AF65-F5344CB8AC3E}">
+        <p14:creationId xmlns:p14="http://schemas.microsoft.com/office/powerpoint/2010/main" val="864684294"/>
+      </p:ext>
+    </p:extLst>
+  </p:cSld>
+  <p:clrMapOvr>
+    <a:masterClrMapping/>
+  </p:clrMapOvr>
+</p:sld>
+</file>
+
+<file path=ppt/slides/slide51.xml><?xml version="1.0" encoding="utf-8"?>
+<p:sld xmlns:a="http://schemas.openxmlformats.org/drawingml/2006/main" xmlns:r="http://schemas.openxmlformats.org/officeDocument/2006/relationships" xmlns:p="http://schemas.openxmlformats.org/presentationml/2006/main">
+  <p:cSld>
+    <p:spTree>
+      <p:nvGrpSpPr>
+        <p:cNvPr id="1" name=""/>
+        <p:cNvGrpSpPr/>
+        <p:nvPr/>
+      </p:nvGrpSpPr>
+      <p:grpSpPr>
+        <a:xfrm>
+          <a:off x="0" y="0"/>
+          <a:ext cx="0" cy="0"/>
+          <a:chOff x="0" y="0"/>
+          <a:chExt cx="0" cy="0"/>
+        </a:xfrm>
+      </p:grpSpPr>
+      <p:pic>
+        <p:nvPicPr>
+          <p:cNvPr id="2" name="Imagen 1">
+            <a:extLst>
+              <a:ext uri="{FF2B5EF4-FFF2-40B4-BE49-F238E27FC236}">
+                <a16:creationId xmlns:a16="http://schemas.microsoft.com/office/drawing/2014/main" id="{C5CE1B1B-93E7-4634-9F7C-B9E6E53F4500}"/>
+              </a:ext>
+            </a:extLst>
+          </p:cNvPr>
+          <p:cNvPicPr>
+            <a:picLocks noChangeAspect="1"/>
+          </p:cNvPicPr>
+          <p:nvPr/>
+        </p:nvPicPr>
+        <p:blipFill>
+          <a:blip r:embed="rId3"/>
+          <a:stretch>
+            <a:fillRect/>
+          </a:stretch>
+        </p:blipFill>
+        <p:spPr>
+          <a:xfrm>
+            <a:off x="2566987" y="1509712"/>
+            <a:ext cx="7058025" cy="3838575"/>
+          </a:xfrm>
+          <a:prstGeom prst="rect">
+            <a:avLst/>
+          </a:prstGeom>
+        </p:spPr>
+      </p:pic>
+    </p:spTree>
+    <p:extLst>
+      <p:ext uri="{BB962C8B-B14F-4D97-AF65-F5344CB8AC3E}">
+        <p14:creationId xmlns:p14="http://schemas.microsoft.com/office/powerpoint/2010/main" val="2738197449"/>
+      </p:ext>
+    </p:extLst>
+  </p:cSld>
+  <p:clrMapOvr>
+    <a:masterClrMapping/>
+  </p:clrMapOvr>
+</p:sld>
+</file>
+
+<file path=ppt/slides/slide52.xml><?xml version="1.0" encoding="utf-8"?>
+<p:sld xmlns:a="http://schemas.openxmlformats.org/drawingml/2006/main" xmlns:r="http://schemas.openxmlformats.org/officeDocument/2006/relationships" xmlns:p="http://schemas.openxmlformats.org/presentationml/2006/main">
+  <p:cSld>
+    <p:spTree>
+      <p:nvGrpSpPr>
+        <p:cNvPr id="1" name=""/>
+        <p:cNvGrpSpPr/>
+        <p:nvPr/>
+      </p:nvGrpSpPr>
+      <p:grpSpPr>
+        <a:xfrm>
+          <a:off x="0" y="0"/>
+          <a:ext cx="0" cy="0"/>
+          <a:chOff x="0" y="0"/>
+          <a:chExt cx="0" cy="0"/>
+        </a:xfrm>
+      </p:grpSpPr>
+      <p:pic>
+        <p:nvPicPr>
+          <p:cNvPr id="2" name="Imagen 1">
+            <a:extLst>
+              <a:ext uri="{FF2B5EF4-FFF2-40B4-BE49-F238E27FC236}">
+                <a16:creationId xmlns:a16="http://schemas.microsoft.com/office/drawing/2014/main" id="{0DC57237-E82A-4804-B13C-F042DA3C4D00}"/>
+              </a:ext>
+            </a:extLst>
+          </p:cNvPr>
+          <p:cNvPicPr>
+            <a:picLocks noChangeAspect="1"/>
+          </p:cNvPicPr>
+          <p:nvPr/>
+        </p:nvPicPr>
+        <p:blipFill>
+          <a:blip r:embed="rId3"/>
+          <a:stretch>
+            <a:fillRect/>
+          </a:stretch>
+        </p:blipFill>
+        <p:spPr>
+          <a:xfrm>
+            <a:off x="1287945" y="0"/>
+            <a:ext cx="9616109" cy="6858000"/>
+          </a:xfrm>
+          <a:prstGeom prst="rect">
+            <a:avLst/>
+          </a:prstGeom>
+        </p:spPr>
+      </p:pic>
+    </p:spTree>
+    <p:extLst>
+      <p:ext uri="{BB962C8B-B14F-4D97-AF65-F5344CB8AC3E}">
+        <p14:creationId xmlns:p14="http://schemas.microsoft.com/office/powerpoint/2010/main" val="3101038925"/>
+      </p:ext>
+    </p:extLst>
+  </p:cSld>
+  <p:clrMapOvr>
+    <a:masterClrMapping/>
+  </p:clrMapOvr>
+</p:sld>
+</file>
+
+<file path=ppt/slides/slide53.xml><?xml version="1.0" encoding="utf-8"?>
+<p:sld xmlns:a="http://schemas.openxmlformats.org/drawingml/2006/main" xmlns:r="http://schemas.openxmlformats.org/officeDocument/2006/relationships" xmlns:p="http://schemas.openxmlformats.org/presentationml/2006/main">
+  <p:cSld>
+    <p:spTree>
+      <p:nvGrpSpPr>
+        <p:cNvPr id="1" name=""/>
+        <p:cNvGrpSpPr/>
+        <p:nvPr/>
+      </p:nvGrpSpPr>
+      <p:grpSpPr>
+        <a:xfrm>
+          <a:off x="0" y="0"/>
+          <a:ext cx="0" cy="0"/>
+          <a:chOff x="0" y="0"/>
+          <a:chExt cx="0" cy="0"/>
+        </a:xfrm>
+      </p:grpSpPr>
+      <p:pic>
+        <p:nvPicPr>
+          <p:cNvPr id="2" name="Imagen 1">
+            <a:extLst>
+              <a:ext uri="{FF2B5EF4-FFF2-40B4-BE49-F238E27FC236}">
+                <a16:creationId xmlns:a16="http://schemas.microsoft.com/office/drawing/2014/main" id="{EE0519B2-EC7E-46A9-9167-BF55EB8E7E61}"/>
+              </a:ext>
+            </a:extLst>
+          </p:cNvPr>
+          <p:cNvPicPr>
+            <a:picLocks noChangeAspect="1"/>
+          </p:cNvPicPr>
+          <p:nvPr/>
+        </p:nvPicPr>
+        <p:blipFill>
+          <a:blip r:embed="rId3"/>
+          <a:stretch>
+            <a:fillRect/>
+          </a:stretch>
+        </p:blipFill>
+        <p:spPr>
+          <a:xfrm>
+            <a:off x="1287945" y="0"/>
+            <a:ext cx="9616109" cy="6858000"/>
+          </a:xfrm>
+          <a:prstGeom prst="rect">
+            <a:avLst/>
+          </a:prstGeom>
+        </p:spPr>
+      </p:pic>
+    </p:spTree>
+    <p:extLst>
+      <p:ext uri="{BB962C8B-B14F-4D97-AF65-F5344CB8AC3E}">
+        <p14:creationId xmlns:p14="http://schemas.microsoft.com/office/powerpoint/2010/main" val="812281027"/>
+      </p:ext>
+    </p:extLst>
+  </p:cSld>
+  <p:clrMapOvr>
+    <a:masterClrMapping/>
+  </p:clrMapOvr>
+</p:sld>
+</file>
+
+<file path=ppt/slides/slide54.xml><?xml version="1.0" encoding="utf-8"?>
+<p:sld xmlns:a="http://schemas.openxmlformats.org/drawingml/2006/main" xmlns:r="http://schemas.openxmlformats.org/officeDocument/2006/relationships" xmlns:p="http://schemas.openxmlformats.org/presentationml/2006/main">
+  <p:cSld>
+    <p:spTree>
+      <p:nvGrpSpPr>
+        <p:cNvPr id="1" name=""/>
+        <p:cNvGrpSpPr/>
+        <p:nvPr/>
+      </p:nvGrpSpPr>
+      <p:grpSpPr>
+        <a:xfrm>
+          <a:off x="0" y="0"/>
+          <a:ext cx="0" cy="0"/>
+          <a:chOff x="0" y="0"/>
+          <a:chExt cx="0" cy="0"/>
+        </a:xfrm>
+      </p:grpSpPr>
+      <p:pic>
+        <p:nvPicPr>
+          <p:cNvPr id="2" name="Imagen 1">
+            <a:extLst>
+              <a:ext uri="{FF2B5EF4-FFF2-40B4-BE49-F238E27FC236}">
+                <a16:creationId xmlns:a16="http://schemas.microsoft.com/office/drawing/2014/main" id="{74558712-8D48-4C64-A878-FE14F6170C88}"/>
+              </a:ext>
+            </a:extLst>
+          </p:cNvPr>
+          <p:cNvPicPr>
+            <a:picLocks noChangeAspect="1"/>
+          </p:cNvPicPr>
+          <p:nvPr/>
+        </p:nvPicPr>
+        <p:blipFill>
+          <a:blip r:embed="rId3"/>
+          <a:stretch>
+            <a:fillRect/>
+          </a:stretch>
+        </p:blipFill>
+        <p:spPr>
+          <a:xfrm>
+            <a:off x="1287945" y="0"/>
+            <a:ext cx="9616109" cy="6858000"/>
+          </a:xfrm>
+          <a:prstGeom prst="rect">
+            <a:avLst/>
+          </a:prstGeom>
+        </p:spPr>
+      </p:pic>
+    </p:spTree>
+    <p:extLst>
+      <p:ext uri="{BB962C8B-B14F-4D97-AF65-F5344CB8AC3E}">
+        <p14:creationId xmlns:p14="http://schemas.microsoft.com/office/powerpoint/2010/main" val="4105861112"/>
+      </p:ext>
+    </p:extLst>
+  </p:cSld>
+  <p:clrMapOvr>
+    <a:masterClrMapping/>
+  </p:clrMapOvr>
+</p:sld>
+</file>
+
+<file path=ppt/slides/slide55.xml><?xml version="1.0" encoding="utf-8"?>
+<p:sld xmlns:a="http://schemas.openxmlformats.org/drawingml/2006/main" xmlns:r="http://schemas.openxmlformats.org/officeDocument/2006/relationships" xmlns:p="http://schemas.openxmlformats.org/presentationml/2006/main">
+  <p:cSld>
+    <p:spTree>
+      <p:nvGrpSpPr>
+        <p:cNvPr id="1" name=""/>
+        <p:cNvGrpSpPr/>
+        <p:nvPr/>
+      </p:nvGrpSpPr>
+      <p:grpSpPr>
+        <a:xfrm>
+          <a:off x="0" y="0"/>
+          <a:ext cx="0" cy="0"/>
+          <a:chOff x="0" y="0"/>
+          <a:chExt cx="0" cy="0"/>
+        </a:xfrm>
+      </p:grpSpPr>
+      <p:pic>
+        <p:nvPicPr>
+          <p:cNvPr id="2" name="Imagen 1">
+            <a:extLst>
+              <a:ext uri="{FF2B5EF4-FFF2-40B4-BE49-F238E27FC236}">
+                <a16:creationId xmlns:a16="http://schemas.microsoft.com/office/drawing/2014/main" id="{38FFC918-5C1F-4A13-BECC-E4758D0FCBCB}"/>
+              </a:ext>
+            </a:extLst>
+          </p:cNvPr>
+          <p:cNvPicPr>
+            <a:picLocks noChangeAspect="1"/>
+          </p:cNvPicPr>
+          <p:nvPr/>
+        </p:nvPicPr>
+        <p:blipFill>
+          <a:blip r:embed="rId3"/>
+          <a:stretch>
+            <a:fillRect/>
+          </a:stretch>
+        </p:blipFill>
+        <p:spPr>
+          <a:xfrm>
+            <a:off x="2527986" y="0"/>
+            <a:ext cx="7136027" cy="6858000"/>
+          </a:xfrm>
+          <a:prstGeom prst="rect">
+            <a:avLst/>
+          </a:prstGeom>
+        </p:spPr>
+      </p:pic>
+    </p:spTree>
+    <p:extLst>
+      <p:ext uri="{BB962C8B-B14F-4D97-AF65-F5344CB8AC3E}">
+        <p14:creationId xmlns:p14="http://schemas.microsoft.com/office/powerpoint/2010/main" val="421878789"/>
+      </p:ext>
+    </p:extLst>
+  </p:cSld>
+  <p:clrMapOvr>
+    <a:masterClrMapping/>
+  </p:clrMapOvr>
+</p:sld>
+</file>
+
+<file path=ppt/slides/slide56.xml><?xml version="1.0" encoding="utf-8"?>
+<p:sld xmlns:a="http://schemas.openxmlformats.org/drawingml/2006/main" xmlns:r="http://schemas.openxmlformats.org/officeDocument/2006/relationships" xmlns:p="http://schemas.openxmlformats.org/presentationml/2006/main">
+  <p:cSld>
+    <p:spTree>
+      <p:nvGrpSpPr>
+        <p:cNvPr id="1" name=""/>
+        <p:cNvGrpSpPr/>
+        <p:nvPr/>
+      </p:nvGrpSpPr>
+      <p:grpSpPr>
+        <a:xfrm>
+          <a:off x="0" y="0"/>
+          <a:ext cx="0" cy="0"/>
+          <a:chOff x="0" y="0"/>
+          <a:chExt cx="0" cy="0"/>
+        </a:xfrm>
+      </p:grpSpPr>
+      <p:pic>
+        <p:nvPicPr>
+          <p:cNvPr id="2" name="Imagen 1">
+            <a:extLst>
+              <a:ext uri="{FF2B5EF4-FFF2-40B4-BE49-F238E27FC236}">
+                <a16:creationId xmlns:a16="http://schemas.microsoft.com/office/drawing/2014/main" id="{BB5BF919-585B-45E5-A2AB-392F0FB40389}"/>
+              </a:ext>
+            </a:extLst>
+          </p:cNvPr>
+          <p:cNvPicPr>
+            <a:picLocks noChangeAspect="1"/>
+          </p:cNvPicPr>
+          <p:nvPr/>
+        </p:nvPicPr>
+        <p:blipFill>
+          <a:blip r:embed="rId2"/>
+          <a:stretch>
+            <a:fillRect/>
+          </a:stretch>
+        </p:blipFill>
+        <p:spPr>
+          <a:xfrm>
+            <a:off x="4457241" y="0"/>
+            <a:ext cx="3277518" cy="6858000"/>
+          </a:xfrm>
+          <a:prstGeom prst="rect">
+            <a:avLst/>
+          </a:prstGeom>
+        </p:spPr>
+      </p:pic>
+    </p:spTree>
+    <p:extLst>
+      <p:ext uri="{BB962C8B-B14F-4D97-AF65-F5344CB8AC3E}">
+        <p14:creationId xmlns:p14="http://schemas.microsoft.com/office/powerpoint/2010/main" val="3587876972"/>
+      </p:ext>
+    </p:extLst>
+  </p:cSld>
+  <p:clrMapOvr>
+    <a:masterClrMapping/>
+  </p:clrMapOvr>
+</p:sld>
+</file>
+
+<file path=ppt/slides/slide57.xml><?xml version="1.0" encoding="utf-8"?>
+<p:sld xmlns:a="http://schemas.openxmlformats.org/drawingml/2006/main" xmlns:r="http://schemas.openxmlformats.org/officeDocument/2006/relationships" xmlns:p="http://schemas.openxmlformats.org/presentationml/2006/main">
+  <p:cSld>
+    <p:spTree>
+      <p:nvGrpSpPr>
+        <p:cNvPr id="1" name=""/>
+        <p:cNvGrpSpPr/>
+        <p:nvPr/>
+      </p:nvGrpSpPr>
+      <p:grpSpPr>
+        <a:xfrm>
+          <a:off x="0" y="0"/>
+          <a:ext cx="0" cy="0"/>
+          <a:chOff x="0" y="0"/>
+          <a:chExt cx="0" cy="0"/>
+        </a:xfrm>
+      </p:grpSpPr>
+      <p:pic>
+        <p:nvPicPr>
+          <p:cNvPr id="2" name="Imagen 1">
+            <a:extLst>
+              <a:ext uri="{FF2B5EF4-FFF2-40B4-BE49-F238E27FC236}">
+                <a16:creationId xmlns:a16="http://schemas.microsoft.com/office/drawing/2014/main" id="{B239BA78-E880-46D6-89BD-F820BDA19A4D}"/>
+              </a:ext>
+            </a:extLst>
+          </p:cNvPr>
+          <p:cNvPicPr>
+            <a:picLocks noChangeAspect="1"/>
+          </p:cNvPicPr>
+          <p:nvPr/>
+        </p:nvPicPr>
+        <p:blipFill>
+          <a:blip r:embed="rId3"/>
+          <a:stretch>
+            <a:fillRect/>
+          </a:stretch>
+        </p:blipFill>
+        <p:spPr>
+          <a:xfrm>
+            <a:off x="1287945" y="0"/>
+            <a:ext cx="9616109" cy="6858000"/>
+          </a:xfrm>
+          <a:prstGeom prst="rect">
+            <a:avLst/>
+          </a:prstGeom>
+        </p:spPr>
+      </p:pic>
+    </p:spTree>
+    <p:extLst>
+      <p:ext uri="{BB962C8B-B14F-4D97-AF65-F5344CB8AC3E}">
+        <p14:creationId xmlns:p14="http://schemas.microsoft.com/office/powerpoint/2010/main" val="3210746558"/>
+      </p:ext>
+    </p:extLst>
+  </p:cSld>
+  <p:clrMapOvr>
+    <a:masterClrMapping/>
+  </p:clrMapOvr>
+</p:sld>
+</file>
+
+<file path=ppt/slides/slide58.xml><?xml version="1.0" encoding="utf-8"?>
+<p:sld xmlns:a="http://schemas.openxmlformats.org/drawingml/2006/main" xmlns:r="http://schemas.openxmlformats.org/officeDocument/2006/relationships" xmlns:p="http://schemas.openxmlformats.org/presentationml/2006/main">
+  <p:cSld>
+    <p:spTree>
+      <p:nvGrpSpPr>
+        <p:cNvPr id="1" name=""/>
+        <p:cNvGrpSpPr/>
+        <p:nvPr/>
+      </p:nvGrpSpPr>
+      <p:grpSpPr>
+        <a:xfrm>
+          <a:off x="0" y="0"/>
+          <a:ext cx="0" cy="0"/>
+          <a:chOff x="0" y="0"/>
+          <a:chExt cx="0" cy="0"/>
+        </a:xfrm>
+      </p:grpSpPr>
+      <p:pic>
+        <p:nvPicPr>
+          <p:cNvPr id="2" name="Imagen 1">
+            <a:extLst>
+              <a:ext uri="{FF2B5EF4-FFF2-40B4-BE49-F238E27FC236}">
+                <a16:creationId xmlns:a16="http://schemas.microsoft.com/office/drawing/2014/main" id="{CD44F6C9-617A-4A4A-A34F-52EB0B020244}"/>
+              </a:ext>
+            </a:extLst>
+          </p:cNvPr>
+          <p:cNvPicPr>
+            <a:picLocks noChangeAspect="1"/>
+          </p:cNvPicPr>
+          <p:nvPr/>
+        </p:nvPicPr>
+        <p:blipFill>
+          <a:blip r:embed="rId3"/>
+          <a:stretch>
+            <a:fillRect/>
+          </a:stretch>
+        </p:blipFill>
+        <p:spPr>
+          <a:xfrm>
+            <a:off x="4457241" y="0"/>
+            <a:ext cx="3277518" cy="6858000"/>
+          </a:xfrm>
+          <a:prstGeom prst="rect">
+            <a:avLst/>
+          </a:prstGeom>
+        </p:spPr>
+      </p:pic>
+    </p:spTree>
+    <p:extLst>
+      <p:ext uri="{BB962C8B-B14F-4D97-AF65-F5344CB8AC3E}">
+        <p14:creationId xmlns:p14="http://schemas.microsoft.com/office/powerpoint/2010/main" val="1361110201"/>
       </p:ext>
     </p:extLst>
   </p:cSld>

</xml_diff>